<commit_message>
Updating numeric2cat and diffPalette issues
</commit_message>
<xml_diff>
--- a/vignettes/vignetteFigs/00vignetteFigs.pptx
+++ b/vignettes/vignetteFigs/00vignetteFigs.pptx
@@ -5,7 +5,7 @@
     <p:sldMasterId id="2147483648" r:id="rId1"/>
   </p:sldMasterIdLst>
   <p:notesMasterIdLst>
-    <p:notesMasterId r:id="rId44"/>
+    <p:notesMasterId r:id="rId45"/>
   </p:notesMasterIdLst>
   <p:sldIdLst>
     <p:sldId id="260" r:id="rId2"/>
@@ -42,14 +42,15 @@
     <p:sldId id="307" r:id="rId33"/>
     <p:sldId id="283" r:id="rId34"/>
     <p:sldId id="284" r:id="rId35"/>
-    <p:sldId id="291" r:id="rId36"/>
-    <p:sldId id="292" r:id="rId37"/>
-    <p:sldId id="293" r:id="rId38"/>
-    <p:sldId id="297" r:id="rId39"/>
-    <p:sldId id="301" r:id="rId40"/>
-    <p:sldId id="300" r:id="rId41"/>
-    <p:sldId id="298" r:id="rId42"/>
-    <p:sldId id="302" r:id="rId43"/>
+    <p:sldId id="309" r:id="rId36"/>
+    <p:sldId id="291" r:id="rId37"/>
+    <p:sldId id="292" r:id="rId38"/>
+    <p:sldId id="293" r:id="rId39"/>
+    <p:sldId id="297" r:id="rId40"/>
+    <p:sldId id="301" r:id="rId41"/>
+    <p:sldId id="300" r:id="rId42"/>
+    <p:sldId id="298" r:id="rId43"/>
+    <p:sldId id="302" r:id="rId44"/>
   </p:sldIdLst>
   <p:sldSz cx="12192000" cy="6858000"/>
   <p:notesSz cx="6858000" cy="9144000"/>
@@ -238,7 +239,7 @@
           <a:p>
             <a:fld id="{921607FB-4AF3-41D9-93C1-AF2B65302971}" type="datetimeFigureOut">
               <a:rPr lang="en-US" smtClean="0"/>
-              <a:t>10/30/2020</a:t>
+              <a:t>12/28/2020</a:t>
             </a:fld>
             <a:endParaRPr lang="en-US"/>
           </a:p>
@@ -634,7 +635,7 @@
           <a:p>
             <a:fld id="{11D67388-0790-496E-9A12-37055489AF4F}" type="datetimeFigureOut">
               <a:rPr lang="en-US" smtClean="0"/>
-              <a:t>10/30/2020</a:t>
+              <a:t>12/28/2020</a:t>
             </a:fld>
             <a:endParaRPr lang="en-US"/>
           </a:p>
@@ -802,7 +803,7 @@
           <a:p>
             <a:fld id="{11D67388-0790-496E-9A12-37055489AF4F}" type="datetimeFigureOut">
               <a:rPr lang="en-US" smtClean="0"/>
-              <a:t>10/30/2020</a:t>
+              <a:t>12/28/2020</a:t>
             </a:fld>
             <a:endParaRPr lang="en-US"/>
           </a:p>
@@ -980,7 +981,7 @@
           <a:p>
             <a:fld id="{11D67388-0790-496E-9A12-37055489AF4F}" type="datetimeFigureOut">
               <a:rPr lang="en-US" smtClean="0"/>
-              <a:t>10/30/2020</a:t>
+              <a:t>12/28/2020</a:t>
             </a:fld>
             <a:endParaRPr lang="en-US"/>
           </a:p>
@@ -1148,7 +1149,7 @@
           <a:p>
             <a:fld id="{11D67388-0790-496E-9A12-37055489AF4F}" type="datetimeFigureOut">
               <a:rPr lang="en-US" smtClean="0"/>
-              <a:t>10/30/2020</a:t>
+              <a:t>12/28/2020</a:t>
             </a:fld>
             <a:endParaRPr lang="en-US"/>
           </a:p>
@@ -1393,7 +1394,7 @@
           <a:p>
             <a:fld id="{11D67388-0790-496E-9A12-37055489AF4F}" type="datetimeFigureOut">
               <a:rPr lang="en-US" smtClean="0"/>
-              <a:t>10/30/2020</a:t>
+              <a:t>12/28/2020</a:t>
             </a:fld>
             <a:endParaRPr lang="en-US"/>
           </a:p>
@@ -1622,7 +1623,7 @@
           <a:p>
             <a:fld id="{11D67388-0790-496E-9A12-37055489AF4F}" type="datetimeFigureOut">
               <a:rPr lang="en-US" smtClean="0"/>
-              <a:t>10/30/2020</a:t>
+              <a:t>12/28/2020</a:t>
             </a:fld>
             <a:endParaRPr lang="en-US"/>
           </a:p>
@@ -1986,7 +1987,7 @@
           <a:p>
             <a:fld id="{11D67388-0790-496E-9A12-37055489AF4F}" type="datetimeFigureOut">
               <a:rPr lang="en-US" smtClean="0"/>
-              <a:t>10/30/2020</a:t>
+              <a:t>12/28/2020</a:t>
             </a:fld>
             <a:endParaRPr lang="en-US"/>
           </a:p>
@@ -2103,7 +2104,7 @@
           <a:p>
             <a:fld id="{11D67388-0790-496E-9A12-37055489AF4F}" type="datetimeFigureOut">
               <a:rPr lang="en-US" smtClean="0"/>
-              <a:t>10/30/2020</a:t>
+              <a:t>12/28/2020</a:t>
             </a:fld>
             <a:endParaRPr lang="en-US"/>
           </a:p>
@@ -2198,7 +2199,7 @@
           <a:p>
             <a:fld id="{11D67388-0790-496E-9A12-37055489AF4F}" type="datetimeFigureOut">
               <a:rPr lang="en-US" smtClean="0"/>
-              <a:t>10/30/2020</a:t>
+              <a:t>12/28/2020</a:t>
             </a:fld>
             <a:endParaRPr lang="en-US"/>
           </a:p>
@@ -2473,7 +2474,7 @@
           <a:p>
             <a:fld id="{11D67388-0790-496E-9A12-37055489AF4F}" type="datetimeFigureOut">
               <a:rPr lang="en-US" smtClean="0"/>
-              <a:t>10/30/2020</a:t>
+              <a:t>12/28/2020</a:t>
             </a:fld>
             <a:endParaRPr lang="en-US"/>
           </a:p>
@@ -2725,7 +2726,7 @@
           <a:p>
             <a:fld id="{11D67388-0790-496E-9A12-37055489AF4F}" type="datetimeFigureOut">
               <a:rPr lang="en-US" smtClean="0"/>
-              <a:t>10/30/2020</a:t>
+              <a:t>12/28/2020</a:t>
             </a:fld>
             <a:endParaRPr lang="en-US"/>
           </a:p>
@@ -2936,7 +2937,7 @@
           <a:p>
             <a:fld id="{11D67388-0790-496E-9A12-37055489AF4F}" type="datetimeFigureOut">
               <a:rPr lang="en-US" smtClean="0"/>
-              <a:t>10/30/2020</a:t>
+              <a:t>12/28/2020</a:t>
             </a:fld>
             <a:endParaRPr lang="en-US"/>
           </a:p>
@@ -11854,7 +11855,7 @@
           <a:p>
             <a:pPr algn="ctr"/>
             <a:r>
-              <a:rPr lang="en-US" b="1"/>
+              <a:rPr lang="en-US" b="1" dirty="0"/>
               <a:t>Combined Year Plots</a:t>
             </a:r>
           </a:p>
@@ -12066,6 +12067,198 @@
 </file>
 
 <file path=ppt/slides/slide35.xml><?xml version="1.0" encoding="utf-8"?>
+<p:sld xmlns:a="http://schemas.openxmlformats.org/drawingml/2006/main" xmlns:r="http://schemas.openxmlformats.org/officeDocument/2006/relationships" xmlns:p="http://schemas.openxmlformats.org/presentationml/2006/main">
+  <p:cSld>
+    <p:spTree>
+      <p:nvGrpSpPr>
+        <p:cNvPr id="1" name=""/>
+        <p:cNvGrpSpPr/>
+        <p:nvPr/>
+      </p:nvGrpSpPr>
+      <p:grpSpPr>
+        <a:xfrm>
+          <a:off x="0" y="0"/>
+          <a:ext cx="0" cy="0"/>
+          <a:chOff x="0" y="0"/>
+          <a:chExt cx="0" cy="0"/>
+        </a:xfrm>
+      </p:grpSpPr>
+      <p:sp>
+        <p:nvSpPr>
+          <p:cNvPr id="7" name="TextBox 6">
+            <a:extLst>
+              <a:ext uri="{FF2B5EF4-FFF2-40B4-BE49-F238E27FC236}">
+                <a16:creationId xmlns:a16="http://schemas.microsoft.com/office/drawing/2014/main" id="{A063DF1C-7DF0-40B4-AC9D-EC918B0CB000}"/>
+              </a:ext>
+            </a:extLst>
+          </p:cNvPr>
+          <p:cNvSpPr txBox="1"/>
+          <p:nvPr/>
+        </p:nvSpPr>
+        <p:spPr>
+          <a:xfrm>
+            <a:off x="192163" y="128664"/>
+            <a:ext cx="2066223" cy="369332"/>
+          </a:xfrm>
+          <a:prstGeom prst="rect">
+            <a:avLst/>
+          </a:prstGeom>
+          <a:noFill/>
+        </p:spPr>
+        <p:txBody>
+          <a:bodyPr wrap="square" rtlCol="0">
+            <a:spAutoFit/>
+          </a:bodyPr>
+          <a:lstStyle/>
+          <a:p>
+            <a:pPr algn="ctr"/>
+            <a:r>
+              <a:rPr lang="en-US" b="1" dirty="0"/>
+              <a:t>Numeric2Cat</a:t>
+            </a:r>
+          </a:p>
+        </p:txBody>
+      </p:sp>
+      <p:pic>
+        <p:nvPicPr>
+          <p:cNvPr id="3" name="Picture 2" descr="Map&#10;&#10;Description automatically generated">
+            <a:extLst>
+              <a:ext uri="{FF2B5EF4-FFF2-40B4-BE49-F238E27FC236}">
+                <a16:creationId xmlns:a16="http://schemas.microsoft.com/office/drawing/2014/main" id="{3B6F4D65-C9E5-4E0B-BB5A-0DF8509A29C0}"/>
+              </a:ext>
+            </a:extLst>
+          </p:cNvPr>
+          <p:cNvPicPr>
+            <a:picLocks noChangeAspect="1"/>
+          </p:cNvPicPr>
+          <p:nvPr/>
+        </p:nvPicPr>
+        <p:blipFill>
+          <a:blip r:embed="rId2" cstate="print">
+            <a:extLst>
+              <a:ext uri="{28A0092B-C50C-407E-A947-70E740481C1C}">
+                <a14:useLocalDpi xmlns:a14="http://schemas.microsoft.com/office/drawing/2010/main" val="0"/>
+              </a:ext>
+            </a:extLst>
+          </a:blip>
+          <a:stretch>
+            <a:fillRect/>
+          </a:stretch>
+        </p:blipFill>
+        <p:spPr>
+          <a:xfrm>
+            <a:off x="761658" y="1884222"/>
+            <a:ext cx="4661997" cy="2479231"/>
+          </a:xfrm>
+          <a:prstGeom prst="rect">
+            <a:avLst/>
+          </a:prstGeom>
+        </p:spPr>
+      </p:pic>
+      <p:pic>
+        <p:nvPicPr>
+          <p:cNvPr id="8" name="Picture 7" descr="Map&#10;&#10;Description automatically generated">
+            <a:extLst>
+              <a:ext uri="{FF2B5EF4-FFF2-40B4-BE49-F238E27FC236}">
+                <a16:creationId xmlns:a16="http://schemas.microsoft.com/office/drawing/2014/main" id="{7215B5F1-79F3-42C3-B624-349FA1CA4897}"/>
+              </a:ext>
+            </a:extLst>
+          </p:cNvPr>
+          <p:cNvPicPr>
+            <a:picLocks noChangeAspect="1"/>
+          </p:cNvPicPr>
+          <p:nvPr/>
+        </p:nvPicPr>
+        <p:blipFill>
+          <a:blip r:embed="rId3" cstate="print">
+            <a:extLst>
+              <a:ext uri="{28A0092B-C50C-407E-A947-70E740481C1C}">
+                <a14:useLocalDpi xmlns:a14="http://schemas.microsoft.com/office/drawing/2010/main" val="0"/>
+              </a:ext>
+            </a:extLst>
+          </a:blip>
+          <a:stretch>
+            <a:fillRect/>
+          </a:stretch>
+        </p:blipFill>
+        <p:spPr>
+          <a:xfrm>
+            <a:off x="5941833" y="1884222"/>
+            <a:ext cx="5522072" cy="2479231"/>
+          </a:xfrm>
+          <a:prstGeom prst="rect">
+            <a:avLst/>
+          </a:prstGeom>
+        </p:spPr>
+      </p:pic>
+      <p:sp>
+        <p:nvSpPr>
+          <p:cNvPr id="10" name="Rectangle 9">
+            <a:extLst>
+              <a:ext uri="{FF2B5EF4-FFF2-40B4-BE49-F238E27FC236}">
+                <a16:creationId xmlns:a16="http://schemas.microsoft.com/office/drawing/2014/main" id="{89B28590-6D43-4968-A021-CF2493679ADD}"/>
+              </a:ext>
+            </a:extLst>
+          </p:cNvPr>
+          <p:cNvSpPr/>
+          <p:nvPr/>
+        </p:nvSpPr>
+        <p:spPr>
+          <a:xfrm>
+            <a:off x="409073" y="1608221"/>
+            <a:ext cx="11285621" cy="3104147"/>
+          </a:xfrm>
+          <a:prstGeom prst="rect">
+            <a:avLst/>
+          </a:prstGeom>
+          <a:noFill/>
+          <a:ln>
+            <a:solidFill>
+              <a:schemeClr val="bg1">
+                <a:lumMod val="65000"/>
+              </a:schemeClr>
+            </a:solidFill>
+          </a:ln>
+        </p:spPr>
+        <p:style>
+          <a:lnRef idx="2">
+            <a:schemeClr val="accent1">
+              <a:shade val="50000"/>
+            </a:schemeClr>
+          </a:lnRef>
+          <a:fillRef idx="1">
+            <a:schemeClr val="accent1"/>
+          </a:fillRef>
+          <a:effectRef idx="0">
+            <a:schemeClr val="accent1"/>
+          </a:effectRef>
+          <a:fontRef idx="minor">
+            <a:schemeClr val="lt1"/>
+          </a:fontRef>
+        </p:style>
+        <p:txBody>
+          <a:bodyPr rtlCol="0" anchor="ctr"/>
+          <a:lstStyle/>
+          <a:p>
+            <a:pPr algn="ctr"/>
+            <a:endParaRPr lang="en-US"/>
+          </a:p>
+        </p:txBody>
+      </p:sp>
+    </p:spTree>
+    <p:extLst>
+      <p:ext uri="{BB962C8B-B14F-4D97-AF65-F5344CB8AC3E}">
+        <p14:creationId xmlns:p14="http://schemas.microsoft.com/office/powerpoint/2010/main" val="859117162"/>
+      </p:ext>
+    </p:extLst>
+  </p:cSld>
+  <p:clrMapOvr>
+    <a:masterClrMapping/>
+  </p:clrMapOvr>
+</p:sld>
+</file>
+
+<file path=ppt/slides/slide36.xml><?xml version="1.0" encoding="utf-8"?>
 <p:sld xmlns:a="http://schemas.openxmlformats.org/drawingml/2006/main" xmlns:r="http://schemas.openxmlformats.org/officeDocument/2006/relationships" xmlns:p="http://schemas.openxmlformats.org/presentationml/2006/main">
   <p:cSld>
     <p:spTree>
@@ -13550,7 +13743,7 @@
 </p:sld>
 </file>
 
-<file path=ppt/slides/slide36.xml><?xml version="1.0" encoding="utf-8"?>
+<file path=ppt/slides/slide37.xml><?xml version="1.0" encoding="utf-8"?>
 <p:sld xmlns:a="http://schemas.openxmlformats.org/drawingml/2006/main" xmlns:r="http://schemas.openxmlformats.org/officeDocument/2006/relationships" xmlns:p="http://schemas.openxmlformats.org/presentationml/2006/main">
   <p:cSld>
     <p:spTree>
@@ -14051,7 +14244,7 @@
 </p:sld>
 </file>
 
-<file path=ppt/slides/slide37.xml><?xml version="1.0" encoding="utf-8"?>
+<file path=ppt/slides/slide38.xml><?xml version="1.0" encoding="utf-8"?>
 <p:sld xmlns:a="http://schemas.openxmlformats.org/drawingml/2006/main" xmlns:r="http://schemas.openxmlformats.org/officeDocument/2006/relationships" xmlns:p="http://schemas.openxmlformats.org/presentationml/2006/main">
   <p:cSld>
     <p:spTree>
@@ -14315,7 +14508,7 @@
 </p:sld>
 </file>
 
-<file path=ppt/slides/slide38.xml><?xml version="1.0" encoding="utf-8"?>
+<file path=ppt/slides/slide39.xml><?xml version="1.0" encoding="utf-8"?>
 <p:sld xmlns:a="http://schemas.openxmlformats.org/drawingml/2006/main" xmlns:r="http://schemas.openxmlformats.org/officeDocument/2006/relationships" xmlns:p="http://schemas.openxmlformats.org/presentationml/2006/main">
   <p:cSld>
     <p:spTree>
@@ -14372,7 +14565,1053 @@
 </p:sld>
 </file>
 
-<file path=ppt/slides/slide39.xml><?xml version="1.0" encoding="utf-8"?>
+<file path=ppt/slides/slide4.xml><?xml version="1.0" encoding="utf-8"?>
+<p:sld xmlns:a="http://schemas.openxmlformats.org/drawingml/2006/main" xmlns:r="http://schemas.openxmlformats.org/officeDocument/2006/relationships" xmlns:p="http://schemas.openxmlformats.org/presentationml/2006/main">
+  <p:cSld>
+    <p:spTree>
+      <p:nvGrpSpPr>
+        <p:cNvPr id="1" name=""/>
+        <p:cNvGrpSpPr/>
+        <p:nvPr/>
+      </p:nvGrpSpPr>
+      <p:grpSpPr>
+        <a:xfrm>
+          <a:off x="0" y="0"/>
+          <a:ext cx="0" cy="0"/>
+          <a:chOff x="0" y="0"/>
+          <a:chExt cx="0" cy="0"/>
+        </a:xfrm>
+      </p:grpSpPr>
+      <p:sp>
+        <p:nvSpPr>
+          <p:cNvPr id="6" name="TextBox 5">
+            <a:extLst>
+              <a:ext uri="{FF2B5EF4-FFF2-40B4-BE49-F238E27FC236}">
+                <a16:creationId xmlns:a16="http://schemas.microsoft.com/office/drawing/2014/main" id="{770E9E06-5F46-4A20-920E-2473B2FB3AF0}"/>
+              </a:ext>
+            </a:extLst>
+          </p:cNvPr>
+          <p:cNvSpPr txBox="1"/>
+          <p:nvPr/>
+        </p:nvSpPr>
+        <p:spPr>
+          <a:xfrm>
+            <a:off x="677207" y="522579"/>
+            <a:ext cx="2216370" cy="4429995"/>
+          </a:xfrm>
+          <a:prstGeom prst="rect">
+            <a:avLst/>
+          </a:prstGeom>
+          <a:noFill/>
+        </p:spPr>
+        <p:txBody>
+          <a:bodyPr wrap="square" rtlCol="0">
+            <a:spAutoFit/>
+          </a:bodyPr>
+          <a:lstStyle>
+            <a:defPPr>
+              <a:defRPr lang="en-US"/>
+            </a:defPPr>
+            <a:lvl1pPr>
+              <a:lnSpc>
+                <a:spcPct val="150000"/>
+              </a:lnSpc>
+              <a:defRPr sz="900">
+                <a:latin typeface="Consolas" panose="020B0609020204030204" pitchFamily="49" charset="0"/>
+              </a:defRPr>
+            </a:lvl1pPr>
+          </a:lstStyle>
+          <a:p>
+            <a:pPr algn="ctr"/>
+            <a:r>
+              <a:rPr lang="en-US" altLang="en-US" sz="1050" b="1" u="sng">
+                <a:latin typeface="+mn-lt"/>
+              </a:rPr>
+              <a:t>electricity</a:t>
+            </a:r>
+          </a:p>
+          <a:p>
+            <a:pPr marL="171450" indent="-171450">
+              <a:buFont typeface="Arial" panose="020B0604020202020204" pitchFamily="34" charset="0"/>
+              <a:buChar char="•"/>
+            </a:pPr>
+            <a:r>
+              <a:rPr lang="en-US" altLang="en-US" sz="1050">
+                <a:latin typeface="+mn-lt"/>
+              </a:rPr>
+              <a:t>elecByTechTWh</a:t>
+            </a:r>
+          </a:p>
+          <a:p>
+            <a:pPr marL="171450" indent="-171450">
+              <a:buFont typeface="Arial" panose="020B0604020202020204" pitchFamily="34" charset="0"/>
+              <a:buChar char="•"/>
+            </a:pPr>
+            <a:r>
+              <a:rPr lang="en-US" altLang="en-US" sz="1050">
+                <a:latin typeface="+mn-lt"/>
+              </a:rPr>
+              <a:t>elecCapByFuel</a:t>
+            </a:r>
+          </a:p>
+          <a:p>
+            <a:pPr marL="171450" indent="-171450">
+              <a:buFont typeface="Arial" panose="020B0604020202020204" pitchFamily="34" charset="0"/>
+              <a:buChar char="•"/>
+            </a:pPr>
+            <a:r>
+              <a:rPr lang="en-US" altLang="en-US" sz="1050">
+                <a:latin typeface="+mn-lt"/>
+              </a:rPr>
+              <a:t>elecFinalBySecTWh</a:t>
+            </a:r>
+          </a:p>
+          <a:p>
+            <a:pPr marL="171450" indent="-171450">
+              <a:buFont typeface="Arial" panose="020B0604020202020204" pitchFamily="34" charset="0"/>
+              <a:buChar char="•"/>
+            </a:pPr>
+            <a:r>
+              <a:rPr lang="en-US" altLang="en-US" sz="1050">
+                <a:latin typeface="+mn-lt"/>
+              </a:rPr>
+              <a:t>elecFinalByFuelTWh</a:t>
+            </a:r>
+          </a:p>
+          <a:p>
+            <a:pPr marL="171450" indent="-171450">
+              <a:buFont typeface="Arial" panose="020B0604020202020204" pitchFamily="34" charset="0"/>
+              <a:buChar char="•"/>
+            </a:pPr>
+            <a:r>
+              <a:rPr lang="en-US" altLang="en-US" sz="1050">
+                <a:latin typeface="+mn-lt"/>
+              </a:rPr>
+              <a:t>elecNewCapCost</a:t>
+            </a:r>
+          </a:p>
+          <a:p>
+            <a:pPr marL="171450" indent="-171450">
+              <a:buFont typeface="Arial" panose="020B0604020202020204" pitchFamily="34" charset="0"/>
+              <a:buChar char="•"/>
+            </a:pPr>
+            <a:r>
+              <a:rPr lang="en-US" altLang="en-US" sz="1050">
+                <a:latin typeface="+mn-lt"/>
+              </a:rPr>
+              <a:t>elecNewCapGW</a:t>
+            </a:r>
+          </a:p>
+          <a:p>
+            <a:pPr marL="171450" indent="-171450">
+              <a:buFont typeface="Arial" panose="020B0604020202020204" pitchFamily="34" charset="0"/>
+              <a:buChar char="•"/>
+            </a:pPr>
+            <a:r>
+              <a:rPr lang="en-US" altLang="en-US" sz="1050">
+                <a:latin typeface="+mn-lt"/>
+              </a:rPr>
+              <a:t>elecAnnualRetPrematureCost</a:t>
+            </a:r>
+          </a:p>
+          <a:p>
+            <a:pPr marL="171450" indent="-171450">
+              <a:buFont typeface="Arial" panose="020B0604020202020204" pitchFamily="34" charset="0"/>
+              <a:buChar char="•"/>
+            </a:pPr>
+            <a:r>
+              <a:rPr lang="en-US" altLang="en-US" sz="1050">
+                <a:latin typeface="+mn-lt"/>
+              </a:rPr>
+              <a:t>elecAnnualRetPrematureGW</a:t>
+            </a:r>
+          </a:p>
+          <a:p>
+            <a:pPr marL="171450" indent="-171450">
+              <a:buFont typeface="Arial" panose="020B0604020202020204" pitchFamily="34" charset="0"/>
+              <a:buChar char="•"/>
+            </a:pPr>
+            <a:r>
+              <a:rPr lang="en-US" altLang="en-US" sz="1050">
+                <a:latin typeface="+mn-lt"/>
+              </a:rPr>
+              <a:t>elecCumCapCost</a:t>
+            </a:r>
+          </a:p>
+          <a:p>
+            <a:pPr marL="171450" indent="-171450">
+              <a:buFont typeface="Arial" panose="020B0604020202020204" pitchFamily="34" charset="0"/>
+              <a:buChar char="•"/>
+            </a:pPr>
+            <a:r>
+              <a:rPr lang="en-US" altLang="en-US" sz="1050">
+                <a:latin typeface="+mn-lt"/>
+              </a:rPr>
+              <a:t>elecCumCapGW</a:t>
+            </a:r>
+          </a:p>
+          <a:p>
+            <a:pPr marL="171450" indent="-171450">
+              <a:buFont typeface="Arial" panose="020B0604020202020204" pitchFamily="34" charset="0"/>
+              <a:buChar char="•"/>
+            </a:pPr>
+            <a:r>
+              <a:rPr lang="en-US" altLang="en-US" sz="1050">
+                <a:latin typeface="+mn-lt"/>
+              </a:rPr>
+              <a:t>elecCumRetPrematureCost</a:t>
+            </a:r>
+          </a:p>
+          <a:p>
+            <a:pPr marL="171450" indent="-171450">
+              <a:buFont typeface="Arial" panose="020B0604020202020204" pitchFamily="34" charset="0"/>
+              <a:buChar char="•"/>
+            </a:pPr>
+            <a:r>
+              <a:rPr lang="en-US" altLang="en-US" sz="1050">
+                <a:latin typeface="+mn-lt"/>
+              </a:rPr>
+              <a:t>elecCumRetPrematureGW</a:t>
+            </a:r>
+          </a:p>
+          <a:p>
+            <a:pPr algn="ctr"/>
+            <a:r>
+              <a:rPr lang="en-US" altLang="en-US" sz="1050" b="1" u="sng">
+                <a:latin typeface="+mn-lt"/>
+              </a:rPr>
+              <a:t>transport</a:t>
+            </a:r>
+          </a:p>
+          <a:p>
+            <a:pPr marL="171450" indent="-171450">
+              <a:buFont typeface="Arial" panose="020B0604020202020204" pitchFamily="34" charset="0"/>
+              <a:buChar char="•"/>
+            </a:pPr>
+            <a:r>
+              <a:rPr lang="en-US" altLang="en-US" sz="1050">
+                <a:latin typeface="+mn-lt"/>
+              </a:rPr>
+              <a:t>transportPassengerVMTByMode</a:t>
+            </a:r>
+          </a:p>
+          <a:p>
+            <a:pPr marL="171450" indent="-171450">
+              <a:buFont typeface="Arial" panose="020B0604020202020204" pitchFamily="34" charset="0"/>
+              <a:buChar char="•"/>
+            </a:pPr>
+            <a:r>
+              <a:rPr lang="en-US" altLang="en-US" sz="1050">
+                <a:latin typeface="+mn-lt"/>
+              </a:rPr>
+              <a:t>transportFreightVMTByMode</a:t>
+            </a:r>
+          </a:p>
+          <a:p>
+            <a:pPr marL="171450" indent="-171450">
+              <a:buFont typeface="Arial" panose="020B0604020202020204" pitchFamily="34" charset="0"/>
+              <a:buChar char="•"/>
+            </a:pPr>
+            <a:r>
+              <a:rPr lang="en-US" altLang="en-US" sz="1050">
+                <a:latin typeface="+mn-lt"/>
+              </a:rPr>
+              <a:t>transportPassengerVMTByFuel</a:t>
+            </a:r>
+          </a:p>
+          <a:p>
+            <a:pPr marL="171450" indent="-171450">
+              <a:buFont typeface="Arial" panose="020B0604020202020204" pitchFamily="34" charset="0"/>
+              <a:buChar char="•"/>
+            </a:pPr>
+            <a:r>
+              <a:rPr lang="en-US" altLang="en-US" sz="1050">
+                <a:latin typeface="+mn-lt"/>
+              </a:rPr>
+              <a:t>transportFreightVMTByFuel</a:t>
+            </a:r>
+          </a:p>
+        </p:txBody>
+      </p:sp>
+      <p:sp>
+        <p:nvSpPr>
+          <p:cNvPr id="7" name="TextBox 6">
+            <a:extLst>
+              <a:ext uri="{FF2B5EF4-FFF2-40B4-BE49-F238E27FC236}">
+                <a16:creationId xmlns:a16="http://schemas.microsoft.com/office/drawing/2014/main" id="{08849C20-7534-4CC1-AE72-789DE7D498D4}"/>
+              </a:ext>
+            </a:extLst>
+          </p:cNvPr>
+          <p:cNvSpPr txBox="1"/>
+          <p:nvPr/>
+        </p:nvSpPr>
+        <p:spPr>
+          <a:xfrm>
+            <a:off x="3772467" y="522579"/>
+            <a:ext cx="2216370" cy="5884240"/>
+          </a:xfrm>
+          <a:prstGeom prst="rect">
+            <a:avLst/>
+          </a:prstGeom>
+          <a:noFill/>
+        </p:spPr>
+        <p:txBody>
+          <a:bodyPr wrap="square" rtlCol="0">
+            <a:spAutoFit/>
+          </a:bodyPr>
+          <a:lstStyle>
+            <a:defPPr>
+              <a:defRPr lang="en-US"/>
+            </a:defPPr>
+            <a:lvl1pPr>
+              <a:lnSpc>
+                <a:spcPct val="150000"/>
+              </a:lnSpc>
+              <a:defRPr sz="900">
+                <a:latin typeface="Consolas" panose="020B0609020204030204" pitchFamily="49" charset="0"/>
+              </a:defRPr>
+            </a:lvl1pPr>
+          </a:lstStyle>
+          <a:p>
+            <a:pPr algn="ctr"/>
+            <a:r>
+              <a:rPr lang="en-US" altLang="en-US" sz="1050" b="1" u="sng">
+                <a:latin typeface="+mn-lt"/>
+              </a:rPr>
+              <a:t>socioecon</a:t>
+            </a:r>
+          </a:p>
+          <a:p>
+            <a:pPr marL="171450" indent="-171450">
+              <a:buFont typeface="Arial" panose="020B0604020202020204" pitchFamily="34" charset="0"/>
+              <a:buChar char="•"/>
+            </a:pPr>
+            <a:r>
+              <a:rPr lang="en-US" altLang="en-US" sz="1050">
+                <a:latin typeface="+mn-lt"/>
+              </a:rPr>
+              <a:t>gdpPerCapita</a:t>
+            </a:r>
+          </a:p>
+          <a:p>
+            <a:pPr marL="171450" indent="-171450">
+              <a:buFont typeface="Arial" panose="020B0604020202020204" pitchFamily="34" charset="0"/>
+              <a:buChar char="•"/>
+            </a:pPr>
+            <a:r>
+              <a:rPr lang="en-US" altLang="en-US" sz="1050">
+                <a:latin typeface="+mn-lt"/>
+              </a:rPr>
+              <a:t>gdp</a:t>
+            </a:r>
+          </a:p>
+          <a:p>
+            <a:pPr marL="171450" indent="-171450">
+              <a:buFont typeface="Arial" panose="020B0604020202020204" pitchFamily="34" charset="0"/>
+              <a:buChar char="•"/>
+            </a:pPr>
+            <a:r>
+              <a:rPr lang="en-US" altLang="en-US" sz="1050">
+                <a:latin typeface="+mn-lt"/>
+              </a:rPr>
+              <a:t>gdpGrowthRate</a:t>
+            </a:r>
+          </a:p>
+          <a:p>
+            <a:pPr marL="171450" indent="-171450">
+              <a:buFont typeface="Arial" panose="020B0604020202020204" pitchFamily="34" charset="0"/>
+              <a:buChar char="•"/>
+            </a:pPr>
+            <a:r>
+              <a:rPr lang="en-US" altLang="en-US" sz="1050">
+                <a:latin typeface="+mn-lt"/>
+              </a:rPr>
+              <a:t>pop</a:t>
+            </a:r>
+          </a:p>
+          <a:p>
+            <a:pPr algn="ctr"/>
+            <a:r>
+              <a:rPr lang="en-US" altLang="en-US" sz="1050" b="1" u="sng">
+                <a:latin typeface="+mn-lt"/>
+              </a:rPr>
+              <a:t>ag</a:t>
+            </a:r>
+          </a:p>
+          <a:p>
+            <a:pPr marL="171450" indent="-171450">
+              <a:buFont typeface="Arial" panose="020B0604020202020204" pitchFamily="34" charset="0"/>
+              <a:buChar char="•"/>
+            </a:pPr>
+            <a:r>
+              <a:rPr lang="en-US" altLang="en-US" sz="1050">
+                <a:latin typeface="+mn-lt"/>
+              </a:rPr>
+              <a:t>agProdbyIrrRfd</a:t>
+            </a:r>
+          </a:p>
+          <a:p>
+            <a:pPr marL="171450" indent="-171450">
+              <a:buFont typeface="Arial" panose="020B0604020202020204" pitchFamily="34" charset="0"/>
+              <a:buChar char="•"/>
+            </a:pPr>
+            <a:r>
+              <a:rPr lang="en-US" altLang="en-US" sz="1050">
+                <a:latin typeface="+mn-lt"/>
+              </a:rPr>
+              <a:t>agProdBiomass</a:t>
+            </a:r>
+          </a:p>
+          <a:p>
+            <a:pPr marL="171450" indent="-171450">
+              <a:buFont typeface="Arial" panose="020B0604020202020204" pitchFamily="34" charset="0"/>
+              <a:buChar char="•"/>
+            </a:pPr>
+            <a:r>
+              <a:rPr lang="en-US" altLang="en-US" sz="1050">
+                <a:latin typeface="+mn-lt"/>
+              </a:rPr>
+              <a:t>agProdForest</a:t>
+            </a:r>
+          </a:p>
+          <a:p>
+            <a:pPr marL="171450" indent="-171450">
+              <a:buFont typeface="Arial" panose="020B0604020202020204" pitchFamily="34" charset="0"/>
+              <a:buChar char="•"/>
+            </a:pPr>
+            <a:r>
+              <a:rPr lang="en-US" altLang="en-US" sz="1050">
+                <a:latin typeface="+mn-lt"/>
+              </a:rPr>
+              <a:t>agProdByCrop</a:t>
+            </a:r>
+          </a:p>
+          <a:p>
+            <a:pPr algn="ctr"/>
+            <a:r>
+              <a:rPr lang="en-US" altLang="en-US" sz="1050" b="1" u="sng">
+                <a:latin typeface="+mn-lt"/>
+              </a:rPr>
+              <a:t>livestock</a:t>
+            </a:r>
+          </a:p>
+          <a:p>
+            <a:pPr marL="171450" indent="-171450">
+              <a:buFont typeface="Arial" panose="020B0604020202020204" pitchFamily="34" charset="0"/>
+              <a:buChar char="•"/>
+            </a:pPr>
+            <a:r>
+              <a:rPr lang="en-US" altLang="en-US" sz="1050">
+                <a:latin typeface="+mn-lt"/>
+              </a:rPr>
+              <a:t>livestock_MeatDairybyTechMixed</a:t>
+            </a:r>
+          </a:p>
+          <a:p>
+            <a:pPr marL="171450" indent="-171450">
+              <a:buFont typeface="Arial" panose="020B0604020202020204" pitchFamily="34" charset="0"/>
+              <a:buChar char="•"/>
+            </a:pPr>
+            <a:r>
+              <a:rPr lang="en-US" altLang="en-US" sz="1050">
+                <a:latin typeface="+mn-lt"/>
+              </a:rPr>
+              <a:t>livestock_MeatDairybyTechPastoral</a:t>
+            </a:r>
+          </a:p>
+          <a:p>
+            <a:pPr marL="171450" indent="-171450">
+              <a:buFont typeface="Arial" panose="020B0604020202020204" pitchFamily="34" charset="0"/>
+              <a:buChar char="•"/>
+            </a:pPr>
+            <a:r>
+              <a:rPr lang="en-US" altLang="en-US" sz="1050">
+                <a:latin typeface="+mn-lt"/>
+              </a:rPr>
+              <a:t>livestock_MeatDairybyTechImports</a:t>
+            </a:r>
+          </a:p>
+          <a:p>
+            <a:pPr marL="171450" indent="-171450">
+              <a:buFont typeface="Arial" panose="020B0604020202020204" pitchFamily="34" charset="0"/>
+              <a:buChar char="•"/>
+            </a:pPr>
+            <a:r>
+              <a:rPr lang="en-US" altLang="en-US" sz="1050">
+                <a:latin typeface="+mn-lt"/>
+              </a:rPr>
+              <a:t>livestock_MeatDairybySubsector</a:t>
+            </a:r>
+          </a:p>
+          <a:p>
+            <a:pPr algn="ctr"/>
+            <a:r>
+              <a:rPr lang="en-US" altLang="en-US" sz="1050" b="1" u="sng">
+                <a:latin typeface="+mn-lt"/>
+              </a:rPr>
+              <a:t>land</a:t>
+            </a:r>
+          </a:p>
+          <a:p>
+            <a:pPr marL="171450" indent="-171450">
+              <a:buFont typeface="Arial" panose="020B0604020202020204" pitchFamily="34" charset="0"/>
+              <a:buChar char="•"/>
+            </a:pPr>
+            <a:r>
+              <a:rPr lang="en-US" altLang="en-US" sz="1050">
+                <a:latin typeface="+mn-lt"/>
+              </a:rPr>
+              <a:t>landIrrRfd</a:t>
+            </a:r>
+          </a:p>
+          <a:p>
+            <a:pPr marL="171450" indent="-171450">
+              <a:buFont typeface="Arial" panose="020B0604020202020204" pitchFamily="34" charset="0"/>
+              <a:buChar char="•"/>
+            </a:pPr>
+            <a:r>
+              <a:rPr lang="en-US" altLang="en-US" sz="1050">
+                <a:latin typeface="+mn-lt"/>
+              </a:rPr>
+              <a:t>landIrrCrop</a:t>
+            </a:r>
+          </a:p>
+          <a:p>
+            <a:pPr marL="171450" indent="-171450">
+              <a:buFont typeface="Arial" panose="020B0604020202020204" pitchFamily="34" charset="0"/>
+              <a:buChar char="•"/>
+            </a:pPr>
+            <a:r>
+              <a:rPr lang="en-US" altLang="en-US" sz="1050">
+                <a:latin typeface="+mn-lt"/>
+              </a:rPr>
+              <a:t>landRfdCrop</a:t>
+            </a:r>
+          </a:p>
+          <a:p>
+            <a:pPr marL="171450" indent="-171450">
+              <a:buFont typeface="Arial" panose="020B0604020202020204" pitchFamily="34" charset="0"/>
+              <a:buChar char="•"/>
+            </a:pPr>
+            <a:r>
+              <a:rPr lang="en-US" altLang="en-US" sz="1050">
+                <a:latin typeface="+mn-lt"/>
+              </a:rPr>
+              <a:t>landAlloc</a:t>
+            </a:r>
+          </a:p>
+          <a:p>
+            <a:pPr marL="171450" indent="-171450">
+              <a:buFont typeface="Arial" panose="020B0604020202020204" pitchFamily="34" charset="0"/>
+              <a:buChar char="•"/>
+            </a:pPr>
+            <a:r>
+              <a:rPr lang="en-US" altLang="en-US" sz="1050">
+                <a:latin typeface="+mn-lt"/>
+              </a:rPr>
+              <a:t>landAllocByCrop</a:t>
+            </a:r>
+          </a:p>
+          <a:p>
+            <a:pPr algn="ctr"/>
+            <a:endParaRPr lang="en-US" altLang="en-US" sz="1050">
+              <a:latin typeface="+mn-lt"/>
+            </a:endParaRPr>
+          </a:p>
+        </p:txBody>
+      </p:sp>
+      <p:sp>
+        <p:nvSpPr>
+          <p:cNvPr id="8" name="TextBox 7">
+            <a:extLst>
+              <a:ext uri="{FF2B5EF4-FFF2-40B4-BE49-F238E27FC236}">
+                <a16:creationId xmlns:a16="http://schemas.microsoft.com/office/drawing/2014/main" id="{8585856F-0683-439B-927B-E2E8AD4AA13F}"/>
+              </a:ext>
+            </a:extLst>
+          </p:cNvPr>
+          <p:cNvSpPr txBox="1"/>
+          <p:nvPr/>
+        </p:nvSpPr>
+        <p:spPr>
+          <a:xfrm>
+            <a:off x="6867727" y="522579"/>
+            <a:ext cx="2216370" cy="4429995"/>
+          </a:xfrm>
+          <a:prstGeom prst="rect">
+            <a:avLst/>
+          </a:prstGeom>
+          <a:noFill/>
+        </p:spPr>
+        <p:txBody>
+          <a:bodyPr wrap="square" rtlCol="0">
+            <a:spAutoFit/>
+          </a:bodyPr>
+          <a:lstStyle>
+            <a:defPPr>
+              <a:defRPr lang="en-US"/>
+            </a:defPPr>
+            <a:lvl1pPr>
+              <a:lnSpc>
+                <a:spcPct val="150000"/>
+              </a:lnSpc>
+              <a:defRPr sz="900">
+                <a:latin typeface="Consolas" panose="020B0609020204030204" pitchFamily="49" charset="0"/>
+              </a:defRPr>
+            </a:lvl1pPr>
+          </a:lstStyle>
+          <a:p>
+            <a:pPr algn="ctr"/>
+            <a:r>
+              <a:rPr lang="en-US" altLang="en-US" sz="1050" b="1" u="sng">
+                <a:latin typeface="+mn-lt"/>
+              </a:rPr>
+              <a:t>emissions</a:t>
+            </a:r>
+          </a:p>
+          <a:p>
+            <a:pPr marL="171450" indent="-171450">
+              <a:buFont typeface="Arial" panose="020B0604020202020204" pitchFamily="34" charset="0"/>
+              <a:buChar char="•"/>
+            </a:pPr>
+            <a:r>
+              <a:rPr lang="en-US" altLang="en-US" sz="1050">
+                <a:latin typeface="+mn-lt"/>
+              </a:rPr>
+              <a:t>emissNonCO2BySectorGWPAR5</a:t>
+            </a:r>
+          </a:p>
+          <a:p>
+            <a:pPr marL="171450" indent="-171450">
+              <a:buFont typeface="Arial" panose="020B0604020202020204" pitchFamily="34" charset="0"/>
+              <a:buChar char="•"/>
+            </a:pPr>
+            <a:r>
+              <a:rPr lang="en-US" altLang="en-US" sz="1050">
+                <a:latin typeface="+mn-lt"/>
+              </a:rPr>
+              <a:t>emissNonCO2BySectorGTPAR5</a:t>
+            </a:r>
+          </a:p>
+          <a:p>
+            <a:pPr marL="171450" indent="-171450">
+              <a:buFont typeface="Arial" panose="020B0604020202020204" pitchFamily="34" charset="0"/>
+              <a:buChar char="•"/>
+            </a:pPr>
+            <a:r>
+              <a:rPr lang="en-US" altLang="en-US" sz="1050">
+                <a:latin typeface="+mn-lt"/>
+              </a:rPr>
+              <a:t>emissNonCO2BySectorOrigUnits</a:t>
+            </a:r>
+          </a:p>
+          <a:p>
+            <a:pPr marL="171450" indent="-171450">
+              <a:buFont typeface="Arial" panose="020B0604020202020204" pitchFamily="34" charset="0"/>
+              <a:buChar char="•"/>
+            </a:pPr>
+            <a:r>
+              <a:rPr lang="en-US" altLang="en-US" sz="1050">
+                <a:latin typeface="+mn-lt"/>
+              </a:rPr>
+              <a:t>emissLUC</a:t>
+            </a:r>
+          </a:p>
+          <a:p>
+            <a:pPr marL="171450" indent="-171450">
+              <a:buFont typeface="Arial" panose="020B0604020202020204" pitchFamily="34" charset="0"/>
+              <a:buChar char="•"/>
+            </a:pPr>
+            <a:r>
+              <a:rPr lang="en-US" altLang="en-US" sz="1050">
+                <a:latin typeface="+mn-lt"/>
+              </a:rPr>
+              <a:t>emissCO2BySectorNoBio</a:t>
+            </a:r>
+          </a:p>
+          <a:p>
+            <a:pPr marL="171450" indent="-171450">
+              <a:buFont typeface="Arial" panose="020B0604020202020204" pitchFamily="34" charset="0"/>
+              <a:buChar char="•"/>
+            </a:pPr>
+            <a:r>
+              <a:rPr lang="en-US" altLang="en-US" sz="1050">
+                <a:latin typeface="+mn-lt"/>
+              </a:rPr>
+              <a:t>emissNonCO2ByResProdGWPAR5</a:t>
+            </a:r>
+          </a:p>
+          <a:p>
+            <a:pPr marL="171450" indent="-171450">
+              <a:buFont typeface="Arial" panose="020B0604020202020204" pitchFamily="34" charset="0"/>
+              <a:buChar char="•"/>
+            </a:pPr>
+            <a:r>
+              <a:rPr lang="en-US" altLang="en-US" sz="1050">
+                <a:latin typeface="+mn-lt"/>
+              </a:rPr>
+              <a:t>emissMethaneBySourceGWPAR5</a:t>
+            </a:r>
+          </a:p>
+          <a:p>
+            <a:pPr marL="171450" indent="-171450">
+              <a:buFont typeface="Arial" panose="020B0604020202020204" pitchFamily="34" charset="0"/>
+              <a:buChar char="•"/>
+            </a:pPr>
+            <a:r>
+              <a:rPr lang="en-US" altLang="en-US" sz="1050">
+                <a:latin typeface="+mn-lt"/>
+              </a:rPr>
+              <a:t>emissByGasGWPAR5FFI</a:t>
+            </a:r>
+          </a:p>
+          <a:p>
+            <a:pPr marL="171450" indent="-171450">
+              <a:buFont typeface="Arial" panose="020B0604020202020204" pitchFamily="34" charset="0"/>
+              <a:buChar char="•"/>
+            </a:pPr>
+            <a:r>
+              <a:rPr lang="en-US" altLang="en-US" sz="1050">
+                <a:latin typeface="+mn-lt"/>
+              </a:rPr>
+              <a:t>emissByGasGWPAR5LUC</a:t>
+            </a:r>
+          </a:p>
+          <a:p>
+            <a:pPr marL="171450" indent="-171450">
+              <a:buFont typeface="Arial" panose="020B0604020202020204" pitchFamily="34" charset="0"/>
+              <a:buChar char="•"/>
+            </a:pPr>
+            <a:r>
+              <a:rPr lang="en-US" altLang="en-US" sz="1050">
+                <a:latin typeface="+mn-lt"/>
+              </a:rPr>
+              <a:t>emissBySectorGWPAR5FFI</a:t>
+            </a:r>
+          </a:p>
+          <a:p>
+            <a:pPr marL="171450" indent="-171450">
+              <a:buFont typeface="Arial" panose="020B0604020202020204" pitchFamily="34" charset="0"/>
+              <a:buChar char="•"/>
+            </a:pPr>
+            <a:r>
+              <a:rPr lang="en-US" altLang="en-US" sz="1050">
+                <a:latin typeface="+mn-lt"/>
+              </a:rPr>
+              <a:t>emissBySectorGWPAR5LUC</a:t>
+            </a:r>
+          </a:p>
+          <a:p>
+            <a:pPr marL="171450" indent="-171450">
+              <a:buFont typeface="Arial" panose="020B0604020202020204" pitchFamily="34" charset="0"/>
+              <a:buChar char="•"/>
+            </a:pPr>
+            <a:r>
+              <a:rPr lang="en-US" altLang="en-US" sz="1050">
+                <a:latin typeface="+mn-lt"/>
+              </a:rPr>
+              <a:t>emissNonCO2ByResProdGTPAR5</a:t>
+            </a:r>
+          </a:p>
+          <a:p>
+            <a:pPr marL="171450" indent="-171450">
+              <a:buFont typeface="Arial" panose="020B0604020202020204" pitchFamily="34" charset="0"/>
+              <a:buChar char="•"/>
+            </a:pPr>
+            <a:r>
+              <a:rPr lang="en-US" altLang="en-US" sz="1050">
+                <a:latin typeface="+mn-lt"/>
+              </a:rPr>
+              <a:t>emissMethaneBySourceGTPAR5</a:t>
+            </a:r>
+          </a:p>
+          <a:p>
+            <a:pPr marL="171450" indent="-171450">
+              <a:buFont typeface="Arial" panose="020B0604020202020204" pitchFamily="34" charset="0"/>
+              <a:buChar char="•"/>
+            </a:pPr>
+            <a:r>
+              <a:rPr lang="en-US" altLang="en-US" sz="1050">
+                <a:latin typeface="+mn-lt"/>
+              </a:rPr>
+              <a:t>emissByGasGTPAR5FFI</a:t>
+            </a:r>
+          </a:p>
+          <a:p>
+            <a:pPr marL="171450" indent="-171450">
+              <a:buFont typeface="Arial" panose="020B0604020202020204" pitchFamily="34" charset="0"/>
+              <a:buChar char="•"/>
+            </a:pPr>
+            <a:r>
+              <a:rPr lang="en-US" altLang="en-US" sz="1050">
+                <a:latin typeface="+mn-lt"/>
+              </a:rPr>
+              <a:t>emissByGasGTPAR5LUC</a:t>
+            </a:r>
+          </a:p>
+          <a:p>
+            <a:pPr marL="171450" indent="-171450">
+              <a:buFont typeface="Arial" panose="020B0604020202020204" pitchFamily="34" charset="0"/>
+              <a:buChar char="•"/>
+            </a:pPr>
+            <a:r>
+              <a:rPr lang="en-US" altLang="en-US" sz="1050">
+                <a:latin typeface="+mn-lt"/>
+              </a:rPr>
+              <a:t>emissBySectorGTPAR5FFI</a:t>
+            </a:r>
+          </a:p>
+          <a:p>
+            <a:pPr marL="171450" indent="-171450">
+              <a:buFont typeface="Arial" panose="020B0604020202020204" pitchFamily="34" charset="0"/>
+              <a:buChar char="•"/>
+            </a:pPr>
+            <a:r>
+              <a:rPr lang="en-US" altLang="en-US" sz="1050">
+                <a:latin typeface="+mn-lt"/>
+              </a:rPr>
+              <a:t>emissBySectorGTPAR5LUC</a:t>
+            </a:r>
+          </a:p>
+        </p:txBody>
+      </p:sp>
+      <p:sp>
+        <p:nvSpPr>
+          <p:cNvPr id="10" name="TextBox 9">
+            <a:extLst>
+              <a:ext uri="{FF2B5EF4-FFF2-40B4-BE49-F238E27FC236}">
+                <a16:creationId xmlns:a16="http://schemas.microsoft.com/office/drawing/2014/main" id="{11BBF495-EC10-4E41-938D-C41D6846FC07}"/>
+              </a:ext>
+            </a:extLst>
+          </p:cNvPr>
+          <p:cNvSpPr txBox="1"/>
+          <p:nvPr/>
+        </p:nvSpPr>
+        <p:spPr>
+          <a:xfrm>
+            <a:off x="9270444" y="522578"/>
+            <a:ext cx="2216370" cy="2006255"/>
+          </a:xfrm>
+          <a:prstGeom prst="rect">
+            <a:avLst/>
+          </a:prstGeom>
+          <a:noFill/>
+        </p:spPr>
+        <p:txBody>
+          <a:bodyPr wrap="square" rtlCol="0">
+            <a:spAutoFit/>
+          </a:bodyPr>
+          <a:lstStyle>
+            <a:defPPr>
+              <a:defRPr lang="en-US"/>
+            </a:defPPr>
+            <a:lvl1pPr>
+              <a:lnSpc>
+                <a:spcPct val="150000"/>
+              </a:lnSpc>
+              <a:defRPr sz="900">
+                <a:latin typeface="Consolas" panose="020B0609020204030204" pitchFamily="49" charset="0"/>
+              </a:defRPr>
+            </a:lvl1pPr>
+          </a:lstStyle>
+          <a:p>
+            <a:pPr algn="ctr"/>
+            <a:r>
+              <a:rPr lang="en-US" altLang="en-US" sz="1050" b="1" u="sng">
+                <a:latin typeface="+mn-lt"/>
+              </a:rPr>
+              <a:t>water</a:t>
+            </a:r>
+          </a:p>
+          <a:p>
+            <a:pPr marL="171450" indent="-171450">
+              <a:buFont typeface="Arial" panose="020B0604020202020204" pitchFamily="34" charset="0"/>
+              <a:buChar char="•"/>
+            </a:pPr>
+            <a:r>
+              <a:rPr lang="en-US" altLang="en-US" sz="1050">
+                <a:latin typeface="+mn-lt"/>
+              </a:rPr>
+              <a:t>watConsumBySec</a:t>
+            </a:r>
+          </a:p>
+          <a:p>
+            <a:pPr marL="171450" indent="-171450">
+              <a:buFont typeface="Arial" panose="020B0604020202020204" pitchFamily="34" charset="0"/>
+              <a:buChar char="•"/>
+            </a:pPr>
+            <a:r>
+              <a:rPr lang="en-US" altLang="en-US" sz="1050">
+                <a:latin typeface="+mn-lt"/>
+              </a:rPr>
+              <a:t>watWithdrawBySec</a:t>
+            </a:r>
+          </a:p>
+          <a:p>
+            <a:pPr marL="171450" indent="-171450">
+              <a:buFont typeface="Arial" panose="020B0604020202020204" pitchFamily="34" charset="0"/>
+              <a:buChar char="•"/>
+            </a:pPr>
+            <a:r>
+              <a:rPr lang="en-US" altLang="en-US" sz="1050">
+                <a:latin typeface="+mn-lt"/>
+              </a:rPr>
+              <a:t>watWithdrawByCrop</a:t>
+            </a:r>
+          </a:p>
+          <a:p>
+            <a:pPr marL="171450" indent="-171450">
+              <a:buFont typeface="Arial" panose="020B0604020202020204" pitchFamily="34" charset="0"/>
+              <a:buChar char="•"/>
+            </a:pPr>
+            <a:r>
+              <a:rPr lang="en-US" altLang="en-US" sz="1050">
+                <a:latin typeface="+mn-lt"/>
+              </a:rPr>
+              <a:t>watBioPhysCons</a:t>
+            </a:r>
+          </a:p>
+          <a:p>
+            <a:pPr marL="171450" indent="-171450">
+              <a:buFont typeface="Arial" panose="020B0604020202020204" pitchFamily="34" charset="0"/>
+              <a:buChar char="•"/>
+            </a:pPr>
+            <a:r>
+              <a:rPr lang="en-US" altLang="en-US" sz="1050">
+                <a:latin typeface="+mn-lt"/>
+              </a:rPr>
+              <a:t>watIrrWithdrawBasin</a:t>
+            </a:r>
+          </a:p>
+          <a:p>
+            <a:pPr marL="171450" indent="-171450">
+              <a:buFont typeface="Arial" panose="020B0604020202020204" pitchFamily="34" charset="0"/>
+              <a:buChar char="•"/>
+            </a:pPr>
+            <a:r>
+              <a:rPr lang="en-US" altLang="en-US" sz="1050">
+                <a:latin typeface="+mn-lt"/>
+              </a:rPr>
+              <a:t>watIrrConsBasin</a:t>
+            </a:r>
+          </a:p>
+          <a:p>
+            <a:pPr marL="171450" indent="-171450">
+              <a:buFont typeface="Arial" panose="020B0604020202020204" pitchFamily="34" charset="0"/>
+              <a:buChar char="•"/>
+            </a:pPr>
+            <a:r>
+              <a:rPr lang="en-US" altLang="en-US" sz="1050">
+                <a:latin typeface="+mn-lt"/>
+              </a:rPr>
+              <a:t>watSupRunoffBasin</a:t>
+            </a:r>
+          </a:p>
+        </p:txBody>
+      </p:sp>
+      <p:sp>
+        <p:nvSpPr>
+          <p:cNvPr id="11" name="Rectangle 10">
+            <a:extLst>
+              <a:ext uri="{FF2B5EF4-FFF2-40B4-BE49-F238E27FC236}">
+                <a16:creationId xmlns:a16="http://schemas.microsoft.com/office/drawing/2014/main" id="{F7432040-3975-4A47-9851-71C7544179DB}"/>
+              </a:ext>
+            </a:extLst>
+          </p:cNvPr>
+          <p:cNvSpPr/>
+          <p:nvPr/>
+        </p:nvSpPr>
+        <p:spPr>
+          <a:xfrm>
+            <a:off x="497520" y="522577"/>
+            <a:ext cx="10466402" cy="5691791"/>
+          </a:xfrm>
+          <a:prstGeom prst="rect">
+            <a:avLst/>
+          </a:prstGeom>
+          <a:noFill/>
+          <a:ln>
+            <a:solidFill>
+              <a:schemeClr val="bg1">
+                <a:lumMod val="65000"/>
+              </a:schemeClr>
+            </a:solidFill>
+          </a:ln>
+        </p:spPr>
+        <p:style>
+          <a:lnRef idx="2">
+            <a:schemeClr val="accent1">
+              <a:shade val="50000"/>
+            </a:schemeClr>
+          </a:lnRef>
+          <a:fillRef idx="1">
+            <a:schemeClr val="accent1"/>
+          </a:fillRef>
+          <a:effectRef idx="0">
+            <a:schemeClr val="accent1"/>
+          </a:effectRef>
+          <a:fontRef idx="minor">
+            <a:schemeClr val="lt1"/>
+          </a:fontRef>
+        </p:style>
+        <p:txBody>
+          <a:bodyPr rtlCol="0" anchor="ctr"/>
+          <a:lstStyle/>
+          <a:p>
+            <a:pPr algn="ctr"/>
+            <a:endParaRPr lang="en-US"/>
+          </a:p>
+        </p:txBody>
+      </p:sp>
+      <p:sp>
+        <p:nvSpPr>
+          <p:cNvPr id="12" name="TextBox 11">
+            <a:extLst>
+              <a:ext uri="{FF2B5EF4-FFF2-40B4-BE49-F238E27FC236}">
+                <a16:creationId xmlns:a16="http://schemas.microsoft.com/office/drawing/2014/main" id="{F1498920-CEE6-468A-B822-668FDD52D7A2}"/>
+              </a:ext>
+            </a:extLst>
+          </p:cNvPr>
+          <p:cNvSpPr txBox="1"/>
+          <p:nvPr/>
+        </p:nvSpPr>
+        <p:spPr>
+          <a:xfrm>
+            <a:off x="192163" y="128664"/>
+            <a:ext cx="2066223" cy="369332"/>
+          </a:xfrm>
+          <a:prstGeom prst="rect">
+            <a:avLst/>
+          </a:prstGeom>
+          <a:noFill/>
+        </p:spPr>
+        <p:txBody>
+          <a:bodyPr wrap="square" rtlCol="0">
+            <a:spAutoFit/>
+          </a:bodyPr>
+          <a:lstStyle/>
+          <a:p>
+            <a:pPr algn="ctr"/>
+            <a:r>
+              <a:rPr lang="en-US" b="1"/>
+              <a:t>Param List</a:t>
+            </a:r>
+          </a:p>
+        </p:txBody>
+      </p:sp>
+    </p:spTree>
+    <p:extLst>
+      <p:ext uri="{BB962C8B-B14F-4D97-AF65-F5344CB8AC3E}">
+        <p14:creationId xmlns:p14="http://schemas.microsoft.com/office/powerpoint/2010/main" val="3345794904"/>
+      </p:ext>
+    </p:extLst>
+  </p:cSld>
+  <p:clrMapOvr>
+    <a:masterClrMapping/>
+  </p:clrMapOvr>
+</p:sld>
+</file>
+
+<file path=ppt/slides/slide40.xml><?xml version="1.0" encoding="utf-8"?>
 <p:sld xmlns:a="http://schemas.openxmlformats.org/drawingml/2006/main" xmlns:r="http://schemas.openxmlformats.org/officeDocument/2006/relationships" xmlns:p="http://schemas.openxmlformats.org/presentationml/2006/main">
   <p:cSld>
     <p:spTree>
@@ -16441,1053 +17680,7 @@
 </p:sld>
 </file>
 
-<file path=ppt/slides/slide4.xml><?xml version="1.0" encoding="utf-8"?>
-<p:sld xmlns:a="http://schemas.openxmlformats.org/drawingml/2006/main" xmlns:r="http://schemas.openxmlformats.org/officeDocument/2006/relationships" xmlns:p="http://schemas.openxmlformats.org/presentationml/2006/main">
-  <p:cSld>
-    <p:spTree>
-      <p:nvGrpSpPr>
-        <p:cNvPr id="1" name=""/>
-        <p:cNvGrpSpPr/>
-        <p:nvPr/>
-      </p:nvGrpSpPr>
-      <p:grpSpPr>
-        <a:xfrm>
-          <a:off x="0" y="0"/>
-          <a:ext cx="0" cy="0"/>
-          <a:chOff x="0" y="0"/>
-          <a:chExt cx="0" cy="0"/>
-        </a:xfrm>
-      </p:grpSpPr>
-      <p:sp>
-        <p:nvSpPr>
-          <p:cNvPr id="6" name="TextBox 5">
-            <a:extLst>
-              <a:ext uri="{FF2B5EF4-FFF2-40B4-BE49-F238E27FC236}">
-                <a16:creationId xmlns:a16="http://schemas.microsoft.com/office/drawing/2014/main" id="{770E9E06-5F46-4A20-920E-2473B2FB3AF0}"/>
-              </a:ext>
-            </a:extLst>
-          </p:cNvPr>
-          <p:cNvSpPr txBox="1"/>
-          <p:nvPr/>
-        </p:nvSpPr>
-        <p:spPr>
-          <a:xfrm>
-            <a:off x="677207" y="522579"/>
-            <a:ext cx="2216370" cy="4429995"/>
-          </a:xfrm>
-          <a:prstGeom prst="rect">
-            <a:avLst/>
-          </a:prstGeom>
-          <a:noFill/>
-        </p:spPr>
-        <p:txBody>
-          <a:bodyPr wrap="square" rtlCol="0">
-            <a:spAutoFit/>
-          </a:bodyPr>
-          <a:lstStyle>
-            <a:defPPr>
-              <a:defRPr lang="en-US"/>
-            </a:defPPr>
-            <a:lvl1pPr>
-              <a:lnSpc>
-                <a:spcPct val="150000"/>
-              </a:lnSpc>
-              <a:defRPr sz="900">
-                <a:latin typeface="Consolas" panose="020B0609020204030204" pitchFamily="49" charset="0"/>
-              </a:defRPr>
-            </a:lvl1pPr>
-          </a:lstStyle>
-          <a:p>
-            <a:pPr algn="ctr"/>
-            <a:r>
-              <a:rPr lang="en-US" altLang="en-US" sz="1050" b="1" u="sng">
-                <a:latin typeface="+mn-lt"/>
-              </a:rPr>
-              <a:t>electricity</a:t>
-            </a:r>
-          </a:p>
-          <a:p>
-            <a:pPr marL="171450" indent="-171450">
-              <a:buFont typeface="Arial" panose="020B0604020202020204" pitchFamily="34" charset="0"/>
-              <a:buChar char="•"/>
-            </a:pPr>
-            <a:r>
-              <a:rPr lang="en-US" altLang="en-US" sz="1050">
-                <a:latin typeface="+mn-lt"/>
-              </a:rPr>
-              <a:t>elecByTechTWh</a:t>
-            </a:r>
-          </a:p>
-          <a:p>
-            <a:pPr marL="171450" indent="-171450">
-              <a:buFont typeface="Arial" panose="020B0604020202020204" pitchFamily="34" charset="0"/>
-              <a:buChar char="•"/>
-            </a:pPr>
-            <a:r>
-              <a:rPr lang="en-US" altLang="en-US" sz="1050">
-                <a:latin typeface="+mn-lt"/>
-              </a:rPr>
-              <a:t>elecCapByFuel</a:t>
-            </a:r>
-          </a:p>
-          <a:p>
-            <a:pPr marL="171450" indent="-171450">
-              <a:buFont typeface="Arial" panose="020B0604020202020204" pitchFamily="34" charset="0"/>
-              <a:buChar char="•"/>
-            </a:pPr>
-            <a:r>
-              <a:rPr lang="en-US" altLang="en-US" sz="1050">
-                <a:latin typeface="+mn-lt"/>
-              </a:rPr>
-              <a:t>elecFinalBySecTWh</a:t>
-            </a:r>
-          </a:p>
-          <a:p>
-            <a:pPr marL="171450" indent="-171450">
-              <a:buFont typeface="Arial" panose="020B0604020202020204" pitchFamily="34" charset="0"/>
-              <a:buChar char="•"/>
-            </a:pPr>
-            <a:r>
-              <a:rPr lang="en-US" altLang="en-US" sz="1050">
-                <a:latin typeface="+mn-lt"/>
-              </a:rPr>
-              <a:t>elecFinalByFuelTWh</a:t>
-            </a:r>
-          </a:p>
-          <a:p>
-            <a:pPr marL="171450" indent="-171450">
-              <a:buFont typeface="Arial" panose="020B0604020202020204" pitchFamily="34" charset="0"/>
-              <a:buChar char="•"/>
-            </a:pPr>
-            <a:r>
-              <a:rPr lang="en-US" altLang="en-US" sz="1050">
-                <a:latin typeface="+mn-lt"/>
-              </a:rPr>
-              <a:t>elecNewCapCost</a:t>
-            </a:r>
-          </a:p>
-          <a:p>
-            <a:pPr marL="171450" indent="-171450">
-              <a:buFont typeface="Arial" panose="020B0604020202020204" pitchFamily="34" charset="0"/>
-              <a:buChar char="•"/>
-            </a:pPr>
-            <a:r>
-              <a:rPr lang="en-US" altLang="en-US" sz="1050">
-                <a:latin typeface="+mn-lt"/>
-              </a:rPr>
-              <a:t>elecNewCapGW</a:t>
-            </a:r>
-          </a:p>
-          <a:p>
-            <a:pPr marL="171450" indent="-171450">
-              <a:buFont typeface="Arial" panose="020B0604020202020204" pitchFamily="34" charset="0"/>
-              <a:buChar char="•"/>
-            </a:pPr>
-            <a:r>
-              <a:rPr lang="en-US" altLang="en-US" sz="1050">
-                <a:latin typeface="+mn-lt"/>
-              </a:rPr>
-              <a:t>elecAnnualRetPrematureCost</a:t>
-            </a:r>
-          </a:p>
-          <a:p>
-            <a:pPr marL="171450" indent="-171450">
-              <a:buFont typeface="Arial" panose="020B0604020202020204" pitchFamily="34" charset="0"/>
-              <a:buChar char="•"/>
-            </a:pPr>
-            <a:r>
-              <a:rPr lang="en-US" altLang="en-US" sz="1050">
-                <a:latin typeface="+mn-lt"/>
-              </a:rPr>
-              <a:t>elecAnnualRetPrematureGW</a:t>
-            </a:r>
-          </a:p>
-          <a:p>
-            <a:pPr marL="171450" indent="-171450">
-              <a:buFont typeface="Arial" panose="020B0604020202020204" pitchFamily="34" charset="0"/>
-              <a:buChar char="•"/>
-            </a:pPr>
-            <a:r>
-              <a:rPr lang="en-US" altLang="en-US" sz="1050">
-                <a:latin typeface="+mn-lt"/>
-              </a:rPr>
-              <a:t>elecCumCapCost</a:t>
-            </a:r>
-          </a:p>
-          <a:p>
-            <a:pPr marL="171450" indent="-171450">
-              <a:buFont typeface="Arial" panose="020B0604020202020204" pitchFamily="34" charset="0"/>
-              <a:buChar char="•"/>
-            </a:pPr>
-            <a:r>
-              <a:rPr lang="en-US" altLang="en-US" sz="1050">
-                <a:latin typeface="+mn-lt"/>
-              </a:rPr>
-              <a:t>elecCumCapGW</a:t>
-            </a:r>
-          </a:p>
-          <a:p>
-            <a:pPr marL="171450" indent="-171450">
-              <a:buFont typeface="Arial" panose="020B0604020202020204" pitchFamily="34" charset="0"/>
-              <a:buChar char="•"/>
-            </a:pPr>
-            <a:r>
-              <a:rPr lang="en-US" altLang="en-US" sz="1050">
-                <a:latin typeface="+mn-lt"/>
-              </a:rPr>
-              <a:t>elecCumRetPrematureCost</a:t>
-            </a:r>
-          </a:p>
-          <a:p>
-            <a:pPr marL="171450" indent="-171450">
-              <a:buFont typeface="Arial" panose="020B0604020202020204" pitchFamily="34" charset="0"/>
-              <a:buChar char="•"/>
-            </a:pPr>
-            <a:r>
-              <a:rPr lang="en-US" altLang="en-US" sz="1050">
-                <a:latin typeface="+mn-lt"/>
-              </a:rPr>
-              <a:t>elecCumRetPrematureGW</a:t>
-            </a:r>
-          </a:p>
-          <a:p>
-            <a:pPr algn="ctr"/>
-            <a:r>
-              <a:rPr lang="en-US" altLang="en-US" sz="1050" b="1" u="sng">
-                <a:latin typeface="+mn-lt"/>
-              </a:rPr>
-              <a:t>transport</a:t>
-            </a:r>
-          </a:p>
-          <a:p>
-            <a:pPr marL="171450" indent="-171450">
-              <a:buFont typeface="Arial" panose="020B0604020202020204" pitchFamily="34" charset="0"/>
-              <a:buChar char="•"/>
-            </a:pPr>
-            <a:r>
-              <a:rPr lang="en-US" altLang="en-US" sz="1050">
-                <a:latin typeface="+mn-lt"/>
-              </a:rPr>
-              <a:t>transportPassengerVMTByMode</a:t>
-            </a:r>
-          </a:p>
-          <a:p>
-            <a:pPr marL="171450" indent="-171450">
-              <a:buFont typeface="Arial" panose="020B0604020202020204" pitchFamily="34" charset="0"/>
-              <a:buChar char="•"/>
-            </a:pPr>
-            <a:r>
-              <a:rPr lang="en-US" altLang="en-US" sz="1050">
-                <a:latin typeface="+mn-lt"/>
-              </a:rPr>
-              <a:t>transportFreightVMTByMode</a:t>
-            </a:r>
-          </a:p>
-          <a:p>
-            <a:pPr marL="171450" indent="-171450">
-              <a:buFont typeface="Arial" panose="020B0604020202020204" pitchFamily="34" charset="0"/>
-              <a:buChar char="•"/>
-            </a:pPr>
-            <a:r>
-              <a:rPr lang="en-US" altLang="en-US" sz="1050">
-                <a:latin typeface="+mn-lt"/>
-              </a:rPr>
-              <a:t>transportPassengerVMTByFuel</a:t>
-            </a:r>
-          </a:p>
-          <a:p>
-            <a:pPr marL="171450" indent="-171450">
-              <a:buFont typeface="Arial" panose="020B0604020202020204" pitchFamily="34" charset="0"/>
-              <a:buChar char="•"/>
-            </a:pPr>
-            <a:r>
-              <a:rPr lang="en-US" altLang="en-US" sz="1050">
-                <a:latin typeface="+mn-lt"/>
-              </a:rPr>
-              <a:t>transportFreightVMTByFuel</a:t>
-            </a:r>
-          </a:p>
-        </p:txBody>
-      </p:sp>
-      <p:sp>
-        <p:nvSpPr>
-          <p:cNvPr id="7" name="TextBox 6">
-            <a:extLst>
-              <a:ext uri="{FF2B5EF4-FFF2-40B4-BE49-F238E27FC236}">
-                <a16:creationId xmlns:a16="http://schemas.microsoft.com/office/drawing/2014/main" id="{08849C20-7534-4CC1-AE72-789DE7D498D4}"/>
-              </a:ext>
-            </a:extLst>
-          </p:cNvPr>
-          <p:cNvSpPr txBox="1"/>
-          <p:nvPr/>
-        </p:nvSpPr>
-        <p:spPr>
-          <a:xfrm>
-            <a:off x="3772467" y="522579"/>
-            <a:ext cx="2216370" cy="5884240"/>
-          </a:xfrm>
-          <a:prstGeom prst="rect">
-            <a:avLst/>
-          </a:prstGeom>
-          <a:noFill/>
-        </p:spPr>
-        <p:txBody>
-          <a:bodyPr wrap="square" rtlCol="0">
-            <a:spAutoFit/>
-          </a:bodyPr>
-          <a:lstStyle>
-            <a:defPPr>
-              <a:defRPr lang="en-US"/>
-            </a:defPPr>
-            <a:lvl1pPr>
-              <a:lnSpc>
-                <a:spcPct val="150000"/>
-              </a:lnSpc>
-              <a:defRPr sz="900">
-                <a:latin typeface="Consolas" panose="020B0609020204030204" pitchFamily="49" charset="0"/>
-              </a:defRPr>
-            </a:lvl1pPr>
-          </a:lstStyle>
-          <a:p>
-            <a:pPr algn="ctr"/>
-            <a:r>
-              <a:rPr lang="en-US" altLang="en-US" sz="1050" b="1" u="sng">
-                <a:latin typeface="+mn-lt"/>
-              </a:rPr>
-              <a:t>socioecon</a:t>
-            </a:r>
-          </a:p>
-          <a:p>
-            <a:pPr marL="171450" indent="-171450">
-              <a:buFont typeface="Arial" panose="020B0604020202020204" pitchFamily="34" charset="0"/>
-              <a:buChar char="•"/>
-            </a:pPr>
-            <a:r>
-              <a:rPr lang="en-US" altLang="en-US" sz="1050">
-                <a:latin typeface="+mn-lt"/>
-              </a:rPr>
-              <a:t>gdpPerCapita</a:t>
-            </a:r>
-          </a:p>
-          <a:p>
-            <a:pPr marL="171450" indent="-171450">
-              <a:buFont typeface="Arial" panose="020B0604020202020204" pitchFamily="34" charset="0"/>
-              <a:buChar char="•"/>
-            </a:pPr>
-            <a:r>
-              <a:rPr lang="en-US" altLang="en-US" sz="1050">
-                <a:latin typeface="+mn-lt"/>
-              </a:rPr>
-              <a:t>gdp</a:t>
-            </a:r>
-          </a:p>
-          <a:p>
-            <a:pPr marL="171450" indent="-171450">
-              <a:buFont typeface="Arial" panose="020B0604020202020204" pitchFamily="34" charset="0"/>
-              <a:buChar char="•"/>
-            </a:pPr>
-            <a:r>
-              <a:rPr lang="en-US" altLang="en-US" sz="1050">
-                <a:latin typeface="+mn-lt"/>
-              </a:rPr>
-              <a:t>gdpGrowthRate</a:t>
-            </a:r>
-          </a:p>
-          <a:p>
-            <a:pPr marL="171450" indent="-171450">
-              <a:buFont typeface="Arial" panose="020B0604020202020204" pitchFamily="34" charset="0"/>
-              <a:buChar char="•"/>
-            </a:pPr>
-            <a:r>
-              <a:rPr lang="en-US" altLang="en-US" sz="1050">
-                <a:latin typeface="+mn-lt"/>
-              </a:rPr>
-              <a:t>pop</a:t>
-            </a:r>
-          </a:p>
-          <a:p>
-            <a:pPr algn="ctr"/>
-            <a:r>
-              <a:rPr lang="en-US" altLang="en-US" sz="1050" b="1" u="sng">
-                <a:latin typeface="+mn-lt"/>
-              </a:rPr>
-              <a:t>ag</a:t>
-            </a:r>
-          </a:p>
-          <a:p>
-            <a:pPr marL="171450" indent="-171450">
-              <a:buFont typeface="Arial" panose="020B0604020202020204" pitchFamily="34" charset="0"/>
-              <a:buChar char="•"/>
-            </a:pPr>
-            <a:r>
-              <a:rPr lang="en-US" altLang="en-US" sz="1050">
-                <a:latin typeface="+mn-lt"/>
-              </a:rPr>
-              <a:t>agProdbyIrrRfd</a:t>
-            </a:r>
-          </a:p>
-          <a:p>
-            <a:pPr marL="171450" indent="-171450">
-              <a:buFont typeface="Arial" panose="020B0604020202020204" pitchFamily="34" charset="0"/>
-              <a:buChar char="•"/>
-            </a:pPr>
-            <a:r>
-              <a:rPr lang="en-US" altLang="en-US" sz="1050">
-                <a:latin typeface="+mn-lt"/>
-              </a:rPr>
-              <a:t>agProdBiomass</a:t>
-            </a:r>
-          </a:p>
-          <a:p>
-            <a:pPr marL="171450" indent="-171450">
-              <a:buFont typeface="Arial" panose="020B0604020202020204" pitchFamily="34" charset="0"/>
-              <a:buChar char="•"/>
-            </a:pPr>
-            <a:r>
-              <a:rPr lang="en-US" altLang="en-US" sz="1050">
-                <a:latin typeface="+mn-lt"/>
-              </a:rPr>
-              <a:t>agProdForest</a:t>
-            </a:r>
-          </a:p>
-          <a:p>
-            <a:pPr marL="171450" indent="-171450">
-              <a:buFont typeface="Arial" panose="020B0604020202020204" pitchFamily="34" charset="0"/>
-              <a:buChar char="•"/>
-            </a:pPr>
-            <a:r>
-              <a:rPr lang="en-US" altLang="en-US" sz="1050">
-                <a:latin typeface="+mn-lt"/>
-              </a:rPr>
-              <a:t>agProdByCrop</a:t>
-            </a:r>
-          </a:p>
-          <a:p>
-            <a:pPr algn="ctr"/>
-            <a:r>
-              <a:rPr lang="en-US" altLang="en-US" sz="1050" b="1" u="sng">
-                <a:latin typeface="+mn-lt"/>
-              </a:rPr>
-              <a:t>livestock</a:t>
-            </a:r>
-          </a:p>
-          <a:p>
-            <a:pPr marL="171450" indent="-171450">
-              <a:buFont typeface="Arial" panose="020B0604020202020204" pitchFamily="34" charset="0"/>
-              <a:buChar char="•"/>
-            </a:pPr>
-            <a:r>
-              <a:rPr lang="en-US" altLang="en-US" sz="1050">
-                <a:latin typeface="+mn-lt"/>
-              </a:rPr>
-              <a:t>livestock_MeatDairybyTechMixed</a:t>
-            </a:r>
-          </a:p>
-          <a:p>
-            <a:pPr marL="171450" indent="-171450">
-              <a:buFont typeface="Arial" panose="020B0604020202020204" pitchFamily="34" charset="0"/>
-              <a:buChar char="•"/>
-            </a:pPr>
-            <a:r>
-              <a:rPr lang="en-US" altLang="en-US" sz="1050">
-                <a:latin typeface="+mn-lt"/>
-              </a:rPr>
-              <a:t>livestock_MeatDairybyTechPastoral</a:t>
-            </a:r>
-          </a:p>
-          <a:p>
-            <a:pPr marL="171450" indent="-171450">
-              <a:buFont typeface="Arial" panose="020B0604020202020204" pitchFamily="34" charset="0"/>
-              <a:buChar char="•"/>
-            </a:pPr>
-            <a:r>
-              <a:rPr lang="en-US" altLang="en-US" sz="1050">
-                <a:latin typeface="+mn-lt"/>
-              </a:rPr>
-              <a:t>livestock_MeatDairybyTechImports</a:t>
-            </a:r>
-          </a:p>
-          <a:p>
-            <a:pPr marL="171450" indent="-171450">
-              <a:buFont typeface="Arial" panose="020B0604020202020204" pitchFamily="34" charset="0"/>
-              <a:buChar char="•"/>
-            </a:pPr>
-            <a:r>
-              <a:rPr lang="en-US" altLang="en-US" sz="1050">
-                <a:latin typeface="+mn-lt"/>
-              </a:rPr>
-              <a:t>livestock_MeatDairybySubsector</a:t>
-            </a:r>
-          </a:p>
-          <a:p>
-            <a:pPr algn="ctr"/>
-            <a:r>
-              <a:rPr lang="en-US" altLang="en-US" sz="1050" b="1" u="sng">
-                <a:latin typeface="+mn-lt"/>
-              </a:rPr>
-              <a:t>land</a:t>
-            </a:r>
-          </a:p>
-          <a:p>
-            <a:pPr marL="171450" indent="-171450">
-              <a:buFont typeface="Arial" panose="020B0604020202020204" pitchFamily="34" charset="0"/>
-              <a:buChar char="•"/>
-            </a:pPr>
-            <a:r>
-              <a:rPr lang="en-US" altLang="en-US" sz="1050">
-                <a:latin typeface="+mn-lt"/>
-              </a:rPr>
-              <a:t>landIrrRfd</a:t>
-            </a:r>
-          </a:p>
-          <a:p>
-            <a:pPr marL="171450" indent="-171450">
-              <a:buFont typeface="Arial" panose="020B0604020202020204" pitchFamily="34" charset="0"/>
-              <a:buChar char="•"/>
-            </a:pPr>
-            <a:r>
-              <a:rPr lang="en-US" altLang="en-US" sz="1050">
-                <a:latin typeface="+mn-lt"/>
-              </a:rPr>
-              <a:t>landIrrCrop</a:t>
-            </a:r>
-          </a:p>
-          <a:p>
-            <a:pPr marL="171450" indent="-171450">
-              <a:buFont typeface="Arial" panose="020B0604020202020204" pitchFamily="34" charset="0"/>
-              <a:buChar char="•"/>
-            </a:pPr>
-            <a:r>
-              <a:rPr lang="en-US" altLang="en-US" sz="1050">
-                <a:latin typeface="+mn-lt"/>
-              </a:rPr>
-              <a:t>landRfdCrop</a:t>
-            </a:r>
-          </a:p>
-          <a:p>
-            <a:pPr marL="171450" indent="-171450">
-              <a:buFont typeface="Arial" panose="020B0604020202020204" pitchFamily="34" charset="0"/>
-              <a:buChar char="•"/>
-            </a:pPr>
-            <a:r>
-              <a:rPr lang="en-US" altLang="en-US" sz="1050">
-                <a:latin typeface="+mn-lt"/>
-              </a:rPr>
-              <a:t>landAlloc</a:t>
-            </a:r>
-          </a:p>
-          <a:p>
-            <a:pPr marL="171450" indent="-171450">
-              <a:buFont typeface="Arial" panose="020B0604020202020204" pitchFamily="34" charset="0"/>
-              <a:buChar char="•"/>
-            </a:pPr>
-            <a:r>
-              <a:rPr lang="en-US" altLang="en-US" sz="1050">
-                <a:latin typeface="+mn-lt"/>
-              </a:rPr>
-              <a:t>landAllocByCrop</a:t>
-            </a:r>
-          </a:p>
-          <a:p>
-            <a:pPr algn="ctr"/>
-            <a:endParaRPr lang="en-US" altLang="en-US" sz="1050">
-              <a:latin typeface="+mn-lt"/>
-            </a:endParaRPr>
-          </a:p>
-        </p:txBody>
-      </p:sp>
-      <p:sp>
-        <p:nvSpPr>
-          <p:cNvPr id="8" name="TextBox 7">
-            <a:extLst>
-              <a:ext uri="{FF2B5EF4-FFF2-40B4-BE49-F238E27FC236}">
-                <a16:creationId xmlns:a16="http://schemas.microsoft.com/office/drawing/2014/main" id="{8585856F-0683-439B-927B-E2E8AD4AA13F}"/>
-              </a:ext>
-            </a:extLst>
-          </p:cNvPr>
-          <p:cNvSpPr txBox="1"/>
-          <p:nvPr/>
-        </p:nvSpPr>
-        <p:spPr>
-          <a:xfrm>
-            <a:off x="6867727" y="522579"/>
-            <a:ext cx="2216370" cy="4429995"/>
-          </a:xfrm>
-          <a:prstGeom prst="rect">
-            <a:avLst/>
-          </a:prstGeom>
-          <a:noFill/>
-        </p:spPr>
-        <p:txBody>
-          <a:bodyPr wrap="square" rtlCol="0">
-            <a:spAutoFit/>
-          </a:bodyPr>
-          <a:lstStyle>
-            <a:defPPr>
-              <a:defRPr lang="en-US"/>
-            </a:defPPr>
-            <a:lvl1pPr>
-              <a:lnSpc>
-                <a:spcPct val="150000"/>
-              </a:lnSpc>
-              <a:defRPr sz="900">
-                <a:latin typeface="Consolas" panose="020B0609020204030204" pitchFamily="49" charset="0"/>
-              </a:defRPr>
-            </a:lvl1pPr>
-          </a:lstStyle>
-          <a:p>
-            <a:pPr algn="ctr"/>
-            <a:r>
-              <a:rPr lang="en-US" altLang="en-US" sz="1050" b="1" u="sng">
-                <a:latin typeface="+mn-lt"/>
-              </a:rPr>
-              <a:t>emissions</a:t>
-            </a:r>
-          </a:p>
-          <a:p>
-            <a:pPr marL="171450" indent="-171450">
-              <a:buFont typeface="Arial" panose="020B0604020202020204" pitchFamily="34" charset="0"/>
-              <a:buChar char="•"/>
-            </a:pPr>
-            <a:r>
-              <a:rPr lang="en-US" altLang="en-US" sz="1050">
-                <a:latin typeface="+mn-lt"/>
-              </a:rPr>
-              <a:t>emissNonCO2BySectorGWPAR5</a:t>
-            </a:r>
-          </a:p>
-          <a:p>
-            <a:pPr marL="171450" indent="-171450">
-              <a:buFont typeface="Arial" panose="020B0604020202020204" pitchFamily="34" charset="0"/>
-              <a:buChar char="•"/>
-            </a:pPr>
-            <a:r>
-              <a:rPr lang="en-US" altLang="en-US" sz="1050">
-                <a:latin typeface="+mn-lt"/>
-              </a:rPr>
-              <a:t>emissNonCO2BySectorGTPAR5</a:t>
-            </a:r>
-          </a:p>
-          <a:p>
-            <a:pPr marL="171450" indent="-171450">
-              <a:buFont typeface="Arial" panose="020B0604020202020204" pitchFamily="34" charset="0"/>
-              <a:buChar char="•"/>
-            </a:pPr>
-            <a:r>
-              <a:rPr lang="en-US" altLang="en-US" sz="1050">
-                <a:latin typeface="+mn-lt"/>
-              </a:rPr>
-              <a:t>emissNonCO2BySectorOrigUnits</a:t>
-            </a:r>
-          </a:p>
-          <a:p>
-            <a:pPr marL="171450" indent="-171450">
-              <a:buFont typeface="Arial" panose="020B0604020202020204" pitchFamily="34" charset="0"/>
-              <a:buChar char="•"/>
-            </a:pPr>
-            <a:r>
-              <a:rPr lang="en-US" altLang="en-US" sz="1050">
-                <a:latin typeface="+mn-lt"/>
-              </a:rPr>
-              <a:t>emissLUC</a:t>
-            </a:r>
-          </a:p>
-          <a:p>
-            <a:pPr marL="171450" indent="-171450">
-              <a:buFont typeface="Arial" panose="020B0604020202020204" pitchFamily="34" charset="0"/>
-              <a:buChar char="•"/>
-            </a:pPr>
-            <a:r>
-              <a:rPr lang="en-US" altLang="en-US" sz="1050">
-                <a:latin typeface="+mn-lt"/>
-              </a:rPr>
-              <a:t>emissCO2BySectorNoBio</a:t>
-            </a:r>
-          </a:p>
-          <a:p>
-            <a:pPr marL="171450" indent="-171450">
-              <a:buFont typeface="Arial" panose="020B0604020202020204" pitchFamily="34" charset="0"/>
-              <a:buChar char="•"/>
-            </a:pPr>
-            <a:r>
-              <a:rPr lang="en-US" altLang="en-US" sz="1050">
-                <a:latin typeface="+mn-lt"/>
-              </a:rPr>
-              <a:t>emissNonCO2ByResProdGWPAR5</a:t>
-            </a:r>
-          </a:p>
-          <a:p>
-            <a:pPr marL="171450" indent="-171450">
-              <a:buFont typeface="Arial" panose="020B0604020202020204" pitchFamily="34" charset="0"/>
-              <a:buChar char="•"/>
-            </a:pPr>
-            <a:r>
-              <a:rPr lang="en-US" altLang="en-US" sz="1050">
-                <a:latin typeface="+mn-lt"/>
-              </a:rPr>
-              <a:t>emissMethaneBySourceGWPAR5</a:t>
-            </a:r>
-          </a:p>
-          <a:p>
-            <a:pPr marL="171450" indent="-171450">
-              <a:buFont typeface="Arial" panose="020B0604020202020204" pitchFamily="34" charset="0"/>
-              <a:buChar char="•"/>
-            </a:pPr>
-            <a:r>
-              <a:rPr lang="en-US" altLang="en-US" sz="1050">
-                <a:latin typeface="+mn-lt"/>
-              </a:rPr>
-              <a:t>emissByGasGWPAR5FFI</a:t>
-            </a:r>
-          </a:p>
-          <a:p>
-            <a:pPr marL="171450" indent="-171450">
-              <a:buFont typeface="Arial" panose="020B0604020202020204" pitchFamily="34" charset="0"/>
-              <a:buChar char="•"/>
-            </a:pPr>
-            <a:r>
-              <a:rPr lang="en-US" altLang="en-US" sz="1050">
-                <a:latin typeface="+mn-lt"/>
-              </a:rPr>
-              <a:t>emissByGasGWPAR5LUC</a:t>
-            </a:r>
-          </a:p>
-          <a:p>
-            <a:pPr marL="171450" indent="-171450">
-              <a:buFont typeface="Arial" panose="020B0604020202020204" pitchFamily="34" charset="0"/>
-              <a:buChar char="•"/>
-            </a:pPr>
-            <a:r>
-              <a:rPr lang="en-US" altLang="en-US" sz="1050">
-                <a:latin typeface="+mn-lt"/>
-              </a:rPr>
-              <a:t>emissBySectorGWPAR5FFI</a:t>
-            </a:r>
-          </a:p>
-          <a:p>
-            <a:pPr marL="171450" indent="-171450">
-              <a:buFont typeface="Arial" panose="020B0604020202020204" pitchFamily="34" charset="0"/>
-              <a:buChar char="•"/>
-            </a:pPr>
-            <a:r>
-              <a:rPr lang="en-US" altLang="en-US" sz="1050">
-                <a:latin typeface="+mn-lt"/>
-              </a:rPr>
-              <a:t>emissBySectorGWPAR5LUC</a:t>
-            </a:r>
-          </a:p>
-          <a:p>
-            <a:pPr marL="171450" indent="-171450">
-              <a:buFont typeface="Arial" panose="020B0604020202020204" pitchFamily="34" charset="0"/>
-              <a:buChar char="•"/>
-            </a:pPr>
-            <a:r>
-              <a:rPr lang="en-US" altLang="en-US" sz="1050">
-                <a:latin typeface="+mn-lt"/>
-              </a:rPr>
-              <a:t>emissNonCO2ByResProdGTPAR5</a:t>
-            </a:r>
-          </a:p>
-          <a:p>
-            <a:pPr marL="171450" indent="-171450">
-              <a:buFont typeface="Arial" panose="020B0604020202020204" pitchFamily="34" charset="0"/>
-              <a:buChar char="•"/>
-            </a:pPr>
-            <a:r>
-              <a:rPr lang="en-US" altLang="en-US" sz="1050">
-                <a:latin typeface="+mn-lt"/>
-              </a:rPr>
-              <a:t>emissMethaneBySourceGTPAR5</a:t>
-            </a:r>
-          </a:p>
-          <a:p>
-            <a:pPr marL="171450" indent="-171450">
-              <a:buFont typeface="Arial" panose="020B0604020202020204" pitchFamily="34" charset="0"/>
-              <a:buChar char="•"/>
-            </a:pPr>
-            <a:r>
-              <a:rPr lang="en-US" altLang="en-US" sz="1050">
-                <a:latin typeface="+mn-lt"/>
-              </a:rPr>
-              <a:t>emissByGasGTPAR5FFI</a:t>
-            </a:r>
-          </a:p>
-          <a:p>
-            <a:pPr marL="171450" indent="-171450">
-              <a:buFont typeface="Arial" panose="020B0604020202020204" pitchFamily="34" charset="0"/>
-              <a:buChar char="•"/>
-            </a:pPr>
-            <a:r>
-              <a:rPr lang="en-US" altLang="en-US" sz="1050">
-                <a:latin typeface="+mn-lt"/>
-              </a:rPr>
-              <a:t>emissByGasGTPAR5LUC</a:t>
-            </a:r>
-          </a:p>
-          <a:p>
-            <a:pPr marL="171450" indent="-171450">
-              <a:buFont typeface="Arial" panose="020B0604020202020204" pitchFamily="34" charset="0"/>
-              <a:buChar char="•"/>
-            </a:pPr>
-            <a:r>
-              <a:rPr lang="en-US" altLang="en-US" sz="1050">
-                <a:latin typeface="+mn-lt"/>
-              </a:rPr>
-              <a:t>emissBySectorGTPAR5FFI</a:t>
-            </a:r>
-          </a:p>
-          <a:p>
-            <a:pPr marL="171450" indent="-171450">
-              <a:buFont typeface="Arial" panose="020B0604020202020204" pitchFamily="34" charset="0"/>
-              <a:buChar char="•"/>
-            </a:pPr>
-            <a:r>
-              <a:rPr lang="en-US" altLang="en-US" sz="1050">
-                <a:latin typeface="+mn-lt"/>
-              </a:rPr>
-              <a:t>emissBySectorGTPAR5LUC</a:t>
-            </a:r>
-          </a:p>
-        </p:txBody>
-      </p:sp>
-      <p:sp>
-        <p:nvSpPr>
-          <p:cNvPr id="10" name="TextBox 9">
-            <a:extLst>
-              <a:ext uri="{FF2B5EF4-FFF2-40B4-BE49-F238E27FC236}">
-                <a16:creationId xmlns:a16="http://schemas.microsoft.com/office/drawing/2014/main" id="{11BBF495-EC10-4E41-938D-C41D6846FC07}"/>
-              </a:ext>
-            </a:extLst>
-          </p:cNvPr>
-          <p:cNvSpPr txBox="1"/>
-          <p:nvPr/>
-        </p:nvSpPr>
-        <p:spPr>
-          <a:xfrm>
-            <a:off x="9270444" y="522578"/>
-            <a:ext cx="2216370" cy="2006255"/>
-          </a:xfrm>
-          <a:prstGeom prst="rect">
-            <a:avLst/>
-          </a:prstGeom>
-          <a:noFill/>
-        </p:spPr>
-        <p:txBody>
-          <a:bodyPr wrap="square" rtlCol="0">
-            <a:spAutoFit/>
-          </a:bodyPr>
-          <a:lstStyle>
-            <a:defPPr>
-              <a:defRPr lang="en-US"/>
-            </a:defPPr>
-            <a:lvl1pPr>
-              <a:lnSpc>
-                <a:spcPct val="150000"/>
-              </a:lnSpc>
-              <a:defRPr sz="900">
-                <a:latin typeface="Consolas" panose="020B0609020204030204" pitchFamily="49" charset="0"/>
-              </a:defRPr>
-            </a:lvl1pPr>
-          </a:lstStyle>
-          <a:p>
-            <a:pPr algn="ctr"/>
-            <a:r>
-              <a:rPr lang="en-US" altLang="en-US" sz="1050" b="1" u="sng">
-                <a:latin typeface="+mn-lt"/>
-              </a:rPr>
-              <a:t>water</a:t>
-            </a:r>
-          </a:p>
-          <a:p>
-            <a:pPr marL="171450" indent="-171450">
-              <a:buFont typeface="Arial" panose="020B0604020202020204" pitchFamily="34" charset="0"/>
-              <a:buChar char="•"/>
-            </a:pPr>
-            <a:r>
-              <a:rPr lang="en-US" altLang="en-US" sz="1050">
-                <a:latin typeface="+mn-lt"/>
-              </a:rPr>
-              <a:t>watConsumBySec</a:t>
-            </a:r>
-          </a:p>
-          <a:p>
-            <a:pPr marL="171450" indent="-171450">
-              <a:buFont typeface="Arial" panose="020B0604020202020204" pitchFamily="34" charset="0"/>
-              <a:buChar char="•"/>
-            </a:pPr>
-            <a:r>
-              <a:rPr lang="en-US" altLang="en-US" sz="1050">
-                <a:latin typeface="+mn-lt"/>
-              </a:rPr>
-              <a:t>watWithdrawBySec</a:t>
-            </a:r>
-          </a:p>
-          <a:p>
-            <a:pPr marL="171450" indent="-171450">
-              <a:buFont typeface="Arial" panose="020B0604020202020204" pitchFamily="34" charset="0"/>
-              <a:buChar char="•"/>
-            </a:pPr>
-            <a:r>
-              <a:rPr lang="en-US" altLang="en-US" sz="1050">
-                <a:latin typeface="+mn-lt"/>
-              </a:rPr>
-              <a:t>watWithdrawByCrop</a:t>
-            </a:r>
-          </a:p>
-          <a:p>
-            <a:pPr marL="171450" indent="-171450">
-              <a:buFont typeface="Arial" panose="020B0604020202020204" pitchFamily="34" charset="0"/>
-              <a:buChar char="•"/>
-            </a:pPr>
-            <a:r>
-              <a:rPr lang="en-US" altLang="en-US" sz="1050">
-                <a:latin typeface="+mn-lt"/>
-              </a:rPr>
-              <a:t>watBioPhysCons</a:t>
-            </a:r>
-          </a:p>
-          <a:p>
-            <a:pPr marL="171450" indent="-171450">
-              <a:buFont typeface="Arial" panose="020B0604020202020204" pitchFamily="34" charset="0"/>
-              <a:buChar char="•"/>
-            </a:pPr>
-            <a:r>
-              <a:rPr lang="en-US" altLang="en-US" sz="1050">
-                <a:latin typeface="+mn-lt"/>
-              </a:rPr>
-              <a:t>watIrrWithdrawBasin</a:t>
-            </a:r>
-          </a:p>
-          <a:p>
-            <a:pPr marL="171450" indent="-171450">
-              <a:buFont typeface="Arial" panose="020B0604020202020204" pitchFamily="34" charset="0"/>
-              <a:buChar char="•"/>
-            </a:pPr>
-            <a:r>
-              <a:rPr lang="en-US" altLang="en-US" sz="1050">
-                <a:latin typeface="+mn-lt"/>
-              </a:rPr>
-              <a:t>watIrrConsBasin</a:t>
-            </a:r>
-          </a:p>
-          <a:p>
-            <a:pPr marL="171450" indent="-171450">
-              <a:buFont typeface="Arial" panose="020B0604020202020204" pitchFamily="34" charset="0"/>
-              <a:buChar char="•"/>
-            </a:pPr>
-            <a:r>
-              <a:rPr lang="en-US" altLang="en-US" sz="1050">
-                <a:latin typeface="+mn-lt"/>
-              </a:rPr>
-              <a:t>watSupRunoffBasin</a:t>
-            </a:r>
-          </a:p>
-        </p:txBody>
-      </p:sp>
-      <p:sp>
-        <p:nvSpPr>
-          <p:cNvPr id="11" name="Rectangle 10">
-            <a:extLst>
-              <a:ext uri="{FF2B5EF4-FFF2-40B4-BE49-F238E27FC236}">
-                <a16:creationId xmlns:a16="http://schemas.microsoft.com/office/drawing/2014/main" id="{F7432040-3975-4A47-9851-71C7544179DB}"/>
-              </a:ext>
-            </a:extLst>
-          </p:cNvPr>
-          <p:cNvSpPr/>
-          <p:nvPr/>
-        </p:nvSpPr>
-        <p:spPr>
-          <a:xfrm>
-            <a:off x="497520" y="522577"/>
-            <a:ext cx="10466402" cy="5691791"/>
-          </a:xfrm>
-          <a:prstGeom prst="rect">
-            <a:avLst/>
-          </a:prstGeom>
-          <a:noFill/>
-          <a:ln>
-            <a:solidFill>
-              <a:schemeClr val="bg1">
-                <a:lumMod val="65000"/>
-              </a:schemeClr>
-            </a:solidFill>
-          </a:ln>
-        </p:spPr>
-        <p:style>
-          <a:lnRef idx="2">
-            <a:schemeClr val="accent1">
-              <a:shade val="50000"/>
-            </a:schemeClr>
-          </a:lnRef>
-          <a:fillRef idx="1">
-            <a:schemeClr val="accent1"/>
-          </a:fillRef>
-          <a:effectRef idx="0">
-            <a:schemeClr val="accent1"/>
-          </a:effectRef>
-          <a:fontRef idx="minor">
-            <a:schemeClr val="lt1"/>
-          </a:fontRef>
-        </p:style>
-        <p:txBody>
-          <a:bodyPr rtlCol="0" anchor="ctr"/>
-          <a:lstStyle/>
-          <a:p>
-            <a:pPr algn="ctr"/>
-            <a:endParaRPr lang="en-US"/>
-          </a:p>
-        </p:txBody>
-      </p:sp>
-      <p:sp>
-        <p:nvSpPr>
-          <p:cNvPr id="12" name="TextBox 11">
-            <a:extLst>
-              <a:ext uri="{FF2B5EF4-FFF2-40B4-BE49-F238E27FC236}">
-                <a16:creationId xmlns:a16="http://schemas.microsoft.com/office/drawing/2014/main" id="{F1498920-CEE6-468A-B822-668FDD52D7A2}"/>
-              </a:ext>
-            </a:extLst>
-          </p:cNvPr>
-          <p:cNvSpPr txBox="1"/>
-          <p:nvPr/>
-        </p:nvSpPr>
-        <p:spPr>
-          <a:xfrm>
-            <a:off x="192163" y="128664"/>
-            <a:ext cx="2066223" cy="369332"/>
-          </a:xfrm>
-          <a:prstGeom prst="rect">
-            <a:avLst/>
-          </a:prstGeom>
-          <a:noFill/>
-        </p:spPr>
-        <p:txBody>
-          <a:bodyPr wrap="square" rtlCol="0">
-            <a:spAutoFit/>
-          </a:bodyPr>
-          <a:lstStyle/>
-          <a:p>
-            <a:pPr algn="ctr"/>
-            <a:r>
-              <a:rPr lang="en-US" b="1"/>
-              <a:t>Param List</a:t>
-            </a:r>
-          </a:p>
-        </p:txBody>
-      </p:sp>
-    </p:spTree>
-    <p:extLst>
-      <p:ext uri="{BB962C8B-B14F-4D97-AF65-F5344CB8AC3E}">
-        <p14:creationId xmlns:p14="http://schemas.microsoft.com/office/powerpoint/2010/main" val="3345794904"/>
-      </p:ext>
-    </p:extLst>
-  </p:cSld>
-  <p:clrMapOvr>
-    <a:masterClrMapping/>
-  </p:clrMapOvr>
-</p:sld>
-</file>
-
-<file path=ppt/slides/slide40.xml><?xml version="1.0" encoding="utf-8"?>
+<file path=ppt/slides/slide41.xml><?xml version="1.0" encoding="utf-8"?>
 <p:sld xmlns:a="http://schemas.openxmlformats.org/drawingml/2006/main" xmlns:r="http://schemas.openxmlformats.org/officeDocument/2006/relationships" xmlns:p="http://schemas.openxmlformats.org/presentationml/2006/main">
   <p:cSld>
     <p:spTree>
@@ -18403,7 +18596,7 @@
 </p:sld>
 </file>
 
-<file path=ppt/slides/slide41.xml><?xml version="1.0" encoding="utf-8"?>
+<file path=ppt/slides/slide42.xml><?xml version="1.0" encoding="utf-8"?>
 <p:sld xmlns:a="http://schemas.openxmlformats.org/drawingml/2006/main" xmlns:r="http://schemas.openxmlformats.org/officeDocument/2006/relationships" xmlns:p="http://schemas.openxmlformats.org/presentationml/2006/main">
   <p:cSld>
     <p:spTree>
@@ -25259,7 +25452,7 @@
 </p:sld>
 </file>
 
-<file path=ppt/slides/slide42.xml><?xml version="1.0" encoding="utf-8"?>
+<file path=ppt/slides/slide43.xml><?xml version="1.0" encoding="utf-8"?>
 <p:sld xmlns:a="http://schemas.openxmlformats.org/drawingml/2006/main" xmlns:r="http://schemas.openxmlformats.org/officeDocument/2006/relationships" xmlns:p="http://schemas.openxmlformats.org/presentationml/2006/main">
   <p:cSld>
     <p:spTree>

</xml_diff>

<commit_message>
Updating legend customization documentation
</commit_message>
<xml_diff>
--- a/vignettes/vignetteFigs/00vignetteFigs.pptx
+++ b/vignettes/vignetteFigs/00vignetteFigs.pptx
@@ -5,7 +5,7 @@
     <p:sldMasterId id="2147483648" r:id="rId1"/>
   </p:sldMasterIdLst>
   <p:notesMasterIdLst>
-    <p:notesMasterId r:id="rId47"/>
+    <p:notesMasterId r:id="rId48"/>
   </p:notesMasterIdLst>
   <p:sldIdLst>
     <p:sldId id="260" r:id="rId2"/>
@@ -44,15 +44,16 @@
     <p:sldId id="284" r:id="rId35"/>
     <p:sldId id="310" r:id="rId36"/>
     <p:sldId id="311" r:id="rId37"/>
-    <p:sldId id="309" r:id="rId38"/>
-    <p:sldId id="291" r:id="rId39"/>
-    <p:sldId id="292" r:id="rId40"/>
-    <p:sldId id="293" r:id="rId41"/>
-    <p:sldId id="297" r:id="rId42"/>
-    <p:sldId id="301" r:id="rId43"/>
-    <p:sldId id="300" r:id="rId44"/>
-    <p:sldId id="298" r:id="rId45"/>
-    <p:sldId id="302" r:id="rId46"/>
+    <p:sldId id="313" r:id="rId38"/>
+    <p:sldId id="309" r:id="rId39"/>
+    <p:sldId id="291" r:id="rId40"/>
+    <p:sldId id="292" r:id="rId41"/>
+    <p:sldId id="293" r:id="rId42"/>
+    <p:sldId id="297" r:id="rId43"/>
+    <p:sldId id="301" r:id="rId44"/>
+    <p:sldId id="300" r:id="rId45"/>
+    <p:sldId id="298" r:id="rId46"/>
+    <p:sldId id="302" r:id="rId47"/>
   </p:sldIdLst>
   <p:sldSz cx="12192000" cy="6858000"/>
   <p:notesSz cx="6858000" cy="9144000"/>
@@ -241,7 +242,7 @@
           <a:p>
             <a:fld id="{921607FB-4AF3-41D9-93C1-AF2B65302971}" type="datetimeFigureOut">
               <a:rPr lang="en-US" smtClean="0"/>
-              <a:t>1/15/2021</a:t>
+              <a:t>1/22/2021</a:t>
             </a:fld>
             <a:endParaRPr lang="en-US"/>
           </a:p>
@@ -637,7 +638,7 @@
           <a:p>
             <a:fld id="{11D67388-0790-496E-9A12-37055489AF4F}" type="datetimeFigureOut">
               <a:rPr lang="en-US" smtClean="0"/>
-              <a:t>1/15/2021</a:t>
+              <a:t>1/22/2021</a:t>
             </a:fld>
             <a:endParaRPr lang="en-US"/>
           </a:p>
@@ -805,7 +806,7 @@
           <a:p>
             <a:fld id="{11D67388-0790-496E-9A12-37055489AF4F}" type="datetimeFigureOut">
               <a:rPr lang="en-US" smtClean="0"/>
-              <a:t>1/15/2021</a:t>
+              <a:t>1/22/2021</a:t>
             </a:fld>
             <a:endParaRPr lang="en-US"/>
           </a:p>
@@ -983,7 +984,7 @@
           <a:p>
             <a:fld id="{11D67388-0790-496E-9A12-37055489AF4F}" type="datetimeFigureOut">
               <a:rPr lang="en-US" smtClean="0"/>
-              <a:t>1/15/2021</a:t>
+              <a:t>1/22/2021</a:t>
             </a:fld>
             <a:endParaRPr lang="en-US"/>
           </a:p>
@@ -1151,7 +1152,7 @@
           <a:p>
             <a:fld id="{11D67388-0790-496E-9A12-37055489AF4F}" type="datetimeFigureOut">
               <a:rPr lang="en-US" smtClean="0"/>
-              <a:t>1/15/2021</a:t>
+              <a:t>1/22/2021</a:t>
             </a:fld>
             <a:endParaRPr lang="en-US"/>
           </a:p>
@@ -1396,7 +1397,7 @@
           <a:p>
             <a:fld id="{11D67388-0790-496E-9A12-37055489AF4F}" type="datetimeFigureOut">
               <a:rPr lang="en-US" smtClean="0"/>
-              <a:t>1/15/2021</a:t>
+              <a:t>1/22/2021</a:t>
             </a:fld>
             <a:endParaRPr lang="en-US"/>
           </a:p>
@@ -1625,7 +1626,7 @@
           <a:p>
             <a:fld id="{11D67388-0790-496E-9A12-37055489AF4F}" type="datetimeFigureOut">
               <a:rPr lang="en-US" smtClean="0"/>
-              <a:t>1/15/2021</a:t>
+              <a:t>1/22/2021</a:t>
             </a:fld>
             <a:endParaRPr lang="en-US"/>
           </a:p>
@@ -1989,7 +1990,7 @@
           <a:p>
             <a:fld id="{11D67388-0790-496E-9A12-37055489AF4F}" type="datetimeFigureOut">
               <a:rPr lang="en-US" smtClean="0"/>
-              <a:t>1/15/2021</a:t>
+              <a:t>1/22/2021</a:t>
             </a:fld>
             <a:endParaRPr lang="en-US"/>
           </a:p>
@@ -2106,7 +2107,7 @@
           <a:p>
             <a:fld id="{11D67388-0790-496E-9A12-37055489AF4F}" type="datetimeFigureOut">
               <a:rPr lang="en-US" smtClean="0"/>
-              <a:t>1/15/2021</a:t>
+              <a:t>1/22/2021</a:t>
             </a:fld>
             <a:endParaRPr lang="en-US"/>
           </a:p>
@@ -2201,7 +2202,7 @@
           <a:p>
             <a:fld id="{11D67388-0790-496E-9A12-37055489AF4F}" type="datetimeFigureOut">
               <a:rPr lang="en-US" smtClean="0"/>
-              <a:t>1/15/2021</a:t>
+              <a:t>1/22/2021</a:t>
             </a:fld>
             <a:endParaRPr lang="en-US"/>
           </a:p>
@@ -2476,7 +2477,7 @@
           <a:p>
             <a:fld id="{11D67388-0790-496E-9A12-37055489AF4F}" type="datetimeFigureOut">
               <a:rPr lang="en-US" smtClean="0"/>
-              <a:t>1/15/2021</a:t>
+              <a:t>1/22/2021</a:t>
             </a:fld>
             <a:endParaRPr lang="en-US"/>
           </a:p>
@@ -2728,7 +2729,7 @@
           <a:p>
             <a:fld id="{11D67388-0790-496E-9A12-37055489AF4F}" type="datetimeFigureOut">
               <a:rPr lang="en-US" smtClean="0"/>
-              <a:t>1/15/2021</a:t>
+              <a:t>1/22/2021</a:t>
             </a:fld>
             <a:endParaRPr lang="en-US"/>
           </a:p>
@@ -2939,7 +2940,7 @@
           <a:p>
             <a:fld id="{11D67388-0790-496E-9A12-37055489AF4F}" type="datetimeFigureOut">
               <a:rPr lang="en-US" smtClean="0"/>
-              <a:t>1/15/2021</a:t>
+              <a:t>1/22/2021</a:t>
             </a:fld>
             <a:endParaRPr lang="en-US"/>
           </a:p>
@@ -12563,8 +12564,8 @@
         </p:nvSpPr>
         <p:spPr>
           <a:xfrm>
-            <a:off x="4386508" y="1392517"/>
-            <a:ext cx="3209405" cy="307777"/>
+            <a:off x="4013529" y="1413095"/>
+            <a:ext cx="4781555" cy="307777"/>
           </a:xfrm>
           <a:prstGeom prst="rect">
             <a:avLst/>
@@ -12584,7 +12585,7 @@
             </a:r>
             <a:r>
               <a:rPr lang="en-US" sz="1400" b="1" dirty="0"/>
-              <a:t> = "left",</a:t>
+              <a:t> = "left“ for KMEANS or PRETTY Maps</a:t>
             </a:r>
           </a:p>
         </p:txBody>
@@ -12603,8 +12604,8 @@
         </p:nvSpPr>
         <p:spPr>
           <a:xfrm>
-            <a:off x="4386509" y="3809634"/>
-            <a:ext cx="3209405" cy="307777"/>
+            <a:off x="3901198" y="3860131"/>
+            <a:ext cx="4721396" cy="307777"/>
           </a:xfrm>
           <a:prstGeom prst="rect">
             <a:avLst/>
@@ -12632,7 +12633,7 @@
             </a:r>
             <a:r>
               <a:rPr lang="en-US" sz="1400" b="1" dirty="0"/>
-              <a:t>')</a:t>
+              <a:t>’) for FREESCALE Maps</a:t>
             </a:r>
           </a:p>
         </p:txBody>
@@ -12681,8 +12682,8 @@
         </p:nvSpPr>
         <p:spPr>
           <a:xfrm>
-            <a:off x="192163" y="128664"/>
-            <a:ext cx="2066223" cy="369332"/>
+            <a:off x="-540198" y="-684744"/>
+            <a:ext cx="3790290" cy="369332"/>
           </a:xfrm>
           <a:prstGeom prst="rect">
             <a:avLst/>
@@ -12698,83 +12699,11 @@
             <a:pPr algn="ctr"/>
             <a:r>
               <a:rPr lang="en-US" b="1" dirty="0"/>
-              <a:t>Numeric2Cat</a:t>
+              <a:t>Legend Customization Breaks</a:t>
             </a:r>
           </a:p>
         </p:txBody>
       </p:sp>
-      <p:pic>
-        <p:nvPicPr>
-          <p:cNvPr id="3" name="Picture 2" descr="Map&#10;&#10;Description automatically generated">
-            <a:extLst>
-              <a:ext uri="{FF2B5EF4-FFF2-40B4-BE49-F238E27FC236}">
-                <a16:creationId xmlns:a16="http://schemas.microsoft.com/office/drawing/2014/main" id="{3B6F4D65-C9E5-4E0B-BB5A-0DF8509A29C0}"/>
-              </a:ext>
-            </a:extLst>
-          </p:cNvPr>
-          <p:cNvPicPr>
-            <a:picLocks noChangeAspect="1"/>
-          </p:cNvPicPr>
-          <p:nvPr/>
-        </p:nvPicPr>
-        <p:blipFill>
-          <a:blip r:embed="rId2" cstate="print">
-            <a:extLst>
-              <a:ext uri="{28A0092B-C50C-407E-A947-70E740481C1C}">
-                <a14:useLocalDpi xmlns:a14="http://schemas.microsoft.com/office/drawing/2010/main" val="0"/>
-              </a:ext>
-            </a:extLst>
-          </a:blip>
-          <a:stretch>
-            <a:fillRect/>
-          </a:stretch>
-        </p:blipFill>
-        <p:spPr>
-          <a:xfrm>
-            <a:off x="761658" y="1884222"/>
-            <a:ext cx="4661997" cy="2479231"/>
-          </a:xfrm>
-          <a:prstGeom prst="rect">
-            <a:avLst/>
-          </a:prstGeom>
-        </p:spPr>
-      </p:pic>
-      <p:pic>
-        <p:nvPicPr>
-          <p:cNvPr id="8" name="Picture 7" descr="Map&#10;&#10;Description automatically generated">
-            <a:extLst>
-              <a:ext uri="{FF2B5EF4-FFF2-40B4-BE49-F238E27FC236}">
-                <a16:creationId xmlns:a16="http://schemas.microsoft.com/office/drawing/2014/main" id="{7215B5F1-79F3-42C3-B624-349FA1CA4897}"/>
-              </a:ext>
-            </a:extLst>
-          </p:cNvPr>
-          <p:cNvPicPr>
-            <a:picLocks noChangeAspect="1"/>
-          </p:cNvPicPr>
-          <p:nvPr/>
-        </p:nvPicPr>
-        <p:blipFill>
-          <a:blip r:embed="rId3" cstate="print">
-            <a:extLst>
-              <a:ext uri="{28A0092B-C50C-407E-A947-70E740481C1C}">
-                <a14:useLocalDpi xmlns:a14="http://schemas.microsoft.com/office/drawing/2010/main" val="0"/>
-              </a:ext>
-            </a:extLst>
-          </a:blip>
-          <a:stretch>
-            <a:fillRect/>
-          </a:stretch>
-        </p:blipFill>
-        <p:spPr>
-          <a:xfrm>
-            <a:off x="5941833" y="1884222"/>
-            <a:ext cx="5522072" cy="2479231"/>
-          </a:xfrm>
-          <a:prstGeom prst="rect">
-            <a:avLst/>
-          </a:prstGeom>
-        </p:spPr>
-      </p:pic>
       <p:sp>
         <p:nvSpPr>
           <p:cNvPr id="10" name="Rectangle 9">
@@ -12789,8 +12718,8 @@
         </p:nvSpPr>
         <p:spPr>
           <a:xfrm>
-            <a:off x="409073" y="1608221"/>
-            <a:ext cx="11285621" cy="3104147"/>
+            <a:off x="144037" y="221381"/>
+            <a:ext cx="11767226" cy="6335830"/>
           </a:xfrm>
           <a:prstGeom prst="rect">
             <a:avLst/>
@@ -12829,6 +12758,710 @@
           </a:p>
         </p:txBody>
       </p:sp>
+      <p:pic>
+        <p:nvPicPr>
+          <p:cNvPr id="4" name="Picture 3" descr="Map&#10;&#10;Description automatically generated">
+            <a:extLst>
+              <a:ext uri="{FF2B5EF4-FFF2-40B4-BE49-F238E27FC236}">
+                <a16:creationId xmlns:a16="http://schemas.microsoft.com/office/drawing/2014/main" id="{702A5922-C552-400E-9FE2-354B20B15D94}"/>
+              </a:ext>
+            </a:extLst>
+          </p:cNvPr>
+          <p:cNvPicPr>
+            <a:picLocks noChangeAspect="1"/>
+          </p:cNvPicPr>
+          <p:nvPr/>
+        </p:nvPicPr>
+        <p:blipFill>
+          <a:blip r:embed="rId2" cstate="print">
+            <a:extLst>
+              <a:ext uri="{28A0092B-C50C-407E-A947-70E740481C1C}">
+                <a14:useLocalDpi xmlns:a14="http://schemas.microsoft.com/office/drawing/2010/main" val="0"/>
+              </a:ext>
+            </a:extLst>
+          </a:blip>
+          <a:stretch>
+            <a:fillRect/>
+          </a:stretch>
+        </p:blipFill>
+        <p:spPr>
+          <a:xfrm>
+            <a:off x="8572248" y="858458"/>
+            <a:ext cx="3094015" cy="2245690"/>
+          </a:xfrm>
+          <a:prstGeom prst="rect">
+            <a:avLst/>
+          </a:prstGeom>
+        </p:spPr>
+      </p:pic>
+      <p:pic>
+        <p:nvPicPr>
+          <p:cNvPr id="6" name="Picture 5" descr="Map&#10;&#10;Description automatically generated">
+            <a:extLst>
+              <a:ext uri="{FF2B5EF4-FFF2-40B4-BE49-F238E27FC236}">
+                <a16:creationId xmlns:a16="http://schemas.microsoft.com/office/drawing/2014/main" id="{BD1847ED-78DA-4EE2-9F6B-DF61A4781AA1}"/>
+              </a:ext>
+            </a:extLst>
+          </p:cNvPr>
+          <p:cNvPicPr>
+            <a:picLocks noChangeAspect="1"/>
+          </p:cNvPicPr>
+          <p:nvPr/>
+        </p:nvPicPr>
+        <p:blipFill>
+          <a:blip r:embed="rId3" cstate="print">
+            <a:extLst>
+              <a:ext uri="{28A0092B-C50C-407E-A947-70E740481C1C}">
+                <a14:useLocalDpi xmlns:a14="http://schemas.microsoft.com/office/drawing/2010/main" val="0"/>
+              </a:ext>
+            </a:extLst>
+          </a:blip>
+          <a:stretch>
+            <a:fillRect/>
+          </a:stretch>
+        </p:blipFill>
+        <p:spPr>
+          <a:xfrm>
+            <a:off x="5020709" y="858458"/>
+            <a:ext cx="2920635" cy="2245690"/>
+          </a:xfrm>
+          <a:prstGeom prst="rect">
+            <a:avLst/>
+          </a:prstGeom>
+        </p:spPr>
+      </p:pic>
+      <p:pic>
+        <p:nvPicPr>
+          <p:cNvPr id="11" name="Picture 10" descr="Map&#10;&#10;Description automatically generated">
+            <a:extLst>
+              <a:ext uri="{FF2B5EF4-FFF2-40B4-BE49-F238E27FC236}">
+                <a16:creationId xmlns:a16="http://schemas.microsoft.com/office/drawing/2014/main" id="{D0E51D78-FA86-4E08-9501-CF135CE058B4}"/>
+              </a:ext>
+            </a:extLst>
+          </p:cNvPr>
+          <p:cNvPicPr>
+            <a:picLocks noChangeAspect="1"/>
+          </p:cNvPicPr>
+          <p:nvPr/>
+        </p:nvPicPr>
+        <p:blipFill>
+          <a:blip r:embed="rId4" cstate="print">
+            <a:extLst>
+              <a:ext uri="{28A0092B-C50C-407E-A947-70E740481C1C}">
+                <a14:useLocalDpi xmlns:a14="http://schemas.microsoft.com/office/drawing/2010/main" val="0"/>
+              </a:ext>
+            </a:extLst>
+          </a:blip>
+          <a:stretch>
+            <a:fillRect/>
+          </a:stretch>
+        </p:blipFill>
+        <p:spPr>
+          <a:xfrm>
+            <a:off x="1227212" y="858458"/>
+            <a:ext cx="2920635" cy="2245690"/>
+          </a:xfrm>
+          <a:prstGeom prst="rect">
+            <a:avLst/>
+          </a:prstGeom>
+        </p:spPr>
+      </p:pic>
+      <p:sp>
+        <p:nvSpPr>
+          <p:cNvPr id="12" name="TextBox 11">
+            <a:extLst>
+              <a:ext uri="{FF2B5EF4-FFF2-40B4-BE49-F238E27FC236}">
+                <a16:creationId xmlns:a16="http://schemas.microsoft.com/office/drawing/2014/main" id="{23C84CB3-FB37-4F2D-8606-9612F3166861}"/>
+              </a:ext>
+            </a:extLst>
+          </p:cNvPr>
+          <p:cNvSpPr txBox="1"/>
+          <p:nvPr/>
+        </p:nvSpPr>
+        <p:spPr>
+          <a:xfrm>
+            <a:off x="1306821" y="388470"/>
+            <a:ext cx="2435398" cy="307777"/>
+          </a:xfrm>
+          <a:prstGeom prst="rect">
+            <a:avLst/>
+          </a:prstGeom>
+          <a:noFill/>
+        </p:spPr>
+        <p:txBody>
+          <a:bodyPr wrap="square" rtlCol="0">
+            <a:spAutoFit/>
+          </a:bodyPr>
+          <a:lstStyle/>
+          <a:p>
+            <a:pPr algn="ctr"/>
+            <a:r>
+              <a:rPr lang="en-US" sz="1400" b="1" dirty="0"/>
+              <a:t>Freescale</a:t>
+            </a:r>
+          </a:p>
+        </p:txBody>
+      </p:sp>
+      <p:sp>
+        <p:nvSpPr>
+          <p:cNvPr id="13" name="TextBox 12">
+            <a:extLst>
+              <a:ext uri="{FF2B5EF4-FFF2-40B4-BE49-F238E27FC236}">
+                <a16:creationId xmlns:a16="http://schemas.microsoft.com/office/drawing/2014/main" id="{DDC5C95B-6050-4D14-9B54-E5818678375C}"/>
+              </a:ext>
+            </a:extLst>
+          </p:cNvPr>
+          <p:cNvSpPr txBox="1"/>
+          <p:nvPr/>
+        </p:nvSpPr>
+        <p:spPr>
+          <a:xfrm>
+            <a:off x="5279579" y="388470"/>
+            <a:ext cx="2435398" cy="307777"/>
+          </a:xfrm>
+          <a:prstGeom prst="rect">
+            <a:avLst/>
+          </a:prstGeom>
+          <a:noFill/>
+        </p:spPr>
+        <p:txBody>
+          <a:bodyPr wrap="square" rtlCol="0">
+            <a:spAutoFit/>
+          </a:bodyPr>
+          <a:lstStyle/>
+          <a:p>
+            <a:pPr algn="ctr"/>
+            <a:r>
+              <a:rPr lang="en-US" sz="1400" b="1" dirty="0"/>
+              <a:t>Pretty</a:t>
+            </a:r>
+          </a:p>
+        </p:txBody>
+      </p:sp>
+      <p:sp>
+        <p:nvSpPr>
+          <p:cNvPr id="14" name="TextBox 13">
+            <a:extLst>
+              <a:ext uri="{FF2B5EF4-FFF2-40B4-BE49-F238E27FC236}">
+                <a16:creationId xmlns:a16="http://schemas.microsoft.com/office/drawing/2014/main" id="{482ABEB8-C8BE-4214-812C-A62AA299A9A6}"/>
+              </a:ext>
+            </a:extLst>
+          </p:cNvPr>
+          <p:cNvSpPr txBox="1"/>
+          <p:nvPr/>
+        </p:nvSpPr>
+        <p:spPr>
+          <a:xfrm>
+            <a:off x="8830235" y="386031"/>
+            <a:ext cx="2435398" cy="307777"/>
+          </a:xfrm>
+          <a:prstGeom prst="rect">
+            <a:avLst/>
+          </a:prstGeom>
+          <a:noFill/>
+        </p:spPr>
+        <p:txBody>
+          <a:bodyPr wrap="square" rtlCol="0">
+            <a:spAutoFit/>
+          </a:bodyPr>
+          <a:lstStyle/>
+          <a:p>
+            <a:pPr algn="ctr"/>
+            <a:r>
+              <a:rPr lang="en-US" sz="1400" b="1" dirty="0"/>
+              <a:t>Kmeans</a:t>
+            </a:r>
+          </a:p>
+        </p:txBody>
+      </p:sp>
+      <p:sp>
+        <p:nvSpPr>
+          <p:cNvPr id="15" name="TextBox 14">
+            <a:extLst>
+              <a:ext uri="{FF2B5EF4-FFF2-40B4-BE49-F238E27FC236}">
+                <a16:creationId xmlns:a16="http://schemas.microsoft.com/office/drawing/2014/main" id="{26F1F682-14F8-43CD-8AE9-8A20325DB7FE}"/>
+              </a:ext>
+            </a:extLst>
+          </p:cNvPr>
+          <p:cNvSpPr txBox="1"/>
+          <p:nvPr/>
+        </p:nvSpPr>
+        <p:spPr>
+          <a:xfrm rot="16200000">
+            <a:off x="-580806" y="1827415"/>
+            <a:ext cx="2435398" cy="307777"/>
+          </a:xfrm>
+          <a:prstGeom prst="rect">
+            <a:avLst/>
+          </a:prstGeom>
+          <a:noFill/>
+        </p:spPr>
+        <p:txBody>
+          <a:bodyPr wrap="square" rtlCol="0">
+            <a:spAutoFit/>
+          </a:bodyPr>
+          <a:lstStyle/>
+          <a:p>
+            <a:pPr algn="ctr"/>
+            <a:r>
+              <a:rPr lang="en-US" sz="1400" b="1" dirty="0" err="1"/>
+              <a:t>legendFixedBreaks</a:t>
+            </a:r>
+            <a:r>
+              <a:rPr lang="en-US" sz="1400" b="1" dirty="0"/>
+              <a:t> = 3</a:t>
+            </a:r>
+          </a:p>
+        </p:txBody>
+      </p:sp>
+      <p:sp>
+        <p:nvSpPr>
+          <p:cNvPr id="19" name="TextBox 18">
+            <a:extLst>
+              <a:ext uri="{FF2B5EF4-FFF2-40B4-BE49-F238E27FC236}">
+                <a16:creationId xmlns:a16="http://schemas.microsoft.com/office/drawing/2014/main" id="{1626578C-5E18-430E-8F7A-D05D8831D037}"/>
+              </a:ext>
+            </a:extLst>
+          </p:cNvPr>
+          <p:cNvSpPr txBox="1"/>
+          <p:nvPr/>
+        </p:nvSpPr>
+        <p:spPr>
+          <a:xfrm>
+            <a:off x="1306821" y="3474060"/>
+            <a:ext cx="2435398" cy="307777"/>
+          </a:xfrm>
+          <a:prstGeom prst="rect">
+            <a:avLst/>
+          </a:prstGeom>
+          <a:noFill/>
+        </p:spPr>
+        <p:txBody>
+          <a:bodyPr wrap="square" rtlCol="0">
+            <a:spAutoFit/>
+          </a:bodyPr>
+          <a:lstStyle/>
+          <a:p>
+            <a:pPr algn="ctr"/>
+            <a:r>
+              <a:rPr lang="en-US" sz="1400" b="1" dirty="0"/>
+              <a:t>Freescale</a:t>
+            </a:r>
+          </a:p>
+        </p:txBody>
+      </p:sp>
+      <p:sp>
+        <p:nvSpPr>
+          <p:cNvPr id="20" name="TextBox 19">
+            <a:extLst>
+              <a:ext uri="{FF2B5EF4-FFF2-40B4-BE49-F238E27FC236}">
+                <a16:creationId xmlns:a16="http://schemas.microsoft.com/office/drawing/2014/main" id="{E9FEE197-782D-4E28-9F20-CC09CD97CA5D}"/>
+              </a:ext>
+            </a:extLst>
+          </p:cNvPr>
+          <p:cNvSpPr txBox="1"/>
+          <p:nvPr/>
+        </p:nvSpPr>
+        <p:spPr>
+          <a:xfrm>
+            <a:off x="5279579" y="3474060"/>
+            <a:ext cx="2435398" cy="307777"/>
+          </a:xfrm>
+          <a:prstGeom prst="rect">
+            <a:avLst/>
+          </a:prstGeom>
+          <a:noFill/>
+        </p:spPr>
+        <p:txBody>
+          <a:bodyPr wrap="square" rtlCol="0">
+            <a:spAutoFit/>
+          </a:bodyPr>
+          <a:lstStyle/>
+          <a:p>
+            <a:pPr algn="ctr"/>
+            <a:r>
+              <a:rPr lang="en-US" sz="1400" b="1" dirty="0"/>
+              <a:t>Pretty</a:t>
+            </a:r>
+          </a:p>
+        </p:txBody>
+      </p:sp>
+      <p:sp>
+        <p:nvSpPr>
+          <p:cNvPr id="21" name="TextBox 20">
+            <a:extLst>
+              <a:ext uri="{FF2B5EF4-FFF2-40B4-BE49-F238E27FC236}">
+                <a16:creationId xmlns:a16="http://schemas.microsoft.com/office/drawing/2014/main" id="{F02D0632-C09D-41FD-965A-1B9DB848E310}"/>
+              </a:ext>
+            </a:extLst>
+          </p:cNvPr>
+          <p:cNvSpPr txBox="1"/>
+          <p:nvPr/>
+        </p:nvSpPr>
+        <p:spPr>
+          <a:xfrm>
+            <a:off x="8830235" y="3471621"/>
+            <a:ext cx="2435398" cy="307777"/>
+          </a:xfrm>
+          <a:prstGeom prst="rect">
+            <a:avLst/>
+          </a:prstGeom>
+          <a:noFill/>
+        </p:spPr>
+        <p:txBody>
+          <a:bodyPr wrap="square" rtlCol="0">
+            <a:spAutoFit/>
+          </a:bodyPr>
+          <a:lstStyle/>
+          <a:p>
+            <a:pPr algn="ctr"/>
+            <a:r>
+              <a:rPr lang="en-US" sz="1400" b="1" dirty="0"/>
+              <a:t>Kmeans</a:t>
+            </a:r>
+          </a:p>
+        </p:txBody>
+      </p:sp>
+      <p:sp>
+        <p:nvSpPr>
+          <p:cNvPr id="22" name="TextBox 21">
+            <a:extLst>
+              <a:ext uri="{FF2B5EF4-FFF2-40B4-BE49-F238E27FC236}">
+                <a16:creationId xmlns:a16="http://schemas.microsoft.com/office/drawing/2014/main" id="{7674599C-DB17-434E-A362-5782382ECED2}"/>
+              </a:ext>
+            </a:extLst>
+          </p:cNvPr>
+          <p:cNvSpPr txBox="1"/>
+          <p:nvPr/>
+        </p:nvSpPr>
+        <p:spPr>
+          <a:xfrm rot="16200000">
+            <a:off x="-580806" y="4913005"/>
+            <a:ext cx="2435398" cy="307777"/>
+          </a:xfrm>
+          <a:prstGeom prst="rect">
+            <a:avLst/>
+          </a:prstGeom>
+          <a:noFill/>
+        </p:spPr>
+        <p:txBody>
+          <a:bodyPr wrap="square" rtlCol="0">
+            <a:spAutoFit/>
+          </a:bodyPr>
+          <a:lstStyle/>
+          <a:p>
+            <a:pPr algn="ctr"/>
+            <a:r>
+              <a:rPr lang="en-US" sz="1400" b="1" dirty="0" err="1"/>
+              <a:t>legendFixedBreaks</a:t>
+            </a:r>
+            <a:r>
+              <a:rPr lang="en-US" sz="1400" b="1" dirty="0"/>
+              <a:t> = 3</a:t>
+            </a:r>
+          </a:p>
+        </p:txBody>
+      </p:sp>
+      <p:pic>
+        <p:nvPicPr>
+          <p:cNvPr id="24" name="Picture 23" descr="Map&#10;&#10;Description automatically generated">
+            <a:extLst>
+              <a:ext uri="{FF2B5EF4-FFF2-40B4-BE49-F238E27FC236}">
+                <a16:creationId xmlns:a16="http://schemas.microsoft.com/office/drawing/2014/main" id="{A75B0ED4-9028-42E9-8ED7-F36DD87186E5}"/>
+              </a:ext>
+            </a:extLst>
+          </p:cNvPr>
+          <p:cNvPicPr>
+            <a:picLocks noChangeAspect="1"/>
+          </p:cNvPicPr>
+          <p:nvPr/>
+        </p:nvPicPr>
+        <p:blipFill>
+          <a:blip r:embed="rId5" cstate="print">
+            <a:extLst>
+              <a:ext uri="{28A0092B-C50C-407E-A947-70E740481C1C}">
+                <a14:useLocalDpi xmlns:a14="http://schemas.microsoft.com/office/drawing/2010/main" val="0"/>
+              </a:ext>
+            </a:extLst>
+          </a:blip>
+          <a:stretch>
+            <a:fillRect/>
+          </a:stretch>
+        </p:blipFill>
+        <p:spPr>
+          <a:xfrm>
+            <a:off x="5038124" y="3849194"/>
+            <a:ext cx="2920635" cy="2245690"/>
+          </a:xfrm>
+          <a:prstGeom prst="rect">
+            <a:avLst/>
+          </a:prstGeom>
+        </p:spPr>
+      </p:pic>
+      <p:pic>
+        <p:nvPicPr>
+          <p:cNvPr id="26" name="Picture 25" descr="Map&#10;&#10;Description automatically generated">
+            <a:extLst>
+              <a:ext uri="{FF2B5EF4-FFF2-40B4-BE49-F238E27FC236}">
+                <a16:creationId xmlns:a16="http://schemas.microsoft.com/office/drawing/2014/main" id="{6DF7ABCE-2742-408D-9E59-B7842C8A99DA}"/>
+              </a:ext>
+            </a:extLst>
+          </p:cNvPr>
+          <p:cNvPicPr>
+            <a:picLocks noChangeAspect="1"/>
+          </p:cNvPicPr>
+          <p:nvPr/>
+        </p:nvPicPr>
+        <p:blipFill>
+          <a:blip r:embed="rId6" cstate="print">
+            <a:extLst>
+              <a:ext uri="{28A0092B-C50C-407E-A947-70E740481C1C}">
+                <a14:useLocalDpi xmlns:a14="http://schemas.microsoft.com/office/drawing/2010/main" val="0"/>
+              </a:ext>
+            </a:extLst>
+          </a:blip>
+          <a:stretch>
+            <a:fillRect/>
+          </a:stretch>
+        </p:blipFill>
+        <p:spPr>
+          <a:xfrm>
+            <a:off x="1230892" y="3849194"/>
+            <a:ext cx="3094015" cy="2245690"/>
+          </a:xfrm>
+          <a:prstGeom prst="rect">
+            <a:avLst/>
+          </a:prstGeom>
+        </p:spPr>
+      </p:pic>
+      <p:pic>
+        <p:nvPicPr>
+          <p:cNvPr id="28" name="Picture 27" descr="Map&#10;&#10;Description automatically generated">
+            <a:extLst>
+              <a:ext uri="{FF2B5EF4-FFF2-40B4-BE49-F238E27FC236}">
+                <a16:creationId xmlns:a16="http://schemas.microsoft.com/office/drawing/2014/main" id="{257C0961-85C5-4C4F-A9F7-9A85B0670309}"/>
+              </a:ext>
+            </a:extLst>
+          </p:cNvPr>
+          <p:cNvPicPr>
+            <a:picLocks noChangeAspect="1"/>
+          </p:cNvPicPr>
+          <p:nvPr/>
+        </p:nvPicPr>
+        <p:blipFill>
+          <a:blip r:embed="rId7" cstate="print">
+            <a:extLst>
+              <a:ext uri="{28A0092B-C50C-407E-A947-70E740481C1C}">
+                <a14:useLocalDpi xmlns:a14="http://schemas.microsoft.com/office/drawing/2010/main" val="0"/>
+              </a:ext>
+            </a:extLst>
+          </a:blip>
+          <a:stretch>
+            <a:fillRect/>
+          </a:stretch>
+        </p:blipFill>
+        <p:spPr>
+          <a:xfrm>
+            <a:off x="8572248" y="3849194"/>
+            <a:ext cx="3023838" cy="2245690"/>
+          </a:xfrm>
+          <a:prstGeom prst="rect">
+            <a:avLst/>
+          </a:prstGeom>
+        </p:spPr>
+      </p:pic>
+    </p:spTree>
+    <p:extLst>
+      <p:ext uri="{BB962C8B-B14F-4D97-AF65-F5344CB8AC3E}">
+        <p14:creationId xmlns:p14="http://schemas.microsoft.com/office/powerpoint/2010/main" val="4119142978"/>
+      </p:ext>
+    </p:extLst>
+  </p:cSld>
+  <p:clrMapOvr>
+    <a:masterClrMapping/>
+  </p:clrMapOvr>
+</p:sld>
+</file>
+
+<file path=ppt/slides/slide38.xml><?xml version="1.0" encoding="utf-8"?>
+<p:sld xmlns:a="http://schemas.openxmlformats.org/drawingml/2006/main" xmlns:r="http://schemas.openxmlformats.org/officeDocument/2006/relationships" xmlns:p="http://schemas.openxmlformats.org/presentationml/2006/main">
+  <p:cSld>
+    <p:spTree>
+      <p:nvGrpSpPr>
+        <p:cNvPr id="1" name=""/>
+        <p:cNvGrpSpPr/>
+        <p:nvPr/>
+      </p:nvGrpSpPr>
+      <p:grpSpPr>
+        <a:xfrm>
+          <a:off x="0" y="0"/>
+          <a:ext cx="0" cy="0"/>
+          <a:chOff x="0" y="0"/>
+          <a:chExt cx="0" cy="0"/>
+        </a:xfrm>
+      </p:grpSpPr>
+      <p:sp>
+        <p:nvSpPr>
+          <p:cNvPr id="7" name="TextBox 6">
+            <a:extLst>
+              <a:ext uri="{FF2B5EF4-FFF2-40B4-BE49-F238E27FC236}">
+                <a16:creationId xmlns:a16="http://schemas.microsoft.com/office/drawing/2014/main" id="{A063DF1C-7DF0-40B4-AC9D-EC918B0CB000}"/>
+              </a:ext>
+            </a:extLst>
+          </p:cNvPr>
+          <p:cNvSpPr txBox="1"/>
+          <p:nvPr/>
+        </p:nvSpPr>
+        <p:spPr>
+          <a:xfrm>
+            <a:off x="192163" y="128664"/>
+            <a:ext cx="2066223" cy="369332"/>
+          </a:xfrm>
+          <a:prstGeom prst="rect">
+            <a:avLst/>
+          </a:prstGeom>
+          <a:noFill/>
+        </p:spPr>
+        <p:txBody>
+          <a:bodyPr wrap="square" rtlCol="0">
+            <a:spAutoFit/>
+          </a:bodyPr>
+          <a:lstStyle/>
+          <a:p>
+            <a:pPr algn="ctr"/>
+            <a:r>
+              <a:rPr lang="en-US" b="1" dirty="0"/>
+              <a:t>Numeric2Cat</a:t>
+            </a:r>
+          </a:p>
+        </p:txBody>
+      </p:sp>
+      <p:pic>
+        <p:nvPicPr>
+          <p:cNvPr id="3" name="Picture 2" descr="Map&#10;&#10;Description automatically generated">
+            <a:extLst>
+              <a:ext uri="{FF2B5EF4-FFF2-40B4-BE49-F238E27FC236}">
+                <a16:creationId xmlns:a16="http://schemas.microsoft.com/office/drawing/2014/main" id="{3B6F4D65-C9E5-4E0B-BB5A-0DF8509A29C0}"/>
+              </a:ext>
+            </a:extLst>
+          </p:cNvPr>
+          <p:cNvPicPr>
+            <a:picLocks noChangeAspect="1"/>
+          </p:cNvPicPr>
+          <p:nvPr/>
+        </p:nvPicPr>
+        <p:blipFill>
+          <a:blip r:embed="rId2" cstate="print">
+            <a:extLst>
+              <a:ext uri="{28A0092B-C50C-407E-A947-70E740481C1C}">
+                <a14:useLocalDpi xmlns:a14="http://schemas.microsoft.com/office/drawing/2010/main" val="0"/>
+              </a:ext>
+            </a:extLst>
+          </a:blip>
+          <a:stretch>
+            <a:fillRect/>
+          </a:stretch>
+        </p:blipFill>
+        <p:spPr>
+          <a:xfrm>
+            <a:off x="761658" y="1884222"/>
+            <a:ext cx="4661997" cy="2479231"/>
+          </a:xfrm>
+          <a:prstGeom prst="rect">
+            <a:avLst/>
+          </a:prstGeom>
+        </p:spPr>
+      </p:pic>
+      <p:pic>
+        <p:nvPicPr>
+          <p:cNvPr id="8" name="Picture 7" descr="Map&#10;&#10;Description automatically generated">
+            <a:extLst>
+              <a:ext uri="{FF2B5EF4-FFF2-40B4-BE49-F238E27FC236}">
+                <a16:creationId xmlns:a16="http://schemas.microsoft.com/office/drawing/2014/main" id="{7215B5F1-79F3-42C3-B624-349FA1CA4897}"/>
+              </a:ext>
+            </a:extLst>
+          </p:cNvPr>
+          <p:cNvPicPr>
+            <a:picLocks noChangeAspect="1"/>
+          </p:cNvPicPr>
+          <p:nvPr/>
+        </p:nvPicPr>
+        <p:blipFill>
+          <a:blip r:embed="rId3" cstate="print">
+            <a:extLst>
+              <a:ext uri="{28A0092B-C50C-407E-A947-70E740481C1C}">
+                <a14:useLocalDpi xmlns:a14="http://schemas.microsoft.com/office/drawing/2010/main" val="0"/>
+              </a:ext>
+            </a:extLst>
+          </a:blip>
+          <a:stretch>
+            <a:fillRect/>
+          </a:stretch>
+        </p:blipFill>
+        <p:spPr>
+          <a:xfrm>
+            <a:off x="5941833" y="1884222"/>
+            <a:ext cx="5522072" cy="2479231"/>
+          </a:xfrm>
+          <a:prstGeom prst="rect">
+            <a:avLst/>
+          </a:prstGeom>
+        </p:spPr>
+      </p:pic>
+      <p:sp>
+        <p:nvSpPr>
+          <p:cNvPr id="10" name="Rectangle 9">
+            <a:extLst>
+              <a:ext uri="{FF2B5EF4-FFF2-40B4-BE49-F238E27FC236}">
+                <a16:creationId xmlns:a16="http://schemas.microsoft.com/office/drawing/2014/main" id="{89B28590-6D43-4968-A021-CF2493679ADD}"/>
+              </a:ext>
+            </a:extLst>
+          </p:cNvPr>
+          <p:cNvSpPr/>
+          <p:nvPr/>
+        </p:nvSpPr>
+        <p:spPr>
+          <a:xfrm>
+            <a:off x="409073" y="1608221"/>
+            <a:ext cx="11285621" cy="3104147"/>
+          </a:xfrm>
+          <a:prstGeom prst="rect">
+            <a:avLst/>
+          </a:prstGeom>
+          <a:noFill/>
+          <a:ln>
+            <a:solidFill>
+              <a:schemeClr val="bg1">
+                <a:lumMod val="65000"/>
+              </a:schemeClr>
+            </a:solidFill>
+          </a:ln>
+        </p:spPr>
+        <p:style>
+          <a:lnRef idx="2">
+            <a:schemeClr val="accent1">
+              <a:shade val="50000"/>
+            </a:schemeClr>
+          </a:lnRef>
+          <a:fillRef idx="1">
+            <a:schemeClr val="accent1"/>
+          </a:fillRef>
+          <a:effectRef idx="0">
+            <a:schemeClr val="accent1"/>
+          </a:effectRef>
+          <a:fontRef idx="minor">
+            <a:schemeClr val="lt1"/>
+          </a:fontRef>
+        </p:style>
+        <p:txBody>
+          <a:bodyPr rtlCol="0" anchor="ctr"/>
+          <a:lstStyle/>
+          <a:p>
+            <a:pPr algn="ctr"/>
+            <a:endParaRPr lang="en-US"/>
+          </a:p>
+        </p:txBody>
+      </p:sp>
     </p:spTree>
     <p:extLst>
       <p:ext uri="{BB962C8B-B14F-4D97-AF65-F5344CB8AC3E}">
@@ -12842,7 +13475,7 @@
 </p:sld>
 </file>
 
-<file path=ppt/slides/slide38.xml><?xml version="1.0" encoding="utf-8"?>
+<file path=ppt/slides/slide39.xml><?xml version="1.0" encoding="utf-8"?>
 <p:sld xmlns:a="http://schemas.openxmlformats.org/drawingml/2006/main" xmlns:r="http://schemas.openxmlformats.org/officeDocument/2006/relationships" xmlns:p="http://schemas.openxmlformats.org/presentationml/2006/main">
   <p:cSld>
     <p:spTree>
@@ -14327,507 +14960,6 @@
 </p:sld>
 </file>
 
-<file path=ppt/slides/slide39.xml><?xml version="1.0" encoding="utf-8"?>
-<p:sld xmlns:a="http://schemas.openxmlformats.org/drawingml/2006/main" xmlns:r="http://schemas.openxmlformats.org/officeDocument/2006/relationships" xmlns:p="http://schemas.openxmlformats.org/presentationml/2006/main">
-  <p:cSld>
-    <p:spTree>
-      <p:nvGrpSpPr>
-        <p:cNvPr id="1" name=""/>
-        <p:cNvGrpSpPr/>
-        <p:nvPr/>
-      </p:nvGrpSpPr>
-      <p:grpSpPr>
-        <a:xfrm>
-          <a:off x="0" y="0"/>
-          <a:ext cx="0" cy="0"/>
-          <a:chOff x="0" y="0"/>
-          <a:chExt cx="0" cy="0"/>
-        </a:xfrm>
-      </p:grpSpPr>
-      <p:sp>
-        <p:nvSpPr>
-          <p:cNvPr id="7" name="TextBox 6">
-            <a:extLst>
-              <a:ext uri="{FF2B5EF4-FFF2-40B4-BE49-F238E27FC236}">
-                <a16:creationId xmlns:a16="http://schemas.microsoft.com/office/drawing/2014/main" id="{A063DF1C-7DF0-40B4-AC9D-EC918B0CB000}"/>
-              </a:ext>
-            </a:extLst>
-          </p:cNvPr>
-          <p:cNvSpPr txBox="1"/>
-          <p:nvPr/>
-        </p:nvSpPr>
-        <p:spPr>
-          <a:xfrm>
-            <a:off x="192162" y="-345805"/>
-            <a:ext cx="3101370" cy="369332"/>
-          </a:xfrm>
-          <a:prstGeom prst="rect">
-            <a:avLst/>
-          </a:prstGeom>
-          <a:noFill/>
-        </p:spPr>
-        <p:txBody>
-          <a:bodyPr wrap="square" rtlCol="0">
-            <a:spAutoFit/>
-          </a:bodyPr>
-          <a:lstStyle/>
-          <a:p>
-            <a:pPr algn="ctr"/>
-            <a:r>
-              <a:rPr lang="en-US" b="1"/>
-              <a:t>GCAM by Param Figs</a:t>
-            </a:r>
-          </a:p>
-        </p:txBody>
-      </p:sp>
-      <p:sp>
-        <p:nvSpPr>
-          <p:cNvPr id="3" name="Rectangle 2">
-            <a:extLst>
-              <a:ext uri="{FF2B5EF4-FFF2-40B4-BE49-F238E27FC236}">
-                <a16:creationId xmlns:a16="http://schemas.microsoft.com/office/drawing/2014/main" id="{F74BF3CB-7E52-4F13-8449-FE231ADB4921}"/>
-              </a:ext>
-            </a:extLst>
-          </p:cNvPr>
-          <p:cNvSpPr/>
-          <p:nvPr/>
-        </p:nvSpPr>
-        <p:spPr>
-          <a:xfrm>
-            <a:off x="442452" y="117988"/>
-            <a:ext cx="11444747" cy="6548284"/>
-          </a:xfrm>
-          <a:prstGeom prst="rect">
-            <a:avLst/>
-          </a:prstGeom>
-          <a:noFill/>
-          <a:ln>
-            <a:solidFill>
-              <a:schemeClr val="bg1">
-                <a:lumMod val="65000"/>
-              </a:schemeClr>
-            </a:solidFill>
-          </a:ln>
-        </p:spPr>
-        <p:style>
-          <a:lnRef idx="2">
-            <a:schemeClr val="accent1">
-              <a:shade val="50000"/>
-            </a:schemeClr>
-          </a:lnRef>
-          <a:fillRef idx="1">
-            <a:schemeClr val="accent1"/>
-          </a:fillRef>
-          <a:effectRef idx="0">
-            <a:schemeClr val="accent1"/>
-          </a:effectRef>
-          <a:fontRef idx="minor">
-            <a:schemeClr val="lt1"/>
-          </a:fontRef>
-        </p:style>
-        <p:txBody>
-          <a:bodyPr rtlCol="0" anchor="ctr"/>
-          <a:lstStyle/>
-          <a:p>
-            <a:pPr algn="ctr"/>
-            <a:endParaRPr lang="en-US"/>
-          </a:p>
-        </p:txBody>
-      </p:sp>
-      <p:sp>
-        <p:nvSpPr>
-          <p:cNvPr id="64" name="TextBox 63">
-            <a:extLst>
-              <a:ext uri="{FF2B5EF4-FFF2-40B4-BE49-F238E27FC236}">
-                <a16:creationId xmlns:a16="http://schemas.microsoft.com/office/drawing/2014/main" id="{7628F066-CA00-4417-A6D9-707233D718F1}"/>
-              </a:ext>
-            </a:extLst>
-          </p:cNvPr>
-          <p:cNvSpPr txBox="1"/>
-          <p:nvPr/>
-        </p:nvSpPr>
-        <p:spPr>
-          <a:xfrm>
-            <a:off x="1084319" y="741040"/>
-            <a:ext cx="2485538" cy="369332"/>
-          </a:xfrm>
-          <a:prstGeom prst="rect">
-            <a:avLst/>
-          </a:prstGeom>
-          <a:noFill/>
-        </p:spPr>
-        <p:txBody>
-          <a:bodyPr wrap="square" rtlCol="0">
-            <a:spAutoFit/>
-          </a:bodyPr>
-          <a:lstStyle/>
-          <a:p>
-            <a:pPr algn="ctr"/>
-            <a:r>
-              <a:rPr lang="en-US" b="1"/>
-              <a:t>Population by Year SSP3</a:t>
-            </a:r>
-          </a:p>
-        </p:txBody>
-      </p:sp>
-      <p:sp>
-        <p:nvSpPr>
-          <p:cNvPr id="65" name="TextBox 64">
-            <a:extLst>
-              <a:ext uri="{FF2B5EF4-FFF2-40B4-BE49-F238E27FC236}">
-                <a16:creationId xmlns:a16="http://schemas.microsoft.com/office/drawing/2014/main" id="{D00C1B6A-B22A-4D19-91EF-C8BA151777A4}"/>
-              </a:ext>
-            </a:extLst>
-          </p:cNvPr>
-          <p:cNvSpPr txBox="1"/>
-          <p:nvPr/>
-        </p:nvSpPr>
-        <p:spPr>
-          <a:xfrm>
-            <a:off x="807994" y="3486630"/>
-            <a:ext cx="2485538" cy="646331"/>
-          </a:xfrm>
-          <a:prstGeom prst="rect">
-            <a:avLst/>
-          </a:prstGeom>
-          <a:noFill/>
-        </p:spPr>
-        <p:txBody>
-          <a:bodyPr wrap="square" rtlCol="0">
-            <a:spAutoFit/>
-          </a:bodyPr>
-          <a:lstStyle/>
-          <a:p>
-            <a:pPr algn="ctr"/>
-            <a:r>
-              <a:rPr lang="en-US" b="1"/>
-              <a:t>Land Allocation SSP5</a:t>
-            </a:r>
-          </a:p>
-          <a:p>
-            <a:pPr algn="ctr"/>
-            <a:r>
-              <a:rPr lang="en-US" b="1"/>
-              <a:t>(Mean 2010 to 2050)</a:t>
-            </a:r>
-          </a:p>
-        </p:txBody>
-      </p:sp>
-      <p:sp>
-        <p:nvSpPr>
-          <p:cNvPr id="66" name="TextBox 65">
-            <a:extLst>
-              <a:ext uri="{FF2B5EF4-FFF2-40B4-BE49-F238E27FC236}">
-                <a16:creationId xmlns:a16="http://schemas.microsoft.com/office/drawing/2014/main" id="{D23BD46B-EFD3-48A8-A749-606D7DA6C469}"/>
-              </a:ext>
-            </a:extLst>
-          </p:cNvPr>
-          <p:cNvSpPr txBox="1"/>
-          <p:nvPr/>
-        </p:nvSpPr>
-        <p:spPr>
-          <a:xfrm>
-            <a:off x="4853231" y="3552051"/>
-            <a:ext cx="2485538" cy="369332"/>
-          </a:xfrm>
-          <a:prstGeom prst="rect">
-            <a:avLst/>
-          </a:prstGeom>
-          <a:noFill/>
-        </p:spPr>
-        <p:txBody>
-          <a:bodyPr wrap="square" rtlCol="0">
-            <a:spAutoFit/>
-          </a:bodyPr>
-          <a:lstStyle/>
-          <a:p>
-            <a:pPr algn="ctr"/>
-            <a:r>
-              <a:rPr lang="en-US" b="1"/>
-              <a:t>Runoff by Basin 2050</a:t>
-            </a:r>
-          </a:p>
-        </p:txBody>
-      </p:sp>
-      <p:sp>
-        <p:nvSpPr>
-          <p:cNvPr id="67" name="TextBox 66">
-            <a:extLst>
-              <a:ext uri="{FF2B5EF4-FFF2-40B4-BE49-F238E27FC236}">
-                <a16:creationId xmlns:a16="http://schemas.microsoft.com/office/drawing/2014/main" id="{80439EAE-3020-4A30-8A0D-8343E7A17CD8}"/>
-              </a:ext>
-            </a:extLst>
-          </p:cNvPr>
-          <p:cNvSpPr txBox="1"/>
-          <p:nvPr/>
-        </p:nvSpPr>
-        <p:spPr>
-          <a:xfrm>
-            <a:off x="8412211" y="3447289"/>
-            <a:ext cx="2950299" cy="646331"/>
-          </a:xfrm>
-          <a:prstGeom prst="rect">
-            <a:avLst/>
-          </a:prstGeom>
-          <a:noFill/>
-        </p:spPr>
-        <p:txBody>
-          <a:bodyPr wrap="square" rtlCol="0">
-            <a:spAutoFit/>
-          </a:bodyPr>
-          <a:lstStyle/>
-          <a:p>
-            <a:pPr algn="ctr"/>
-            <a:r>
-              <a:rPr lang="en-US" b="1"/>
-              <a:t>Percentage Diff Elec Gen</a:t>
-            </a:r>
-          </a:p>
-          <a:p>
-            <a:pPr algn="ctr"/>
-            <a:r>
-              <a:rPr lang="en-US" b="1"/>
-              <a:t>(SSP5 – SSP3)</a:t>
-            </a:r>
-          </a:p>
-        </p:txBody>
-      </p:sp>
-      <p:pic>
-        <p:nvPicPr>
-          <p:cNvPr id="6" name="Picture 5" descr="A picture containing text, map&#10;&#10;Description automatically generated">
-            <a:extLst>
-              <a:ext uri="{FF2B5EF4-FFF2-40B4-BE49-F238E27FC236}">
-                <a16:creationId xmlns:a16="http://schemas.microsoft.com/office/drawing/2014/main" id="{5246A03D-8991-4794-AFC7-9553B33AAC8B}"/>
-              </a:ext>
-            </a:extLst>
-          </p:cNvPr>
-          <p:cNvPicPr>
-            <a:picLocks noChangeAspect="1"/>
-          </p:cNvPicPr>
-          <p:nvPr/>
-        </p:nvPicPr>
-        <p:blipFill>
-          <a:blip r:embed="rId2" cstate="print">
-            <a:extLst>
-              <a:ext uri="{28A0092B-C50C-407E-A947-70E740481C1C}">
-                <a14:useLocalDpi xmlns:a14="http://schemas.microsoft.com/office/drawing/2010/main" val="0"/>
-              </a:ext>
-            </a:extLst>
-          </a:blip>
-          <a:stretch>
-            <a:fillRect/>
-          </a:stretch>
-        </p:blipFill>
-        <p:spPr>
-          <a:xfrm>
-            <a:off x="4568054" y="4106049"/>
-            <a:ext cx="3655891" cy="2472811"/>
-          </a:xfrm>
-          <a:prstGeom prst="rect">
-            <a:avLst/>
-          </a:prstGeom>
-        </p:spPr>
-      </p:pic>
-      <p:pic>
-        <p:nvPicPr>
-          <p:cNvPr id="17" name="Picture 16" descr="A picture containing text, map&#10;&#10;Description automatically generated">
-            <a:extLst>
-              <a:ext uri="{FF2B5EF4-FFF2-40B4-BE49-F238E27FC236}">
-                <a16:creationId xmlns:a16="http://schemas.microsoft.com/office/drawing/2014/main" id="{1CF5B8F5-FA65-42EB-B3F1-1C8421421835}"/>
-              </a:ext>
-            </a:extLst>
-          </p:cNvPr>
-          <p:cNvPicPr>
-            <a:picLocks noChangeAspect="1"/>
-          </p:cNvPicPr>
-          <p:nvPr/>
-        </p:nvPicPr>
-        <p:blipFill>
-          <a:blip r:embed="rId3" cstate="print">
-            <a:extLst>
-              <a:ext uri="{28A0092B-C50C-407E-A947-70E740481C1C}">
-                <a14:useLocalDpi xmlns:a14="http://schemas.microsoft.com/office/drawing/2010/main" val="0"/>
-              </a:ext>
-            </a:extLst>
-          </a:blip>
-          <a:stretch>
-            <a:fillRect/>
-          </a:stretch>
-        </p:blipFill>
-        <p:spPr>
-          <a:xfrm>
-            <a:off x="672542" y="4106049"/>
-            <a:ext cx="3717897" cy="2472811"/>
-          </a:xfrm>
-          <a:prstGeom prst="rect">
-            <a:avLst/>
-          </a:prstGeom>
-        </p:spPr>
-      </p:pic>
-      <p:pic>
-        <p:nvPicPr>
-          <p:cNvPr id="19" name="Picture 18" descr="A close up of a map&#10;&#10;Description automatically generated">
-            <a:extLst>
-              <a:ext uri="{FF2B5EF4-FFF2-40B4-BE49-F238E27FC236}">
-                <a16:creationId xmlns:a16="http://schemas.microsoft.com/office/drawing/2014/main" id="{0D9FB249-DA1F-47EC-A0F5-53F1A1704847}"/>
-              </a:ext>
-            </a:extLst>
-          </p:cNvPr>
-          <p:cNvPicPr>
-            <a:picLocks noChangeAspect="1"/>
-          </p:cNvPicPr>
-          <p:nvPr/>
-        </p:nvPicPr>
-        <p:blipFill>
-          <a:blip r:embed="rId4">
-            <a:extLst>
-              <a:ext uri="{28A0092B-C50C-407E-A947-70E740481C1C}">
-                <a14:useLocalDpi xmlns:a14="http://schemas.microsoft.com/office/drawing/2010/main" val="0"/>
-              </a:ext>
-            </a:extLst>
-          </a:blip>
-          <a:stretch>
-            <a:fillRect/>
-          </a:stretch>
-        </p:blipFill>
-        <p:spPr>
-          <a:xfrm>
-            <a:off x="3934490" y="221175"/>
-            <a:ext cx="7428020" cy="1409063"/>
-          </a:xfrm>
-          <a:prstGeom prst="rect">
-            <a:avLst/>
-          </a:prstGeom>
-        </p:spPr>
-      </p:pic>
-      <p:pic>
-        <p:nvPicPr>
-          <p:cNvPr id="21" name="Picture 20" descr="A picture containing text, map&#10;&#10;Description automatically generated">
-            <a:extLst>
-              <a:ext uri="{FF2B5EF4-FFF2-40B4-BE49-F238E27FC236}">
-                <a16:creationId xmlns:a16="http://schemas.microsoft.com/office/drawing/2014/main" id="{46679271-34BC-46F3-A89F-3DD2AA742315}"/>
-              </a:ext>
-            </a:extLst>
-          </p:cNvPr>
-          <p:cNvPicPr>
-            <a:picLocks noChangeAspect="1"/>
-          </p:cNvPicPr>
-          <p:nvPr/>
-        </p:nvPicPr>
-        <p:blipFill>
-          <a:blip r:embed="rId5">
-            <a:extLst>
-              <a:ext uri="{28A0092B-C50C-407E-A947-70E740481C1C}">
-                <a14:useLocalDpi xmlns:a14="http://schemas.microsoft.com/office/drawing/2010/main" val="0"/>
-              </a:ext>
-            </a:extLst>
-          </a:blip>
-          <a:stretch>
-            <a:fillRect/>
-          </a:stretch>
-        </p:blipFill>
-        <p:spPr>
-          <a:xfrm>
-            <a:off x="3934490" y="1828225"/>
-            <a:ext cx="7223619" cy="1409062"/>
-          </a:xfrm>
-          <a:prstGeom prst="rect">
-            <a:avLst/>
-          </a:prstGeom>
-        </p:spPr>
-      </p:pic>
-      <p:sp>
-        <p:nvSpPr>
-          <p:cNvPr id="30" name="TextBox 29">
-            <a:extLst>
-              <a:ext uri="{FF2B5EF4-FFF2-40B4-BE49-F238E27FC236}">
-                <a16:creationId xmlns:a16="http://schemas.microsoft.com/office/drawing/2014/main" id="{2DFD97C6-B7A5-4D16-B656-84935B142B4C}"/>
-              </a:ext>
-            </a:extLst>
-          </p:cNvPr>
-          <p:cNvSpPr txBox="1"/>
-          <p:nvPr/>
-        </p:nvSpPr>
-        <p:spPr>
-          <a:xfrm>
-            <a:off x="1084319" y="1981564"/>
-            <a:ext cx="2485538" cy="923330"/>
-          </a:xfrm>
-          <a:prstGeom prst="rect">
-            <a:avLst/>
-          </a:prstGeom>
-          <a:noFill/>
-        </p:spPr>
-        <p:txBody>
-          <a:bodyPr wrap="square" rtlCol="0">
-            <a:spAutoFit/>
-          </a:bodyPr>
-          <a:lstStyle/>
-          <a:p>
-            <a:pPr algn="ctr"/>
-            <a:r>
-              <a:rPr lang="en-US" b="1"/>
-              <a:t>Absolute Difference in Population by Year</a:t>
-            </a:r>
-          </a:p>
-          <a:p>
-            <a:pPr algn="ctr"/>
-            <a:r>
-              <a:rPr lang="en-US" b="1"/>
-              <a:t>(SSP5 – SSP3)</a:t>
-            </a:r>
-          </a:p>
-        </p:txBody>
-      </p:sp>
-      <p:pic>
-        <p:nvPicPr>
-          <p:cNvPr id="25" name="Picture 24" descr="A picture containing text, map&#10;&#10;Description automatically generated">
-            <a:extLst>
-              <a:ext uri="{FF2B5EF4-FFF2-40B4-BE49-F238E27FC236}">
-                <a16:creationId xmlns:a16="http://schemas.microsoft.com/office/drawing/2014/main" id="{1F8DE4E6-08A9-4594-88BA-0F93AA1C048E}"/>
-              </a:ext>
-            </a:extLst>
-          </p:cNvPr>
-          <p:cNvPicPr>
-            <a:picLocks noChangeAspect="1"/>
-          </p:cNvPicPr>
-          <p:nvPr/>
-        </p:nvPicPr>
-        <p:blipFill>
-          <a:blip r:embed="rId6" cstate="print">
-            <a:extLst>
-              <a:ext uri="{28A0092B-C50C-407E-A947-70E740481C1C}">
-                <a14:useLocalDpi xmlns:a14="http://schemas.microsoft.com/office/drawing/2010/main" val="0"/>
-              </a:ext>
-            </a:extLst>
-          </a:blip>
-          <a:stretch>
-            <a:fillRect/>
-          </a:stretch>
-        </p:blipFill>
-        <p:spPr>
-          <a:xfrm>
-            <a:off x="8223945" y="4135943"/>
-            <a:ext cx="3424701" cy="2413022"/>
-          </a:xfrm>
-          <a:prstGeom prst="rect">
-            <a:avLst/>
-          </a:prstGeom>
-        </p:spPr>
-      </p:pic>
-    </p:spTree>
-    <p:extLst>
-      <p:ext uri="{BB962C8B-B14F-4D97-AF65-F5344CB8AC3E}">
-        <p14:creationId xmlns:p14="http://schemas.microsoft.com/office/powerpoint/2010/main" val="454569677"/>
-      </p:ext>
-    </p:extLst>
-  </p:cSld>
-  <p:clrMapOvr>
-    <a:masterClrMapping/>
-  </p:clrMapOvr>
-</p:sld>
-</file>
-
 <file path=ppt/slides/slide4.xml><?xml version="1.0" encoding="utf-8"?>
 <p:sld xmlns:a="http://schemas.openxmlformats.org/drawingml/2006/main" xmlns:r="http://schemas.openxmlformats.org/officeDocument/2006/relationships" xmlns:p="http://schemas.openxmlformats.org/presentationml/2006/main">
   <p:cSld>
@@ -15905,7 +16037,7 @@
         </p:nvSpPr>
         <p:spPr>
           <a:xfrm>
-            <a:off x="201996" y="-369332"/>
+            <a:off x="192162" y="-345805"/>
             <a:ext cx="3101370" cy="369332"/>
           </a:xfrm>
           <a:prstGeom prst="rect">
@@ -15922,7 +16054,7 @@
             <a:pPr algn="ctr"/>
             <a:r>
               <a:rPr lang="en-US" b="1"/>
-              <a:t>GCAM by Class Figs</a:t>
+              <a:t>GCAM by Param Figs</a:t>
             </a:r>
           </a:p>
         </p:txBody>
@@ -15932,7 +16064,7 @@
           <p:cNvPr id="3" name="Rectangle 2">
             <a:extLst>
               <a:ext uri="{FF2B5EF4-FFF2-40B4-BE49-F238E27FC236}">
-                <a16:creationId xmlns:a16="http://schemas.microsoft.com/office/drawing/2014/main" id="{80047060-3AA7-4699-9EAE-4E3F4573EEA2}"/>
+                <a16:creationId xmlns:a16="http://schemas.microsoft.com/office/drawing/2014/main" id="{F74BF3CB-7E52-4F13-8449-FE231ADB4921}"/>
               </a:ext>
             </a:extLst>
           </p:cNvPr>
@@ -15981,84 +16113,12 @@
           </a:p>
         </p:txBody>
       </p:sp>
-      <p:pic>
-        <p:nvPicPr>
-          <p:cNvPr id="4" name="Picture 3" descr="A close up of a map&#10;&#10;Description automatically generated">
-            <a:extLst>
-              <a:ext uri="{FF2B5EF4-FFF2-40B4-BE49-F238E27FC236}">
-                <a16:creationId xmlns:a16="http://schemas.microsoft.com/office/drawing/2014/main" id="{54953583-8DC0-4DC1-9C80-59364DCE9939}"/>
-              </a:ext>
-            </a:extLst>
-          </p:cNvPr>
-          <p:cNvPicPr>
-            <a:picLocks noChangeAspect="1"/>
-          </p:cNvPicPr>
-          <p:nvPr/>
-        </p:nvPicPr>
-        <p:blipFill>
-          <a:blip r:embed="rId2">
-            <a:extLst>
-              <a:ext uri="{28A0092B-C50C-407E-A947-70E740481C1C}">
-                <a14:useLocalDpi xmlns:a14="http://schemas.microsoft.com/office/drawing/2010/main" val="0"/>
-              </a:ext>
-            </a:extLst>
-          </a:blip>
-          <a:stretch>
-            <a:fillRect/>
-          </a:stretch>
-        </p:blipFill>
-        <p:spPr>
-          <a:xfrm>
-            <a:off x="592175" y="545082"/>
-            <a:ext cx="7331022" cy="3993389"/>
-          </a:xfrm>
-          <a:prstGeom prst="rect">
-            <a:avLst/>
-          </a:prstGeom>
-        </p:spPr>
-      </p:pic>
-      <p:pic>
-        <p:nvPicPr>
-          <p:cNvPr id="6" name="Picture 5" descr="A picture containing text, map&#10;&#10;Description automatically generated">
-            <a:extLst>
-              <a:ext uri="{FF2B5EF4-FFF2-40B4-BE49-F238E27FC236}">
-                <a16:creationId xmlns:a16="http://schemas.microsoft.com/office/drawing/2014/main" id="{949EBDC5-4E80-425B-84EA-DDBD3A9647A4}"/>
-              </a:ext>
-            </a:extLst>
-          </p:cNvPr>
-          <p:cNvPicPr>
-            <a:picLocks noChangeAspect="1"/>
-          </p:cNvPicPr>
-          <p:nvPr/>
-        </p:nvPicPr>
-        <p:blipFill>
-          <a:blip r:embed="rId3">
-            <a:extLst>
-              <a:ext uri="{28A0092B-C50C-407E-A947-70E740481C1C}">
-                <a14:useLocalDpi xmlns:a14="http://schemas.microsoft.com/office/drawing/2010/main" val="0"/>
-              </a:ext>
-            </a:extLst>
-          </a:blip>
-          <a:stretch>
-            <a:fillRect/>
-          </a:stretch>
-        </p:blipFill>
-        <p:spPr>
-          <a:xfrm>
-            <a:off x="4257686" y="3783081"/>
-            <a:ext cx="7525130" cy="2748571"/>
-          </a:xfrm>
-          <a:prstGeom prst="rect">
-            <a:avLst/>
-          </a:prstGeom>
-        </p:spPr>
-      </p:pic>
       <p:sp>
         <p:nvSpPr>
-          <p:cNvPr id="9" name="TextBox 8">
-            <a:extLst>
-              <a:ext uri="{FF2B5EF4-FFF2-40B4-BE49-F238E27FC236}">
-                <a16:creationId xmlns:a16="http://schemas.microsoft.com/office/drawing/2014/main" id="{65A82A39-C97E-4486-BF84-AD752A7FF992}"/>
+          <p:cNvPr id="64" name="TextBox 63">
+            <a:extLst>
+              <a:ext uri="{FF2B5EF4-FFF2-40B4-BE49-F238E27FC236}">
+                <a16:creationId xmlns:a16="http://schemas.microsoft.com/office/drawing/2014/main" id="{7628F066-CA00-4417-A6D9-707233D718F1}"/>
               </a:ext>
             </a:extLst>
           </p:cNvPr>
@@ -16067,8 +16127,8 @@
         </p:nvSpPr>
         <p:spPr>
           <a:xfrm>
-            <a:off x="1556139" y="175750"/>
-            <a:ext cx="4210816" cy="369332"/>
+            <a:off x="1084319" y="741040"/>
+            <a:ext cx="2485538" cy="369332"/>
           </a:xfrm>
           <a:prstGeom prst="rect">
             <a:avLst/>
@@ -16084,17 +16144,17 @@
             <a:pPr algn="ctr"/>
             <a:r>
               <a:rPr lang="en-US" b="1"/>
-              <a:t>Electricity Generation SSP5 by Class 2040</a:t>
+              <a:t>Population by Year SSP3</a:t>
             </a:r>
           </a:p>
         </p:txBody>
       </p:sp>
       <p:sp>
         <p:nvSpPr>
-          <p:cNvPr id="10" name="TextBox 9">
-            <a:extLst>
-              <a:ext uri="{FF2B5EF4-FFF2-40B4-BE49-F238E27FC236}">
-                <a16:creationId xmlns:a16="http://schemas.microsoft.com/office/drawing/2014/main" id="{52335815-A0C2-4151-96C4-FDD5E5395A04}"/>
+          <p:cNvPr id="65" name="TextBox 64">
+            <a:extLst>
+              <a:ext uri="{FF2B5EF4-FFF2-40B4-BE49-F238E27FC236}">
+                <a16:creationId xmlns:a16="http://schemas.microsoft.com/office/drawing/2014/main" id="{D00C1B6A-B22A-4D19-91EF-C8BA151777A4}"/>
               </a:ext>
             </a:extLst>
           </p:cNvPr>
@@ -16103,8 +16163,8 @@
         </p:nvSpPr>
         <p:spPr>
           <a:xfrm>
-            <a:off x="5929124" y="3429000"/>
-            <a:ext cx="3976074" cy="369332"/>
+            <a:off x="807994" y="3486630"/>
+            <a:ext cx="2485538" cy="646331"/>
           </a:xfrm>
           <a:prstGeom prst="rect">
             <a:avLst/>
@@ -16120,15 +16180,324 @@
             <a:pPr algn="ctr"/>
             <a:r>
               <a:rPr lang="en-US" b="1"/>
-              <a:t>Land Allocation SSP5 by Class 2040</a:t>
+              <a:t>Land Allocation SSP5</a:t>
+            </a:r>
+          </a:p>
+          <a:p>
+            <a:pPr algn="ctr"/>
+            <a:r>
+              <a:rPr lang="en-US" b="1"/>
+              <a:t>(Mean 2010 to 2050)</a:t>
             </a:r>
           </a:p>
         </p:txBody>
       </p:sp>
+      <p:sp>
+        <p:nvSpPr>
+          <p:cNvPr id="66" name="TextBox 65">
+            <a:extLst>
+              <a:ext uri="{FF2B5EF4-FFF2-40B4-BE49-F238E27FC236}">
+                <a16:creationId xmlns:a16="http://schemas.microsoft.com/office/drawing/2014/main" id="{D23BD46B-EFD3-48A8-A749-606D7DA6C469}"/>
+              </a:ext>
+            </a:extLst>
+          </p:cNvPr>
+          <p:cNvSpPr txBox="1"/>
+          <p:nvPr/>
+        </p:nvSpPr>
+        <p:spPr>
+          <a:xfrm>
+            <a:off x="4853231" y="3552051"/>
+            <a:ext cx="2485538" cy="369332"/>
+          </a:xfrm>
+          <a:prstGeom prst="rect">
+            <a:avLst/>
+          </a:prstGeom>
+          <a:noFill/>
+        </p:spPr>
+        <p:txBody>
+          <a:bodyPr wrap="square" rtlCol="0">
+            <a:spAutoFit/>
+          </a:bodyPr>
+          <a:lstStyle/>
+          <a:p>
+            <a:pPr algn="ctr"/>
+            <a:r>
+              <a:rPr lang="en-US" b="1"/>
+              <a:t>Runoff by Basin 2050</a:t>
+            </a:r>
+          </a:p>
+        </p:txBody>
+      </p:sp>
+      <p:sp>
+        <p:nvSpPr>
+          <p:cNvPr id="67" name="TextBox 66">
+            <a:extLst>
+              <a:ext uri="{FF2B5EF4-FFF2-40B4-BE49-F238E27FC236}">
+                <a16:creationId xmlns:a16="http://schemas.microsoft.com/office/drawing/2014/main" id="{80439EAE-3020-4A30-8A0D-8343E7A17CD8}"/>
+              </a:ext>
+            </a:extLst>
+          </p:cNvPr>
+          <p:cNvSpPr txBox="1"/>
+          <p:nvPr/>
+        </p:nvSpPr>
+        <p:spPr>
+          <a:xfrm>
+            <a:off x="8412211" y="3447289"/>
+            <a:ext cx="2950299" cy="646331"/>
+          </a:xfrm>
+          <a:prstGeom prst="rect">
+            <a:avLst/>
+          </a:prstGeom>
+          <a:noFill/>
+        </p:spPr>
+        <p:txBody>
+          <a:bodyPr wrap="square" rtlCol="0">
+            <a:spAutoFit/>
+          </a:bodyPr>
+          <a:lstStyle/>
+          <a:p>
+            <a:pPr algn="ctr"/>
+            <a:r>
+              <a:rPr lang="en-US" b="1"/>
+              <a:t>Percentage Diff Elec Gen</a:t>
+            </a:r>
+          </a:p>
+          <a:p>
+            <a:pPr algn="ctr"/>
+            <a:r>
+              <a:rPr lang="en-US" b="1"/>
+              <a:t>(SSP5 – SSP3)</a:t>
+            </a:r>
+          </a:p>
+        </p:txBody>
+      </p:sp>
+      <p:pic>
+        <p:nvPicPr>
+          <p:cNvPr id="6" name="Picture 5" descr="A picture containing text, map&#10;&#10;Description automatically generated">
+            <a:extLst>
+              <a:ext uri="{FF2B5EF4-FFF2-40B4-BE49-F238E27FC236}">
+                <a16:creationId xmlns:a16="http://schemas.microsoft.com/office/drawing/2014/main" id="{5246A03D-8991-4794-AFC7-9553B33AAC8B}"/>
+              </a:ext>
+            </a:extLst>
+          </p:cNvPr>
+          <p:cNvPicPr>
+            <a:picLocks noChangeAspect="1"/>
+          </p:cNvPicPr>
+          <p:nvPr/>
+        </p:nvPicPr>
+        <p:blipFill>
+          <a:blip r:embed="rId2" cstate="print">
+            <a:extLst>
+              <a:ext uri="{28A0092B-C50C-407E-A947-70E740481C1C}">
+                <a14:useLocalDpi xmlns:a14="http://schemas.microsoft.com/office/drawing/2010/main" val="0"/>
+              </a:ext>
+            </a:extLst>
+          </a:blip>
+          <a:stretch>
+            <a:fillRect/>
+          </a:stretch>
+        </p:blipFill>
+        <p:spPr>
+          <a:xfrm>
+            <a:off x="4568054" y="4106049"/>
+            <a:ext cx="3655891" cy="2472811"/>
+          </a:xfrm>
+          <a:prstGeom prst="rect">
+            <a:avLst/>
+          </a:prstGeom>
+        </p:spPr>
+      </p:pic>
+      <p:pic>
+        <p:nvPicPr>
+          <p:cNvPr id="17" name="Picture 16" descr="A picture containing text, map&#10;&#10;Description automatically generated">
+            <a:extLst>
+              <a:ext uri="{FF2B5EF4-FFF2-40B4-BE49-F238E27FC236}">
+                <a16:creationId xmlns:a16="http://schemas.microsoft.com/office/drawing/2014/main" id="{1CF5B8F5-FA65-42EB-B3F1-1C8421421835}"/>
+              </a:ext>
+            </a:extLst>
+          </p:cNvPr>
+          <p:cNvPicPr>
+            <a:picLocks noChangeAspect="1"/>
+          </p:cNvPicPr>
+          <p:nvPr/>
+        </p:nvPicPr>
+        <p:blipFill>
+          <a:blip r:embed="rId3" cstate="print">
+            <a:extLst>
+              <a:ext uri="{28A0092B-C50C-407E-A947-70E740481C1C}">
+                <a14:useLocalDpi xmlns:a14="http://schemas.microsoft.com/office/drawing/2010/main" val="0"/>
+              </a:ext>
+            </a:extLst>
+          </a:blip>
+          <a:stretch>
+            <a:fillRect/>
+          </a:stretch>
+        </p:blipFill>
+        <p:spPr>
+          <a:xfrm>
+            <a:off x="672542" y="4106049"/>
+            <a:ext cx="3717897" cy="2472811"/>
+          </a:xfrm>
+          <a:prstGeom prst="rect">
+            <a:avLst/>
+          </a:prstGeom>
+        </p:spPr>
+      </p:pic>
+      <p:pic>
+        <p:nvPicPr>
+          <p:cNvPr id="19" name="Picture 18" descr="A close up of a map&#10;&#10;Description automatically generated">
+            <a:extLst>
+              <a:ext uri="{FF2B5EF4-FFF2-40B4-BE49-F238E27FC236}">
+                <a16:creationId xmlns:a16="http://schemas.microsoft.com/office/drawing/2014/main" id="{0D9FB249-DA1F-47EC-A0F5-53F1A1704847}"/>
+              </a:ext>
+            </a:extLst>
+          </p:cNvPr>
+          <p:cNvPicPr>
+            <a:picLocks noChangeAspect="1"/>
+          </p:cNvPicPr>
+          <p:nvPr/>
+        </p:nvPicPr>
+        <p:blipFill>
+          <a:blip r:embed="rId4">
+            <a:extLst>
+              <a:ext uri="{28A0092B-C50C-407E-A947-70E740481C1C}">
+                <a14:useLocalDpi xmlns:a14="http://schemas.microsoft.com/office/drawing/2010/main" val="0"/>
+              </a:ext>
+            </a:extLst>
+          </a:blip>
+          <a:stretch>
+            <a:fillRect/>
+          </a:stretch>
+        </p:blipFill>
+        <p:spPr>
+          <a:xfrm>
+            <a:off x="3934490" y="221175"/>
+            <a:ext cx="7428020" cy="1409063"/>
+          </a:xfrm>
+          <a:prstGeom prst="rect">
+            <a:avLst/>
+          </a:prstGeom>
+        </p:spPr>
+      </p:pic>
+      <p:pic>
+        <p:nvPicPr>
+          <p:cNvPr id="21" name="Picture 20" descr="A picture containing text, map&#10;&#10;Description automatically generated">
+            <a:extLst>
+              <a:ext uri="{FF2B5EF4-FFF2-40B4-BE49-F238E27FC236}">
+                <a16:creationId xmlns:a16="http://schemas.microsoft.com/office/drawing/2014/main" id="{46679271-34BC-46F3-A89F-3DD2AA742315}"/>
+              </a:ext>
+            </a:extLst>
+          </p:cNvPr>
+          <p:cNvPicPr>
+            <a:picLocks noChangeAspect="1"/>
+          </p:cNvPicPr>
+          <p:nvPr/>
+        </p:nvPicPr>
+        <p:blipFill>
+          <a:blip r:embed="rId5">
+            <a:extLst>
+              <a:ext uri="{28A0092B-C50C-407E-A947-70E740481C1C}">
+                <a14:useLocalDpi xmlns:a14="http://schemas.microsoft.com/office/drawing/2010/main" val="0"/>
+              </a:ext>
+            </a:extLst>
+          </a:blip>
+          <a:stretch>
+            <a:fillRect/>
+          </a:stretch>
+        </p:blipFill>
+        <p:spPr>
+          <a:xfrm>
+            <a:off x="3934490" y="1828225"/>
+            <a:ext cx="7223619" cy="1409062"/>
+          </a:xfrm>
+          <a:prstGeom prst="rect">
+            <a:avLst/>
+          </a:prstGeom>
+        </p:spPr>
+      </p:pic>
+      <p:sp>
+        <p:nvSpPr>
+          <p:cNvPr id="30" name="TextBox 29">
+            <a:extLst>
+              <a:ext uri="{FF2B5EF4-FFF2-40B4-BE49-F238E27FC236}">
+                <a16:creationId xmlns:a16="http://schemas.microsoft.com/office/drawing/2014/main" id="{2DFD97C6-B7A5-4D16-B656-84935B142B4C}"/>
+              </a:ext>
+            </a:extLst>
+          </p:cNvPr>
+          <p:cNvSpPr txBox="1"/>
+          <p:nvPr/>
+        </p:nvSpPr>
+        <p:spPr>
+          <a:xfrm>
+            <a:off x="1084319" y="1981564"/>
+            <a:ext cx="2485538" cy="923330"/>
+          </a:xfrm>
+          <a:prstGeom prst="rect">
+            <a:avLst/>
+          </a:prstGeom>
+          <a:noFill/>
+        </p:spPr>
+        <p:txBody>
+          <a:bodyPr wrap="square" rtlCol="0">
+            <a:spAutoFit/>
+          </a:bodyPr>
+          <a:lstStyle/>
+          <a:p>
+            <a:pPr algn="ctr"/>
+            <a:r>
+              <a:rPr lang="en-US" b="1"/>
+              <a:t>Absolute Difference in Population by Year</a:t>
+            </a:r>
+          </a:p>
+          <a:p>
+            <a:pPr algn="ctr"/>
+            <a:r>
+              <a:rPr lang="en-US" b="1"/>
+              <a:t>(SSP5 – SSP3)</a:t>
+            </a:r>
+          </a:p>
+        </p:txBody>
+      </p:sp>
+      <p:pic>
+        <p:nvPicPr>
+          <p:cNvPr id="25" name="Picture 24" descr="A picture containing text, map&#10;&#10;Description automatically generated">
+            <a:extLst>
+              <a:ext uri="{FF2B5EF4-FFF2-40B4-BE49-F238E27FC236}">
+                <a16:creationId xmlns:a16="http://schemas.microsoft.com/office/drawing/2014/main" id="{1F8DE4E6-08A9-4594-88BA-0F93AA1C048E}"/>
+              </a:ext>
+            </a:extLst>
+          </p:cNvPr>
+          <p:cNvPicPr>
+            <a:picLocks noChangeAspect="1"/>
+          </p:cNvPicPr>
+          <p:nvPr/>
+        </p:nvPicPr>
+        <p:blipFill>
+          <a:blip r:embed="rId6" cstate="print">
+            <a:extLst>
+              <a:ext uri="{28A0092B-C50C-407E-A947-70E740481C1C}">
+                <a14:useLocalDpi xmlns:a14="http://schemas.microsoft.com/office/drawing/2010/main" val="0"/>
+              </a:ext>
+            </a:extLst>
+          </a:blip>
+          <a:stretch>
+            <a:fillRect/>
+          </a:stretch>
+        </p:blipFill>
+        <p:spPr>
+          <a:xfrm>
+            <a:off x="8223945" y="4135943"/>
+            <a:ext cx="3424701" cy="2413022"/>
+          </a:xfrm>
+          <a:prstGeom prst="rect">
+            <a:avLst/>
+          </a:prstGeom>
+        </p:spPr>
+      </p:pic>
     </p:spTree>
     <p:extLst>
       <p:ext uri="{BB962C8B-B14F-4D97-AF65-F5344CB8AC3E}">
-        <p14:creationId xmlns:p14="http://schemas.microsoft.com/office/powerpoint/2010/main" val="1298961020"/>
+        <p14:creationId xmlns:p14="http://schemas.microsoft.com/office/powerpoint/2010/main" val="454569677"/>
       </p:ext>
     </p:extLst>
   </p:cSld>
@@ -16157,6 +16526,270 @@
       </p:grpSpPr>
       <p:sp>
         <p:nvSpPr>
+          <p:cNvPr id="7" name="TextBox 6">
+            <a:extLst>
+              <a:ext uri="{FF2B5EF4-FFF2-40B4-BE49-F238E27FC236}">
+                <a16:creationId xmlns:a16="http://schemas.microsoft.com/office/drawing/2014/main" id="{A063DF1C-7DF0-40B4-AC9D-EC918B0CB000}"/>
+              </a:ext>
+            </a:extLst>
+          </p:cNvPr>
+          <p:cNvSpPr txBox="1"/>
+          <p:nvPr/>
+        </p:nvSpPr>
+        <p:spPr>
+          <a:xfrm>
+            <a:off x="201996" y="-369332"/>
+            <a:ext cx="3101370" cy="369332"/>
+          </a:xfrm>
+          <a:prstGeom prst="rect">
+            <a:avLst/>
+          </a:prstGeom>
+          <a:noFill/>
+        </p:spPr>
+        <p:txBody>
+          <a:bodyPr wrap="square" rtlCol="0">
+            <a:spAutoFit/>
+          </a:bodyPr>
+          <a:lstStyle/>
+          <a:p>
+            <a:pPr algn="ctr"/>
+            <a:r>
+              <a:rPr lang="en-US" b="1"/>
+              <a:t>GCAM by Class Figs</a:t>
+            </a:r>
+          </a:p>
+        </p:txBody>
+      </p:sp>
+      <p:sp>
+        <p:nvSpPr>
+          <p:cNvPr id="3" name="Rectangle 2">
+            <a:extLst>
+              <a:ext uri="{FF2B5EF4-FFF2-40B4-BE49-F238E27FC236}">
+                <a16:creationId xmlns:a16="http://schemas.microsoft.com/office/drawing/2014/main" id="{80047060-3AA7-4699-9EAE-4E3F4573EEA2}"/>
+              </a:ext>
+            </a:extLst>
+          </p:cNvPr>
+          <p:cNvSpPr/>
+          <p:nvPr/>
+        </p:nvSpPr>
+        <p:spPr>
+          <a:xfrm>
+            <a:off x="442452" y="117988"/>
+            <a:ext cx="11444747" cy="6548284"/>
+          </a:xfrm>
+          <a:prstGeom prst="rect">
+            <a:avLst/>
+          </a:prstGeom>
+          <a:noFill/>
+          <a:ln>
+            <a:solidFill>
+              <a:schemeClr val="bg1">
+                <a:lumMod val="65000"/>
+              </a:schemeClr>
+            </a:solidFill>
+          </a:ln>
+        </p:spPr>
+        <p:style>
+          <a:lnRef idx="2">
+            <a:schemeClr val="accent1">
+              <a:shade val="50000"/>
+            </a:schemeClr>
+          </a:lnRef>
+          <a:fillRef idx="1">
+            <a:schemeClr val="accent1"/>
+          </a:fillRef>
+          <a:effectRef idx="0">
+            <a:schemeClr val="accent1"/>
+          </a:effectRef>
+          <a:fontRef idx="minor">
+            <a:schemeClr val="lt1"/>
+          </a:fontRef>
+        </p:style>
+        <p:txBody>
+          <a:bodyPr rtlCol="0" anchor="ctr"/>
+          <a:lstStyle/>
+          <a:p>
+            <a:pPr algn="ctr"/>
+            <a:endParaRPr lang="en-US"/>
+          </a:p>
+        </p:txBody>
+      </p:sp>
+      <p:pic>
+        <p:nvPicPr>
+          <p:cNvPr id="4" name="Picture 3" descr="A close up of a map&#10;&#10;Description automatically generated">
+            <a:extLst>
+              <a:ext uri="{FF2B5EF4-FFF2-40B4-BE49-F238E27FC236}">
+                <a16:creationId xmlns:a16="http://schemas.microsoft.com/office/drawing/2014/main" id="{54953583-8DC0-4DC1-9C80-59364DCE9939}"/>
+              </a:ext>
+            </a:extLst>
+          </p:cNvPr>
+          <p:cNvPicPr>
+            <a:picLocks noChangeAspect="1"/>
+          </p:cNvPicPr>
+          <p:nvPr/>
+        </p:nvPicPr>
+        <p:blipFill>
+          <a:blip r:embed="rId2">
+            <a:extLst>
+              <a:ext uri="{28A0092B-C50C-407E-A947-70E740481C1C}">
+                <a14:useLocalDpi xmlns:a14="http://schemas.microsoft.com/office/drawing/2010/main" val="0"/>
+              </a:ext>
+            </a:extLst>
+          </a:blip>
+          <a:stretch>
+            <a:fillRect/>
+          </a:stretch>
+        </p:blipFill>
+        <p:spPr>
+          <a:xfrm>
+            <a:off x="592175" y="545082"/>
+            <a:ext cx="7331022" cy="3993389"/>
+          </a:xfrm>
+          <a:prstGeom prst="rect">
+            <a:avLst/>
+          </a:prstGeom>
+        </p:spPr>
+      </p:pic>
+      <p:pic>
+        <p:nvPicPr>
+          <p:cNvPr id="6" name="Picture 5" descr="A picture containing text, map&#10;&#10;Description automatically generated">
+            <a:extLst>
+              <a:ext uri="{FF2B5EF4-FFF2-40B4-BE49-F238E27FC236}">
+                <a16:creationId xmlns:a16="http://schemas.microsoft.com/office/drawing/2014/main" id="{949EBDC5-4E80-425B-84EA-DDBD3A9647A4}"/>
+              </a:ext>
+            </a:extLst>
+          </p:cNvPr>
+          <p:cNvPicPr>
+            <a:picLocks noChangeAspect="1"/>
+          </p:cNvPicPr>
+          <p:nvPr/>
+        </p:nvPicPr>
+        <p:blipFill>
+          <a:blip r:embed="rId3">
+            <a:extLst>
+              <a:ext uri="{28A0092B-C50C-407E-A947-70E740481C1C}">
+                <a14:useLocalDpi xmlns:a14="http://schemas.microsoft.com/office/drawing/2010/main" val="0"/>
+              </a:ext>
+            </a:extLst>
+          </a:blip>
+          <a:stretch>
+            <a:fillRect/>
+          </a:stretch>
+        </p:blipFill>
+        <p:spPr>
+          <a:xfrm>
+            <a:off x="4257686" y="3783081"/>
+            <a:ext cx="7525130" cy="2748571"/>
+          </a:xfrm>
+          <a:prstGeom prst="rect">
+            <a:avLst/>
+          </a:prstGeom>
+        </p:spPr>
+      </p:pic>
+      <p:sp>
+        <p:nvSpPr>
+          <p:cNvPr id="9" name="TextBox 8">
+            <a:extLst>
+              <a:ext uri="{FF2B5EF4-FFF2-40B4-BE49-F238E27FC236}">
+                <a16:creationId xmlns:a16="http://schemas.microsoft.com/office/drawing/2014/main" id="{65A82A39-C97E-4486-BF84-AD752A7FF992}"/>
+              </a:ext>
+            </a:extLst>
+          </p:cNvPr>
+          <p:cNvSpPr txBox="1"/>
+          <p:nvPr/>
+        </p:nvSpPr>
+        <p:spPr>
+          <a:xfrm>
+            <a:off x="1556139" y="175750"/>
+            <a:ext cx="4210816" cy="369332"/>
+          </a:xfrm>
+          <a:prstGeom prst="rect">
+            <a:avLst/>
+          </a:prstGeom>
+          <a:noFill/>
+        </p:spPr>
+        <p:txBody>
+          <a:bodyPr wrap="square" rtlCol="0">
+            <a:spAutoFit/>
+          </a:bodyPr>
+          <a:lstStyle/>
+          <a:p>
+            <a:pPr algn="ctr"/>
+            <a:r>
+              <a:rPr lang="en-US" b="1"/>
+              <a:t>Electricity Generation SSP5 by Class 2040</a:t>
+            </a:r>
+          </a:p>
+        </p:txBody>
+      </p:sp>
+      <p:sp>
+        <p:nvSpPr>
+          <p:cNvPr id="10" name="TextBox 9">
+            <a:extLst>
+              <a:ext uri="{FF2B5EF4-FFF2-40B4-BE49-F238E27FC236}">
+                <a16:creationId xmlns:a16="http://schemas.microsoft.com/office/drawing/2014/main" id="{52335815-A0C2-4151-96C4-FDD5E5395A04}"/>
+              </a:ext>
+            </a:extLst>
+          </p:cNvPr>
+          <p:cNvSpPr txBox="1"/>
+          <p:nvPr/>
+        </p:nvSpPr>
+        <p:spPr>
+          <a:xfrm>
+            <a:off x="5929124" y="3429000"/>
+            <a:ext cx="3976074" cy="369332"/>
+          </a:xfrm>
+          <a:prstGeom prst="rect">
+            <a:avLst/>
+          </a:prstGeom>
+          <a:noFill/>
+        </p:spPr>
+        <p:txBody>
+          <a:bodyPr wrap="square" rtlCol="0">
+            <a:spAutoFit/>
+          </a:bodyPr>
+          <a:lstStyle/>
+          <a:p>
+            <a:pPr algn="ctr"/>
+            <a:r>
+              <a:rPr lang="en-US" b="1"/>
+              <a:t>Land Allocation SSP5 by Class 2040</a:t>
+            </a:r>
+          </a:p>
+        </p:txBody>
+      </p:sp>
+    </p:spTree>
+    <p:extLst>
+      <p:ext uri="{BB962C8B-B14F-4D97-AF65-F5344CB8AC3E}">
+        <p14:creationId xmlns:p14="http://schemas.microsoft.com/office/powerpoint/2010/main" val="1298961020"/>
+      </p:ext>
+    </p:extLst>
+  </p:cSld>
+  <p:clrMapOvr>
+    <a:masterClrMapping/>
+  </p:clrMapOvr>
+</p:sld>
+</file>
+
+<file path=ppt/slides/slide42.xml><?xml version="1.0" encoding="utf-8"?>
+<p:sld xmlns:a="http://schemas.openxmlformats.org/drawingml/2006/main" xmlns:r="http://schemas.openxmlformats.org/officeDocument/2006/relationships" xmlns:p="http://schemas.openxmlformats.org/presentationml/2006/main">
+  <p:cSld>
+    <p:spTree>
+      <p:nvGrpSpPr>
+        <p:cNvPr id="1" name=""/>
+        <p:cNvGrpSpPr/>
+        <p:nvPr/>
+      </p:nvGrpSpPr>
+      <p:grpSpPr>
+        <a:xfrm>
+          <a:off x="0" y="0"/>
+          <a:ext cx="0" cy="0"/>
+          <a:chOff x="0" y="0"/>
+          <a:chExt cx="0" cy="0"/>
+        </a:xfrm>
+      </p:grpSpPr>
+      <p:sp>
+        <p:nvSpPr>
           <p:cNvPr id="2" name="Title 1"/>
           <p:cNvSpPr>
             <a:spLocks noGrp="1"/>
@@ -16195,7 +16828,7 @@
 </p:sld>
 </file>
 
-<file path=ppt/slides/slide42.xml><?xml version="1.0" encoding="utf-8"?>
+<file path=ppt/slides/slide43.xml><?xml version="1.0" encoding="utf-8"?>
 <p:sld xmlns:a="http://schemas.openxmlformats.org/drawingml/2006/main" xmlns:r="http://schemas.openxmlformats.org/officeDocument/2006/relationships" xmlns:p="http://schemas.openxmlformats.org/presentationml/2006/main">
   <p:cSld>
     <p:spTree>
@@ -18264,7 +18897,7 @@
 </p:sld>
 </file>
 
-<file path=ppt/slides/slide43.xml><?xml version="1.0" encoding="utf-8"?>
+<file path=ppt/slides/slide44.xml><?xml version="1.0" encoding="utf-8"?>
 <p:sld xmlns:a="http://schemas.openxmlformats.org/drawingml/2006/main" xmlns:r="http://schemas.openxmlformats.org/officeDocument/2006/relationships" xmlns:p="http://schemas.openxmlformats.org/presentationml/2006/main">
   <p:cSld>
     <p:spTree>
@@ -19180,7 +19813,7 @@
 </p:sld>
 </file>
 
-<file path=ppt/slides/slide44.xml><?xml version="1.0" encoding="utf-8"?>
+<file path=ppt/slides/slide45.xml><?xml version="1.0" encoding="utf-8"?>
 <p:sld xmlns:a="http://schemas.openxmlformats.org/drawingml/2006/main" xmlns:r="http://schemas.openxmlformats.org/officeDocument/2006/relationships" xmlns:p="http://schemas.openxmlformats.org/presentationml/2006/main">
   <p:cSld>
     <p:spTree>
@@ -26036,7 +26669,7 @@
 </p:sld>
 </file>
 
-<file path=ppt/slides/slide45.xml><?xml version="1.0" encoding="utf-8"?>
+<file path=ppt/slides/slide46.xml><?xml version="1.0" encoding="utf-8"?>
 <p:sld xmlns:a="http://schemas.openxmlformats.org/drawingml/2006/main" xmlns:r="http://schemas.openxmlformats.org/officeDocument/2006/relationships" xmlns:p="http://schemas.openxmlformats.org/presentationml/2006/main">
   <p:cSld>
     <p:spTree>

</xml_diff>

<commit_message>
Updating rmap figures vignettes
</commit_message>
<xml_diff>
--- a/vignettes/vignetteFigs/00vignetteFigs.pptx
+++ b/vignettes/vignetteFigs/00vignetteFigs.pptx
@@ -242,7 +242,7 @@
           <a:p>
             <a:fld id="{921607FB-4AF3-41D9-93C1-AF2B65302971}" type="datetimeFigureOut">
               <a:rPr lang="en-US" smtClean="0"/>
-              <a:t>1/22/2021</a:t>
+              <a:t>3/1/2021</a:t>
             </a:fld>
             <a:endParaRPr lang="en-US"/>
           </a:p>
@@ -638,7 +638,7 @@
           <a:p>
             <a:fld id="{11D67388-0790-496E-9A12-37055489AF4F}" type="datetimeFigureOut">
               <a:rPr lang="en-US" smtClean="0"/>
-              <a:t>1/22/2021</a:t>
+              <a:t>3/1/2021</a:t>
             </a:fld>
             <a:endParaRPr lang="en-US"/>
           </a:p>
@@ -806,7 +806,7 @@
           <a:p>
             <a:fld id="{11D67388-0790-496E-9A12-37055489AF4F}" type="datetimeFigureOut">
               <a:rPr lang="en-US" smtClean="0"/>
-              <a:t>1/22/2021</a:t>
+              <a:t>3/1/2021</a:t>
             </a:fld>
             <a:endParaRPr lang="en-US"/>
           </a:p>
@@ -984,7 +984,7 @@
           <a:p>
             <a:fld id="{11D67388-0790-496E-9A12-37055489AF4F}" type="datetimeFigureOut">
               <a:rPr lang="en-US" smtClean="0"/>
-              <a:t>1/22/2021</a:t>
+              <a:t>3/1/2021</a:t>
             </a:fld>
             <a:endParaRPr lang="en-US"/>
           </a:p>
@@ -1152,7 +1152,7 @@
           <a:p>
             <a:fld id="{11D67388-0790-496E-9A12-37055489AF4F}" type="datetimeFigureOut">
               <a:rPr lang="en-US" smtClean="0"/>
-              <a:t>1/22/2021</a:t>
+              <a:t>3/1/2021</a:t>
             </a:fld>
             <a:endParaRPr lang="en-US"/>
           </a:p>
@@ -1397,7 +1397,7 @@
           <a:p>
             <a:fld id="{11D67388-0790-496E-9A12-37055489AF4F}" type="datetimeFigureOut">
               <a:rPr lang="en-US" smtClean="0"/>
-              <a:t>1/22/2021</a:t>
+              <a:t>3/1/2021</a:t>
             </a:fld>
             <a:endParaRPr lang="en-US"/>
           </a:p>
@@ -1626,7 +1626,7 @@
           <a:p>
             <a:fld id="{11D67388-0790-496E-9A12-37055489AF4F}" type="datetimeFigureOut">
               <a:rPr lang="en-US" smtClean="0"/>
-              <a:t>1/22/2021</a:t>
+              <a:t>3/1/2021</a:t>
             </a:fld>
             <a:endParaRPr lang="en-US"/>
           </a:p>
@@ -1990,7 +1990,7 @@
           <a:p>
             <a:fld id="{11D67388-0790-496E-9A12-37055489AF4F}" type="datetimeFigureOut">
               <a:rPr lang="en-US" smtClean="0"/>
-              <a:t>1/22/2021</a:t>
+              <a:t>3/1/2021</a:t>
             </a:fld>
             <a:endParaRPr lang="en-US"/>
           </a:p>
@@ -2107,7 +2107,7 @@
           <a:p>
             <a:fld id="{11D67388-0790-496E-9A12-37055489AF4F}" type="datetimeFigureOut">
               <a:rPr lang="en-US" smtClean="0"/>
-              <a:t>1/22/2021</a:t>
+              <a:t>3/1/2021</a:t>
             </a:fld>
             <a:endParaRPr lang="en-US"/>
           </a:p>
@@ -2202,7 +2202,7 @@
           <a:p>
             <a:fld id="{11D67388-0790-496E-9A12-37055489AF4F}" type="datetimeFigureOut">
               <a:rPr lang="en-US" smtClean="0"/>
-              <a:t>1/22/2021</a:t>
+              <a:t>3/1/2021</a:t>
             </a:fld>
             <a:endParaRPr lang="en-US"/>
           </a:p>
@@ -2477,7 +2477,7 @@
           <a:p>
             <a:fld id="{11D67388-0790-496E-9A12-37055489AF4F}" type="datetimeFigureOut">
               <a:rPr lang="en-US" smtClean="0"/>
-              <a:t>1/22/2021</a:t>
+              <a:t>3/1/2021</a:t>
             </a:fld>
             <a:endParaRPr lang="en-US"/>
           </a:p>
@@ -2729,7 +2729,7 @@
           <a:p>
             <a:fld id="{11D67388-0790-496E-9A12-37055489AF4F}" type="datetimeFigureOut">
               <a:rPr lang="en-US" smtClean="0"/>
-              <a:t>1/22/2021</a:t>
+              <a:t>3/1/2021</a:t>
             </a:fld>
             <a:endParaRPr lang="en-US"/>
           </a:p>
@@ -2940,7 +2940,7 @@
           <a:p>
             <a:fld id="{11D67388-0790-496E-9A12-37055489AF4F}" type="datetimeFigureOut">
               <a:rPr lang="en-US" smtClean="0"/>
-              <a:t>1/22/2021</a:t>
+              <a:t>3/1/2021</a:t>
             </a:fld>
             <a:endParaRPr lang="en-US"/>
           </a:p>
@@ -3699,14 +3699,14 @@
               </a:lnSpc>
             </a:pPr>
             <a:r>
-              <a:rPr lang="de-DE" altLang="en-US" sz="1600">
+              <a:rPr lang="de-DE" altLang="en-US" sz="1600" dirty="0">
                 <a:solidFill>
                   <a:schemeClr val="tx1"/>
                 </a:solidFill>
               </a:rPr>
-              <a:t>metis::metis.map(mapUS49, labels=T)</a:t>
+              <a:t>rmap::map(mapUS49, labels=T)</a:t>
             </a:r>
-            <a:endParaRPr lang="en-US" altLang="en-US" sz="1600">
+            <a:endParaRPr lang="en-US" altLang="en-US" sz="1600" dirty="0">
               <a:solidFill>
                 <a:schemeClr val="tx1"/>
               </a:solidFill>
@@ -7012,8 +7012,8 @@
         </p:nvSpPr>
         <p:spPr>
           <a:xfrm>
-            <a:off x="7027205" y="1735388"/>
-            <a:ext cx="3957750" cy="369332"/>
+            <a:off x="7391792" y="1735388"/>
+            <a:ext cx="3228576" cy="369332"/>
           </a:xfrm>
           <a:prstGeom prst="rect">
             <a:avLst/>
@@ -7026,8 +7026,16 @@
           <a:lstStyle/>
           <a:p>
             <a:r>
-              <a:rPr lang="en-US" b="1"/>
-              <a:t>subRegShape = metis::mapGCAMReg32</a:t>
+              <a:rPr lang="en-US" b="1" dirty="0"/>
+              <a:t>shape = </a:t>
+            </a:r>
+            <a:r>
+              <a:rPr lang="en-US" b="1" dirty="0" err="1"/>
+              <a:t>rmap</a:t>
+            </a:r>
+            <a:r>
+              <a:rPr lang="en-US" b="1" dirty="0"/>
+              <a:t>::mapGCAMReg32</a:t>
             </a:r>
           </a:p>
         </p:txBody>
@@ -7046,8 +7054,8 @@
         </p:nvSpPr>
         <p:spPr>
           <a:xfrm>
-            <a:off x="1759823" y="1735388"/>
-            <a:ext cx="2715615" cy="646331"/>
+            <a:off x="1321115" y="1735388"/>
+            <a:ext cx="3843681" cy="369332"/>
           </a:xfrm>
           <a:prstGeom prst="rect">
             <a:avLst/>
@@ -7060,19 +7068,8 @@
           <a:lstStyle/>
           <a:p>
             <a:r>
-              <a:rPr lang="en-US" b="1" dirty="0" err="1"/>
-              <a:t>subRegShape</a:t>
-            </a:r>
-            <a:r>
               <a:rPr lang="en-US" b="1" dirty="0"/>
-              <a:t> not assigned</a:t>
-            </a:r>
-          </a:p>
-          <a:p>
-            <a:pPr algn="ctr"/>
-            <a:r>
-              <a:rPr lang="en-US" b="1" dirty="0"/>
-              <a:t>auto selects a map</a:t>
+              <a:t>shape not assigned auto selects a map</a:t>
             </a:r>
           </a:p>
         </p:txBody>
@@ -7230,7 +7227,7 @@
         </p:blipFill>
         <p:spPr>
           <a:xfrm>
-            <a:off x="2379714" y="1419209"/>
+            <a:off x="2379714" y="1500323"/>
             <a:ext cx="2758575" cy="3810166"/>
           </a:xfrm>
           <a:prstGeom prst="rect">
@@ -7266,7 +7263,7 @@
         </p:blipFill>
         <p:spPr>
           <a:xfrm>
-            <a:off x="7257764" y="1302551"/>
+            <a:off x="7257764" y="1383665"/>
             <a:ext cx="3181965" cy="3926824"/>
           </a:xfrm>
           <a:prstGeom prst="rect">
@@ -7288,8 +7285,8 @@
         </p:nvSpPr>
         <p:spPr>
           <a:xfrm>
-            <a:off x="3062914" y="849000"/>
-            <a:ext cx="1392176" cy="369332"/>
+            <a:off x="2937553" y="850590"/>
+            <a:ext cx="2040239" cy="369332"/>
           </a:xfrm>
           <a:prstGeom prst="rect">
             <a:avLst/>
@@ -7303,8 +7300,13 @@
           <a:p>
             <a:r>
               <a:rPr lang="en-US" b="1" dirty="0"/>
+              <a:t>data = </a:t>
+            </a:r>
+            <a:r>
+              <a:rPr lang="en-US" b="1" dirty="0" err="1"/>
               <a:t>shapeSubset</a:t>
             </a:r>
+            <a:endParaRPr lang="en-US" b="1" dirty="0"/>
           </a:p>
         </p:txBody>
       </p:sp>
@@ -7322,8 +7324,8 @@
         </p:nvSpPr>
         <p:spPr>
           <a:xfrm>
-            <a:off x="7843887" y="849000"/>
-            <a:ext cx="2009717" cy="369332"/>
+            <a:off x="7758318" y="712090"/>
+            <a:ext cx="2180854" cy="646331"/>
           </a:xfrm>
           <a:prstGeom prst="rect">
             <a:avLst/>
@@ -7335,9 +7337,26 @@
           </a:bodyPr>
           <a:lstStyle/>
           <a:p>
+            <a:pPr algn="ctr"/>
+            <a:r>
+              <a:rPr lang="en-US" b="1" dirty="0"/>
+              <a:t>data = </a:t>
+            </a:r>
             <a:r>
               <a:rPr lang="en-US" b="1" dirty="0" err="1"/>
-              <a:t>metis.mapsProcess</a:t>
+              <a:t>dataframe</a:t>
+            </a:r>
+            <a:endParaRPr lang="en-US" b="1" dirty="0"/>
+          </a:p>
+          <a:p>
+            <a:pPr algn="ctr"/>
+            <a:r>
+              <a:rPr lang="en-US" b="1" dirty="0"/>
+              <a:t>shape = </a:t>
+            </a:r>
+            <a:r>
+              <a:rPr lang="en-US" b="1" dirty="0" err="1"/>
+              <a:t>shapeSubset</a:t>
             </a:r>
             <a:endParaRPr lang="en-US" b="1" dirty="0"/>
           </a:p>
@@ -7468,12 +7487,84 @@
           </a:p>
         </p:txBody>
       </p:sp>
+      <p:pic>
+        <p:nvPicPr>
+          <p:cNvPr id="3" name="Picture 2" descr="A picture containing chart&#10;&#10;Description automatically generated">
+            <a:extLst>
+              <a:ext uri="{FF2B5EF4-FFF2-40B4-BE49-F238E27FC236}">
+                <a16:creationId xmlns:a16="http://schemas.microsoft.com/office/drawing/2014/main" id="{22703104-0203-4F7B-BE55-2A0221E93976}"/>
+              </a:ext>
+            </a:extLst>
+          </p:cNvPr>
+          <p:cNvPicPr>
+            <a:picLocks noChangeAspect="1"/>
+          </p:cNvPicPr>
+          <p:nvPr/>
+        </p:nvPicPr>
+        <p:blipFill>
+          <a:blip r:embed="rId2" cstate="print">
+            <a:extLst>
+              <a:ext uri="{28A0092B-C50C-407E-A947-70E740481C1C}">
+                <a14:useLocalDpi xmlns:a14="http://schemas.microsoft.com/office/drawing/2010/main" val="0"/>
+              </a:ext>
+            </a:extLst>
+          </a:blip>
+          <a:stretch>
+            <a:fillRect/>
+          </a:stretch>
+        </p:blipFill>
+        <p:spPr>
+          <a:xfrm>
+            <a:off x="1951839" y="1705801"/>
+            <a:ext cx="3605456" cy="3425683"/>
+          </a:xfrm>
+          <a:prstGeom prst="rect">
+            <a:avLst/>
+          </a:prstGeom>
+        </p:spPr>
+      </p:pic>
+      <p:pic>
+        <p:nvPicPr>
+          <p:cNvPr id="11" name="Picture 10" descr="Map&#10;&#10;Description automatically generated">
+            <a:extLst>
+              <a:ext uri="{FF2B5EF4-FFF2-40B4-BE49-F238E27FC236}">
+                <a16:creationId xmlns:a16="http://schemas.microsoft.com/office/drawing/2014/main" id="{9FA9517D-43C4-42A3-A4CF-13744C9DAC3A}"/>
+              </a:ext>
+            </a:extLst>
+          </p:cNvPr>
+          <p:cNvPicPr>
+            <a:picLocks noChangeAspect="1"/>
+          </p:cNvPicPr>
+          <p:nvPr/>
+        </p:nvPicPr>
+        <p:blipFill>
+          <a:blip r:embed="rId3" cstate="print">
+            <a:extLst>
+              <a:ext uri="{28A0092B-C50C-407E-A947-70E740481C1C}">
+                <a14:useLocalDpi xmlns:a14="http://schemas.microsoft.com/office/drawing/2010/main" val="0"/>
+              </a:ext>
+            </a:extLst>
+          </a:blip>
+          <a:stretch>
+            <a:fillRect/>
+          </a:stretch>
+        </p:blipFill>
+        <p:spPr>
+          <a:xfrm>
+            <a:off x="6693804" y="1560882"/>
+            <a:ext cx="4309881" cy="3715520"/>
+          </a:xfrm>
+          <a:prstGeom prst="rect">
+            <a:avLst/>
+          </a:prstGeom>
+        </p:spPr>
+      </p:pic>
       <p:sp>
         <p:nvSpPr>
-          <p:cNvPr id="9" name="Rectangle 8">
-            <a:extLst>
-              <a:ext uri="{FF2B5EF4-FFF2-40B4-BE49-F238E27FC236}">
-                <a16:creationId xmlns:a16="http://schemas.microsoft.com/office/drawing/2014/main" id="{7AB7F313-45DA-4714-9451-0C5E31B3BE25}"/>
+          <p:cNvPr id="13" name="Rectangle 12">
+            <a:extLst>
+              <a:ext uri="{FF2B5EF4-FFF2-40B4-BE49-F238E27FC236}">
+                <a16:creationId xmlns:a16="http://schemas.microsoft.com/office/drawing/2014/main" id="{23CAFE2C-7887-498D-88FB-B0CEA705874F}"/>
               </a:ext>
             </a:extLst>
           </p:cNvPr>
@@ -7482,8 +7573,8 @@
         </p:nvSpPr>
         <p:spPr>
           <a:xfrm>
-            <a:off x="3062914" y="849000"/>
-            <a:ext cx="1199752" cy="369332"/>
+            <a:off x="2937553" y="850590"/>
+            <a:ext cx="1847814" cy="369332"/>
           </a:xfrm>
           <a:prstGeom prst="rect">
             <a:avLst/>
@@ -7497,17 +7588,22 @@
           <a:p>
             <a:r>
               <a:rPr lang="en-US" b="1" dirty="0"/>
+              <a:t>data = </a:t>
+            </a:r>
+            <a:r>
+              <a:rPr lang="en-US" b="1" dirty="0" err="1"/>
               <a:t>shapeCrop</a:t>
             </a:r>
+            <a:endParaRPr lang="en-US" b="1" dirty="0"/>
           </a:p>
         </p:txBody>
       </p:sp>
       <p:sp>
         <p:nvSpPr>
-          <p:cNvPr id="10" name="Rectangle 9">
-            <a:extLst>
-              <a:ext uri="{FF2B5EF4-FFF2-40B4-BE49-F238E27FC236}">
-                <a16:creationId xmlns:a16="http://schemas.microsoft.com/office/drawing/2014/main" id="{DC79B96A-FB2B-4CFF-B618-4410BDE33DA2}"/>
+          <p:cNvPr id="14" name="Rectangle 13">
+            <a:extLst>
+              <a:ext uri="{FF2B5EF4-FFF2-40B4-BE49-F238E27FC236}">
+                <a16:creationId xmlns:a16="http://schemas.microsoft.com/office/drawing/2014/main" id="{22041367-82B6-447F-8A35-AB8E4BFAF487}"/>
               </a:ext>
             </a:extLst>
           </p:cNvPr>
@@ -7516,8 +7612,8 @@
         </p:nvSpPr>
         <p:spPr>
           <a:xfrm>
-            <a:off x="7843887" y="849000"/>
-            <a:ext cx="2009717" cy="369332"/>
+            <a:off x="7854531" y="712090"/>
+            <a:ext cx="1988429" cy="646331"/>
           </a:xfrm>
           <a:prstGeom prst="rect">
             <a:avLst/>
@@ -7529,85 +7625,31 @@
           </a:bodyPr>
           <a:lstStyle/>
           <a:p>
+            <a:pPr algn="ctr"/>
             <a:r>
               <a:rPr lang="en-US" b="1" dirty="0"/>
-              <a:t>metis.mapsProcess</a:t>
+              <a:t>data = </a:t>
             </a:r>
+            <a:r>
+              <a:rPr lang="en-US" b="1" dirty="0" err="1"/>
+              <a:t>dataframe</a:t>
+            </a:r>
+            <a:endParaRPr lang="en-US" b="1" dirty="0"/>
+          </a:p>
+          <a:p>
+            <a:pPr algn="ctr"/>
+            <a:r>
+              <a:rPr lang="en-US" b="1" dirty="0"/>
+              <a:t>shape = </a:t>
+            </a:r>
+            <a:r>
+              <a:rPr lang="en-US" b="1" dirty="0" err="1"/>
+              <a:t>shapeCrop</a:t>
+            </a:r>
+            <a:endParaRPr lang="en-US" b="1" dirty="0"/>
           </a:p>
         </p:txBody>
       </p:sp>
-      <p:pic>
-        <p:nvPicPr>
-          <p:cNvPr id="3" name="Picture 2" descr="A picture containing chart&#10;&#10;Description automatically generated">
-            <a:extLst>
-              <a:ext uri="{FF2B5EF4-FFF2-40B4-BE49-F238E27FC236}">
-                <a16:creationId xmlns:a16="http://schemas.microsoft.com/office/drawing/2014/main" id="{22703104-0203-4F7B-BE55-2A0221E93976}"/>
-              </a:ext>
-            </a:extLst>
-          </p:cNvPr>
-          <p:cNvPicPr>
-            <a:picLocks noChangeAspect="1"/>
-          </p:cNvPicPr>
-          <p:nvPr/>
-        </p:nvPicPr>
-        <p:blipFill>
-          <a:blip r:embed="rId2" cstate="print">
-            <a:extLst>
-              <a:ext uri="{28A0092B-C50C-407E-A947-70E740481C1C}">
-                <a14:useLocalDpi xmlns:a14="http://schemas.microsoft.com/office/drawing/2010/main" val="0"/>
-              </a:ext>
-            </a:extLst>
-          </a:blip>
-          <a:stretch>
-            <a:fillRect/>
-          </a:stretch>
-        </p:blipFill>
-        <p:spPr>
-          <a:xfrm>
-            <a:off x="1951839" y="1576145"/>
-            <a:ext cx="3605456" cy="3425683"/>
-          </a:xfrm>
-          <a:prstGeom prst="rect">
-            <a:avLst/>
-          </a:prstGeom>
-        </p:spPr>
-      </p:pic>
-      <p:pic>
-        <p:nvPicPr>
-          <p:cNvPr id="11" name="Picture 10" descr="Map&#10;&#10;Description automatically generated">
-            <a:extLst>
-              <a:ext uri="{FF2B5EF4-FFF2-40B4-BE49-F238E27FC236}">
-                <a16:creationId xmlns:a16="http://schemas.microsoft.com/office/drawing/2014/main" id="{9FA9517D-43C4-42A3-A4CF-13744C9DAC3A}"/>
-              </a:ext>
-            </a:extLst>
-          </p:cNvPr>
-          <p:cNvPicPr>
-            <a:picLocks noChangeAspect="1"/>
-          </p:cNvPicPr>
-          <p:nvPr/>
-        </p:nvPicPr>
-        <p:blipFill>
-          <a:blip r:embed="rId3" cstate="print">
-            <a:extLst>
-              <a:ext uri="{28A0092B-C50C-407E-A947-70E740481C1C}">
-                <a14:useLocalDpi xmlns:a14="http://schemas.microsoft.com/office/drawing/2010/main" val="0"/>
-              </a:ext>
-            </a:extLst>
-          </a:blip>
-          <a:stretch>
-            <a:fillRect/>
-          </a:stretch>
-        </p:blipFill>
-        <p:spPr>
-          <a:xfrm>
-            <a:off x="6693804" y="1431226"/>
-            <a:ext cx="4309881" cy="3715520"/>
-          </a:xfrm>
-          <a:prstGeom prst="rect">
-            <a:avLst/>
-          </a:prstGeom>
-        </p:spPr>
-      </p:pic>
     </p:spTree>
     <p:extLst>
       <p:ext uri="{BB962C8B-B14F-4D97-AF65-F5344CB8AC3E}">

</xml_diff>